<commit_message>
ecological funcitonality poster version created
</commit_message>
<xml_diff>
--- a/cactus_survey_poster.pptx
+++ b/cactus_survey_poster.pptx
@@ -5,15 +5,16 @@
     <p:sldMasterId id="2147483660" r:id="rId1"/>
   </p:sldMasterIdLst>
   <p:notesMasterIdLst>
-    <p:notesMasterId r:id="rId5"/>
+    <p:notesMasterId r:id="rId6"/>
   </p:notesMasterIdLst>
   <p:handoutMasterIdLst>
-    <p:handoutMasterId r:id="rId6"/>
+    <p:handoutMasterId r:id="rId7"/>
   </p:handoutMasterIdLst>
   <p:sldIdLst>
     <p:sldId id="256" r:id="rId2"/>
     <p:sldId id="257" r:id="rId3"/>
     <p:sldId id="258" r:id="rId4"/>
+    <p:sldId id="259" r:id="rId5"/>
   </p:sldIdLst>
   <p:sldSz cx="43891200" cy="32918400"/>
   <p:notesSz cx="6858000" cy="9144000"/>
@@ -217,7 +218,7 @@
           <a:p>
             <a:fld id="{F1C0B079-A316-4C9B-B165-DF9EA8325D2C}" type="datetimeFigureOut">
               <a:rPr lang="en-US" smtClean="0"/>
-              <a:t>3/26/2019</a:t>
+              <a:t>3/29/2019</a:t>
             </a:fld>
             <a:endParaRPr lang="en-US"/>
           </a:p>
@@ -382,7 +383,7 @@
           <a:p>
             <a:fld id="{38F28AB8-57D1-494F-9851-055AD867E790}" type="datetimeFigureOut">
               <a:rPr lang="en-US" smtClean="0"/>
-              <a:t>3/26/2019</a:t>
+              <a:t>3/29/2019</a:t>
             </a:fld>
             <a:endParaRPr lang="en-US"/>
           </a:p>
@@ -3671,7 +3672,7 @@
           <a:p>
             <a:fld id="{ECAA57DF-1C19-4726-AB84-014692BAD8F5}" type="datetimeFigureOut">
               <a:rPr lang="en-US" smtClean="0"/>
-              <a:t>3/26/2019</a:t>
+              <a:t>3/29/2019</a:t>
             </a:fld>
             <a:endParaRPr lang="en-US"/>
           </a:p>
@@ -4010,7 +4011,7 @@
             <a:fld id="{ECAA57DF-1C19-4726-AB84-014692BAD8F5}" type="datetimeFigureOut">
               <a:rPr lang="en-US" smtClean="0"/>
               <a:pPr/>
-              <a:t>3/26/2019</a:t>
+              <a:t>3/29/2019</a:t>
             </a:fld>
             <a:endParaRPr lang="en-US"/>
           </a:p>
@@ -5432,7 +5433,7 @@
         </p:nvSpPr>
         <p:spPr>
           <a:xfrm>
-            <a:off x="1158240" y="76260"/>
+            <a:off x="1158240" y="685860"/>
             <a:ext cx="31653360" cy="2971740"/>
           </a:xfrm>
         </p:spPr>
@@ -5443,20 +5444,10 @@
           <a:lstStyle/>
           <a:p>
             <a:r>
-              <a:rPr lang="en-US" sz="8500" dirty="0"/>
-              <a:t>Metrics for Avian Double Mutualistic Interactions with </a:t>
-            </a:r>
-            <a:r>
-              <a:rPr lang="en-US" sz="8500" i="1" dirty="0" err="1"/>
-              <a:t>Cactaceae</a:t>
-            </a:r>
-            <a:br>
-              <a:rPr lang="en-US" sz="8500" i="1" dirty="0"/>
-            </a:br>
-            <a:r>
-              <a:rPr lang="en-US" sz="6000" dirty="0"/>
-              <a:t>A Preliminary Analysis towards Network Interactions in a Desert Ecosystem</a:t>
-            </a:r>
+              <a:rPr lang="en-US" dirty="0"/>
+              <a:t>A Prickly Situation: Contrasting frequency and morphological measures in three cactus species</a:t>
+            </a:r>
+            <a:endParaRPr lang="en-US" sz="6000" dirty="0"/>
           </a:p>
         </p:txBody>
       </p:sp>
@@ -5497,9 +5488,16 @@
             </a:r>
             <a:r>
               <a:rPr lang="en-US" baseline="30000" dirty="0"/>
-              <a:t>1 </a:t>
-            </a:r>
-            <a:endParaRPr lang="en-US" dirty="0"/>
+              <a:t>1  </a:t>
+            </a:r>
+            <a:r>
+              <a:rPr lang="en-US" dirty="0"/>
+              <a:t>| www.ecoblender.org</a:t>
+            </a:r>
+            <a:r>
+              <a:rPr lang="en-US" baseline="30000" dirty="0"/>
+              <a:t>1</a:t>
+            </a:r>
           </a:p>
         </p:txBody>
       </p:sp>
@@ -5549,7 +5547,7 @@
           <a:p>
             <a:r>
               <a:rPr lang="en-US" b="1" dirty="0"/>
-              <a:t>What species of cacti are most likely to facilitate double mutualistic interactions with birds? </a:t>
+              <a:t>What measurable characteristics determine ecologically functional differences in three species of cacti?</a:t>
             </a:r>
           </a:p>
         </p:txBody>
@@ -5703,16 +5701,23 @@
           </a:bodyPr>
           <a:lstStyle/>
           <a:p>
+            <a:pPr marL="0" indent="0">
+              <a:buNone/>
+            </a:pPr>
             <a:r>
               <a:rPr lang="en-US" b="1" dirty="0"/>
-              <a:t>Some cactus species are more attractive to pollinating and frugivorous birds than other</a:t>
-            </a:r>
-          </a:p>
-          <a:p>
-            <a:pPr lvl="1"/>
+              <a:t>Different species of cacti occupy different ecological and facilitating niches. </a:t>
+            </a:r>
+          </a:p>
+          <a:p>
+            <a:pPr lvl="1">
+              <a:buClr>
+                <a:schemeClr val="tx1"/>
+              </a:buClr>
+            </a:pPr>
             <a:r>
               <a:rPr lang="en-US" i="1" dirty="0"/>
-              <a:t>Different cactuses will have different sizes and health which may impact bird visitation</a:t>
+              <a:t>Different cactuses will have different sizes and health which impacts interactor visitation.</a:t>
             </a:r>
           </a:p>
         </p:txBody>
@@ -5826,6 +5831,9 @@
           </a:bodyPr>
           <a:lstStyle/>
           <a:p>
+            <a:pPr marL="0" indent="0">
+              <a:buNone/>
+            </a:pPr>
             <a:r>
               <a:rPr lang="en-US" sz="3600" i="1" dirty="0"/>
               <a:t>C. acanthocarpa </a:t>
@@ -5874,7 +5882,7 @@
         </p:nvSpPr>
         <p:spPr>
           <a:xfrm>
-            <a:off x="29900880" y="19716796"/>
+            <a:off x="29900880" y="19030996"/>
             <a:ext cx="12801600" cy="1219200"/>
           </a:xfrm>
         </p:spPr>
@@ -5884,7 +5892,7 @@
           <a:p>
             <a:r>
               <a:rPr lang="en-US" dirty="0"/>
-              <a:t>Conclusion</a:t>
+              <a:t>Conclusions/Future Research</a:t>
             </a:r>
           </a:p>
         </p:txBody>
@@ -6402,8 +6410,8 @@
         </p:nvSpPr>
         <p:spPr>
           <a:xfrm>
-            <a:off x="29928259" y="21217050"/>
-            <a:ext cx="12838826" cy="4748816"/>
+            <a:off x="29928259" y="20404249"/>
+            <a:ext cx="12838826" cy="5627164"/>
           </a:xfrm>
           <a:solidFill>
             <a:schemeClr val="accent1">
@@ -6418,31 +6426,12 @@
           </a:bodyPr>
           <a:lstStyle/>
           <a:p>
-            <a:r>
-              <a:rPr lang="en-US" sz="3600" dirty="0"/>
-              <a:t>Frequency, size, and health were all strongest in </a:t>
-            </a:r>
-            <a:r>
-              <a:rPr lang="en-US" sz="3600" i="1" dirty="0"/>
-              <a:t>C. acanthocarpa</a:t>
-            </a:r>
-          </a:p>
-          <a:p>
-            <a:r>
-              <a:rPr lang="en-US" sz="3600" dirty="0"/>
-              <a:t>Health will determine reproductive output, so healthiest species will have most success blooming/fruiting</a:t>
-            </a:r>
-          </a:p>
-          <a:p>
-            <a:r>
-              <a:rPr lang="en-US" sz="3600" dirty="0"/>
-              <a:t>Larger, more distinct differences in height between individuals more likely to translate to bird behavior</a:t>
-            </a:r>
-          </a:p>
-          <a:p>
-            <a:r>
-              <a:rPr lang="en-US" sz="3600" dirty="0"/>
-              <a:t>C. acanthocarpa will be study species in further experiments</a:t>
+            <a:pPr marL="0" indent="0">
+              <a:buNone/>
+            </a:pPr>
+            <a:r>
+              <a:rPr lang="en-US" sz="3800" dirty="0"/>
+              <a:t>Because health and size may be strong predictors of reproductive output, all three cactus species will likely fulfill different ecological interaction niches. Additional studies surveying reproductive outputs against these traits will provide further insight into the way phenotypical differences impact positive interactions, mutualism, and eventual facilitation. These easily reproducible studies can be expanded upon by monitoring nectarivorous and frugivorous interactors at different phenological stages. </a:t>
             </a:r>
           </a:p>
         </p:txBody>
@@ -6478,7 +6467,7 @@
         </p:spPr>
         <p:txBody>
           <a:bodyPr vert="horz" lIns="91440" tIns="182880" rIns="91440" bIns="45720" rtlCol="0">
-            <a:normAutofit fontScale="92500" lnSpcReduction="20000"/>
+            <a:normAutofit lnSpcReduction="10000"/>
           </a:bodyPr>
           <a:lstStyle>
             <a:lvl1pPr marL="457200" indent="-457200" algn="l" defTabSz="4389120" rtl="0" eaLnBrk="1" latinLnBrk="0" hangingPunct="1">
@@ -6690,97 +6679,52 @@
             </a:lvl9pPr>
           </a:lstStyle>
           <a:p>
-            <a:r>
-              <a:rPr lang="en-US" sz="3600" i="1" dirty="0" err="1"/>
-              <a:t>Cylindropuntia</a:t>
-            </a:r>
-            <a:r>
-              <a:rPr lang="en-US" sz="3600" i="1" dirty="0"/>
-              <a:t> </a:t>
-            </a:r>
-            <a:r>
-              <a:rPr lang="en-US" sz="3600" i="1" dirty="0" err="1"/>
-              <a:t>acanthocarpa</a:t>
-            </a:r>
-            <a:r>
-              <a:rPr lang="en-US" sz="3600" i="1" dirty="0"/>
-              <a:t> </a:t>
-            </a:r>
-            <a:r>
-              <a:rPr lang="en-US" sz="3600" dirty="0"/>
-              <a:t>&amp; </a:t>
-            </a:r>
-            <a:r>
-              <a:rPr lang="en-US" sz="3600" i="1" dirty="0" err="1"/>
-              <a:t>Cylindropuntia</a:t>
-            </a:r>
-            <a:r>
-              <a:rPr lang="en-US" sz="3600" i="1" dirty="0"/>
-              <a:t> </a:t>
-            </a:r>
-            <a:r>
-              <a:rPr lang="en-US" sz="3600" i="1" dirty="0" err="1"/>
-              <a:t>enchinocarpa</a:t>
-            </a:r>
-            <a:r>
-              <a:rPr lang="en-US" sz="3600" dirty="0"/>
-              <a:t>: walk 6 and 9 transects, respectively</a:t>
-            </a:r>
-          </a:p>
-          <a:p>
-            <a:r>
-              <a:rPr lang="en-US" sz="3600" i="1" dirty="0"/>
-              <a:t>Opuntia </a:t>
-            </a:r>
-            <a:r>
-              <a:rPr lang="en-US" sz="3600" i="1" dirty="0" err="1"/>
-              <a:t>basilaris</a:t>
-            </a:r>
-            <a:r>
-              <a:rPr lang="en-US" sz="3600" dirty="0"/>
-              <a:t>: haphazard</a:t>
-            </a:r>
-          </a:p>
-          <a:p>
-            <a:r>
-              <a:rPr lang="en-US" sz="3600" dirty="0"/>
+            <a:pPr>
+              <a:buClr>
+                <a:schemeClr val="tx1"/>
+              </a:buClr>
+            </a:pPr>
+            <a:r>
+              <a:rPr lang="en-US" sz="5400" dirty="0"/>
+              <a:t>Transects or haphazard sampling</a:t>
+            </a:r>
+          </a:p>
+          <a:p>
+            <a:pPr>
+              <a:buClr>
+                <a:schemeClr val="tx1"/>
+              </a:buClr>
+            </a:pPr>
+            <a:r>
+              <a:rPr lang="en-US" sz="5400" dirty="0"/>
               <a:t>Major axis, minor axis, vertical axis</a:t>
             </a:r>
           </a:p>
           <a:p>
-            <a:r>
-              <a:rPr lang="en-US" sz="3600" dirty="0"/>
+            <a:pPr>
+              <a:buClr>
+                <a:schemeClr val="tx1"/>
+              </a:buClr>
+            </a:pPr>
+            <a:r>
+              <a:rPr lang="en-US" sz="5400" dirty="0"/>
               <a:t>Health index 1-5</a:t>
             </a:r>
           </a:p>
           <a:p>
-            <a:pPr lvl="1"/>
-            <a:r>
-              <a:rPr lang="en-US" sz="3200" dirty="0"/>
-              <a:t>Scarification, rot, branch death</a:t>
-            </a:r>
-          </a:p>
-          <a:p>
-            <a:r>
-              <a:rPr lang="en-US" sz="3600" dirty="0"/>
-              <a:t>Geotag</a:t>
-            </a:r>
-          </a:p>
-          <a:p>
-            <a:pPr lvl="1"/>
-            <a:endParaRPr lang="en-US" dirty="0"/>
-          </a:p>
-          <a:p>
-            <a:pPr lvl="1"/>
-            <a:endParaRPr lang="en-US" dirty="0"/>
-          </a:p>
-          <a:p>
-            <a:pPr lvl="1"/>
-            <a:endParaRPr lang="en-US" dirty="0"/>
-          </a:p>
-          <a:p>
-            <a:pPr lvl="1"/>
-            <a:endParaRPr lang="en-US" dirty="0"/>
+            <a:pPr lvl="1">
+              <a:buClr>
+                <a:schemeClr val="tx1"/>
+              </a:buClr>
+            </a:pPr>
+            <a:r>
+              <a:rPr lang="en-US" sz="4400" dirty="0"/>
+              <a:t>Scarification</a:t>
+            </a:r>
+            <a:r>
+              <a:rPr lang="en-US" sz="5400" dirty="0"/>
+              <a:t>, rot, branch death</a:t>
+            </a:r>
           </a:p>
           <a:p>
             <a:pPr lvl="1"/>
@@ -7279,6 +7223,9 @@
             </a:lvl9pPr>
           </a:lstStyle>
           <a:p>
+            <a:pPr marL="0" indent="0">
+              <a:buNone/>
+            </a:pPr>
             <a:r>
               <a:rPr lang="en-US" dirty="0"/>
               <a:t>Each cactus species had significantly different mean heights </a:t>
@@ -8413,36 +8360,6 @@
           </a:p>
         </p:txBody>
       </p:sp>
-      <p:pic>
-        <p:nvPicPr>
-          <p:cNvPr id="3" name="Picture 2">
-            <a:extLst>
-              <a:ext uri="{FF2B5EF4-FFF2-40B4-BE49-F238E27FC236}">
-                <a16:creationId xmlns:a16="http://schemas.microsoft.com/office/drawing/2014/main" id="{DB40B034-0A1C-4CA3-B7D8-E56B739C859D}"/>
-              </a:ext>
-            </a:extLst>
-          </p:cNvPr>
-          <p:cNvPicPr>
-            <a:picLocks noChangeAspect="1"/>
-          </p:cNvPicPr>
-          <p:nvPr/>
-        </p:nvPicPr>
-        <p:blipFill>
-          <a:blip r:embed="rId22"/>
-          <a:stretch>
-            <a:fillRect/>
-          </a:stretch>
-        </p:blipFill>
-        <p:spPr>
-          <a:xfrm>
-            <a:off x="16984920" y="12753804"/>
-            <a:ext cx="10118093" cy="5751088"/>
-          </a:xfrm>
-          <a:prstGeom prst="rect">
-            <a:avLst/>
-          </a:prstGeom>
-        </p:spPr>
-      </p:pic>
       <p:sp>
         <p:nvSpPr>
           <p:cNvPr id="16" name="TextBox 15">
@@ -8457,8 +8374,8 @@
         </p:nvSpPr>
         <p:spPr>
           <a:xfrm>
-            <a:off x="16248989" y="18699739"/>
-            <a:ext cx="12801599" cy="1077218"/>
+            <a:off x="25089284" y="12717243"/>
+            <a:ext cx="3919046" cy="3539430"/>
           </a:xfrm>
           <a:prstGeom prst="rect">
             <a:avLst/>
@@ -8475,6 +8392,8 @@
               <a:rPr lang="en-US" sz="3200" dirty="0"/>
               <a:t>Figure 4: </a:t>
             </a:r>
+          </a:p>
+          <a:p>
             <a:r>
               <a:rPr lang="it-IT" sz="3200" i="1" dirty="0"/>
               <a:t>C. acanthocarpa </a:t>
@@ -8496,6 +8415,8 @@
               <a:rPr lang="it-IT" sz="3200" dirty="0"/>
               <a:t>) &gt; </a:t>
             </a:r>
+          </a:p>
+          <a:p>
             <a:r>
               <a:rPr lang="it-IT" sz="3200" i="1" dirty="0"/>
               <a:t>C. echinocarpa</a:t>
@@ -8512,6 +8433,8 @@
               <a:rPr lang="it-IT" sz="3200" dirty="0"/>
               <a:t>) &gt; </a:t>
             </a:r>
+          </a:p>
+          <a:p>
             <a:r>
               <a:rPr lang="it-IT" sz="3200" i="1" dirty="0"/>
               <a:t>O. basilaris</a:t>
@@ -8587,7 +8510,7 @@
               <p:nvPr/>
             </p:nvPicPr>
             <p:blipFill>
-              <a:blip r:embed="rId23"/>
+              <a:blip r:embed="rId22"/>
               <a:stretch>
                 <a:fillRect/>
               </a:stretch>
@@ -9445,10 +9368,57 @@
       </p:sp>
       <p:pic>
         <p:nvPicPr>
-          <p:cNvPr id="31" name="Picture 30">
+          <p:cNvPr id="87" name="Picture 4" descr="Image result for york university logo">
             <a:extLst>
               <a:ext uri="{FF2B5EF4-FFF2-40B4-BE49-F238E27FC236}">
-                <a16:creationId xmlns:a16="http://schemas.microsoft.com/office/drawing/2014/main" id="{A520BE84-4A02-4CF5-9C1C-728C6F5A4F1D}"/>
+                <a16:creationId xmlns:a16="http://schemas.microsoft.com/office/drawing/2014/main" id="{458A3FBB-D5B6-4255-B5FF-7A78A76D6877}"/>
+              </a:ext>
+            </a:extLst>
+          </p:cNvPr>
+          <p:cNvPicPr>
+            <a:picLocks noChangeAspect="1" noChangeArrowheads="1"/>
+          </p:cNvPicPr>
+          <p:nvPr/>
+        </p:nvPicPr>
+        <p:blipFill>
+          <a:blip r:embed="rId23">
+            <a:extLst>
+              <a:ext uri="{28A0092B-C50C-407E-A947-70E740481C1C}">
+                <a14:useLocalDpi xmlns:a14="http://schemas.microsoft.com/office/drawing/2010/main" val="0"/>
+              </a:ext>
+            </a:extLst>
+          </a:blip>
+          <a:srcRect/>
+          <a:stretch>
+            <a:fillRect/>
+          </a:stretch>
+        </p:blipFill>
+        <p:spPr bwMode="auto">
+          <a:xfrm>
+            <a:off x="41719390" y="5213289"/>
+            <a:ext cx="1673698" cy="1673698"/>
+          </a:xfrm>
+          <a:prstGeom prst="rect">
+            <a:avLst/>
+          </a:prstGeom>
+          <a:noFill/>
+          <a:extLst>
+            <a:ext uri="{909E8E84-426E-40DD-AFC4-6F175D3DCCD1}">
+              <a14:hiddenFill xmlns:a14="http://schemas.microsoft.com/office/drawing/2010/main">
+                <a:solidFill>
+                  <a:srgbClr val="FFFFFF"/>
+                </a:solidFill>
+              </a14:hiddenFill>
+            </a:ext>
+          </a:extLst>
+        </p:spPr>
+      </p:pic>
+      <p:pic>
+        <p:nvPicPr>
+          <p:cNvPr id="13" name="Picture 12">
+            <a:extLst>
+              <a:ext uri="{FF2B5EF4-FFF2-40B4-BE49-F238E27FC236}">
+                <a16:creationId xmlns:a16="http://schemas.microsoft.com/office/drawing/2014/main" id="{293E4051-3FAA-46D5-BEAD-F0F46F13C5D8}"/>
               </a:ext>
             </a:extLst>
           </p:cNvPr>
@@ -9465,59 +9435,191 @@
         </p:blipFill>
         <p:spPr>
           <a:xfrm>
-            <a:off x="17186849" y="21681564"/>
-            <a:ext cx="9193596" cy="6111592"/>
+            <a:off x="15902941" y="12620823"/>
+            <a:ext cx="8715375" cy="5981700"/>
           </a:xfrm>
           <a:prstGeom prst="rect">
             <a:avLst/>
           </a:prstGeom>
         </p:spPr>
       </p:pic>
+      <p:sp>
+        <p:nvSpPr>
+          <p:cNvPr id="17" name="TextBox 16">
+            <a:extLst>
+              <a:ext uri="{FF2B5EF4-FFF2-40B4-BE49-F238E27FC236}">
+                <a16:creationId xmlns:a16="http://schemas.microsoft.com/office/drawing/2014/main" id="{655CC684-9E36-4BA5-A2DC-F55E4DC51AFC}"/>
+              </a:ext>
+            </a:extLst>
+          </p:cNvPr>
+          <p:cNvSpPr txBox="1"/>
+          <p:nvPr/>
+        </p:nvSpPr>
+        <p:spPr>
+          <a:xfrm>
+            <a:off x="16984920" y="18595052"/>
+            <a:ext cx="6955409" cy="830997"/>
+          </a:xfrm>
+          <a:prstGeom prst="rect">
+            <a:avLst/>
+          </a:prstGeom>
+          <a:noFill/>
+        </p:spPr>
+        <p:txBody>
+          <a:bodyPr wrap="square" rtlCol="0">
+            <a:spAutoFit/>
+          </a:bodyPr>
+          <a:lstStyle/>
+          <a:p>
+            <a:r>
+              <a:rPr lang="en-US" sz="2400" i="1" dirty="0"/>
+              <a:t>Cylindropuntia      Cylindropuntia         Opuntia</a:t>
+            </a:r>
+          </a:p>
+          <a:p>
+            <a:r>
+              <a:rPr lang="en-US" sz="2400" i="1" dirty="0"/>
+              <a:t> acanthocarpa        echinocarpa           basilaris</a:t>
+            </a:r>
+          </a:p>
+        </p:txBody>
+      </p:sp>
       <p:pic>
         <p:nvPicPr>
-          <p:cNvPr id="87" name="Picture 4" descr="Image result for york university logo">
+          <p:cNvPr id="28" name="Picture 27">
             <a:extLst>
               <a:ext uri="{FF2B5EF4-FFF2-40B4-BE49-F238E27FC236}">
-                <a16:creationId xmlns:a16="http://schemas.microsoft.com/office/drawing/2014/main" id="{458A3FBB-D5B6-4255-B5FF-7A78A76D6877}"/>
+                <a16:creationId xmlns:a16="http://schemas.microsoft.com/office/drawing/2014/main" id="{919038E4-AEEE-477D-BE35-AE69480DC68B}"/>
               </a:ext>
             </a:extLst>
           </p:cNvPr>
           <p:cNvPicPr>
-            <a:picLocks noChangeAspect="1" noChangeArrowheads="1"/>
+            <a:picLocks noChangeAspect="1"/>
+          </p:cNvPicPr>
+          <p:nvPr/>
+        </p:nvPicPr>
+        <p:blipFill rotWithShape="1">
+          <a:blip r:embed="rId25"/>
+          <a:srcRect l="1121" t="20620"/>
+          <a:stretch/>
+        </p:blipFill>
+        <p:spPr>
+          <a:xfrm>
+            <a:off x="17405942" y="21577695"/>
+            <a:ext cx="9699589" cy="5627164"/>
+          </a:xfrm>
+          <a:prstGeom prst="rect">
+            <a:avLst/>
+          </a:prstGeom>
+        </p:spPr>
+      </p:pic>
+      <p:sp>
+        <p:nvSpPr>
+          <p:cNvPr id="44" name="TextBox 43">
+            <a:extLst>
+              <a:ext uri="{FF2B5EF4-FFF2-40B4-BE49-F238E27FC236}">
+                <a16:creationId xmlns:a16="http://schemas.microsoft.com/office/drawing/2014/main" id="{A50C17AF-329F-4160-9CB2-B8B0A98CF44F}"/>
+              </a:ext>
+            </a:extLst>
+          </p:cNvPr>
+          <p:cNvSpPr txBox="1"/>
+          <p:nvPr/>
+        </p:nvSpPr>
+        <p:spPr>
+          <a:xfrm>
+            <a:off x="20777200" y="27180155"/>
+            <a:ext cx="4089400" cy="584775"/>
+          </a:xfrm>
+          <a:prstGeom prst="rect">
+            <a:avLst/>
+          </a:prstGeom>
+          <a:noFill/>
+        </p:spPr>
+        <p:txBody>
+          <a:bodyPr wrap="square" rtlCol="0">
+            <a:spAutoFit/>
+          </a:bodyPr>
+          <a:lstStyle/>
+          <a:p>
+            <a:r>
+              <a:rPr lang="en-US" sz="3200" dirty="0"/>
+              <a:t>Health Class</a:t>
+            </a:r>
+          </a:p>
+        </p:txBody>
+      </p:sp>
+      <p:sp>
+        <p:nvSpPr>
+          <p:cNvPr id="84" name="TextBox 83">
+            <a:extLst>
+              <a:ext uri="{FF2B5EF4-FFF2-40B4-BE49-F238E27FC236}">
+                <a16:creationId xmlns:a16="http://schemas.microsoft.com/office/drawing/2014/main" id="{6BFB4B3F-1A61-41CD-861F-14EAB451E689}"/>
+              </a:ext>
+            </a:extLst>
+          </p:cNvPr>
+          <p:cNvSpPr txBox="1"/>
+          <p:nvPr/>
+        </p:nvSpPr>
+        <p:spPr>
+          <a:xfrm rot="16200000">
+            <a:off x="14966843" y="23703538"/>
+            <a:ext cx="4898463" cy="1077218"/>
+          </a:xfrm>
+          <a:prstGeom prst="rect">
+            <a:avLst/>
+          </a:prstGeom>
+          <a:solidFill>
+            <a:schemeClr val="bg1"/>
+          </a:solidFill>
+        </p:spPr>
+        <p:txBody>
+          <a:bodyPr wrap="square" rtlCol="0">
+            <a:spAutoFit/>
+          </a:bodyPr>
+          <a:lstStyle/>
+          <a:p>
+            <a:pPr algn="ctr"/>
+            <a:r>
+              <a:rPr lang="en-US" sz="3200" dirty="0"/>
+              <a:t>Number of individuals in each health class </a:t>
+            </a:r>
+          </a:p>
+        </p:txBody>
+      </p:sp>
+      <p:pic>
+        <p:nvPicPr>
+          <p:cNvPr id="90" name="Picture 89">
+            <a:extLst>
+              <a:ext uri="{FF2B5EF4-FFF2-40B4-BE49-F238E27FC236}">
+                <a16:creationId xmlns:a16="http://schemas.microsoft.com/office/drawing/2014/main" id="{BFFA3DD1-7DCD-458B-AD52-D527A9717118}"/>
+              </a:ext>
+            </a:extLst>
+          </p:cNvPr>
+          <p:cNvPicPr>
+            <a:picLocks noChangeAspect="1"/>
           </p:cNvPicPr>
           <p:nvPr/>
         </p:nvPicPr>
         <p:blipFill>
-          <a:blip r:embed="rId25">
+          <a:blip r:embed="rId26" cstate="print">
             <a:extLst>
               <a:ext uri="{28A0092B-C50C-407E-A947-70E740481C1C}">
                 <a14:useLocalDpi xmlns:a14="http://schemas.microsoft.com/office/drawing/2010/main" val="0"/>
               </a:ext>
             </a:extLst>
           </a:blip>
-          <a:srcRect/>
           <a:stretch>
             <a:fillRect/>
           </a:stretch>
         </p:blipFill>
-        <p:spPr bwMode="auto">
+        <p:spPr>
           <a:xfrm>
-            <a:off x="42011872" y="5213289"/>
-            <a:ext cx="1381215" cy="1381215"/>
+            <a:off x="39573448" y="5080091"/>
+            <a:ext cx="2033941" cy="2033941"/>
           </a:xfrm>
           <a:prstGeom prst="rect">
             <a:avLst/>
           </a:prstGeom>
-          <a:noFill/>
-          <a:extLst>
-            <a:ext uri="{909E8E84-426E-40DD-AFC4-6F175D3DCCD1}">
-              <a14:hiddenFill xmlns:a14="http://schemas.microsoft.com/office/drawing/2010/main">
-                <a:solidFill>
-                  <a:srgbClr val="FFFFFF"/>
-                </a:solidFill>
-              </a14:hiddenFill>
-            </a:ext>
-          </a:extLst>
         </p:spPr>
       </p:pic>
     </p:spTree>
@@ -11438,6 +11540,81 @@
 </p:sld>
 </file>
 
+<file path=ppt/slides/slide4.xml><?xml version="1.0" encoding="utf-8"?>
+<p:sld xmlns:a="http://schemas.openxmlformats.org/drawingml/2006/main" xmlns:r="http://schemas.openxmlformats.org/officeDocument/2006/relationships" xmlns:p="http://schemas.openxmlformats.org/presentationml/2006/main">
+  <p:cSld>
+    <p:spTree>
+      <p:nvGrpSpPr>
+        <p:cNvPr id="1" name=""/>
+        <p:cNvGrpSpPr/>
+        <p:nvPr/>
+      </p:nvGrpSpPr>
+      <p:grpSpPr>
+        <a:xfrm>
+          <a:off x="0" y="0"/>
+          <a:ext cx="0" cy="0"/>
+          <a:chOff x="0" y="0"/>
+          <a:chExt cx="0" cy="0"/>
+        </a:xfrm>
+      </p:grpSpPr>
+      <p:pic>
+        <p:nvPicPr>
+          <p:cNvPr id="1026" name="Picture 2" descr="Image result for joshua tree silhouette">
+            <a:extLst>
+              <a:ext uri="{FF2B5EF4-FFF2-40B4-BE49-F238E27FC236}">
+                <a16:creationId xmlns:a16="http://schemas.microsoft.com/office/drawing/2014/main" id="{87495721-D5A3-4E32-9B77-AA634D3F3068}"/>
+              </a:ext>
+            </a:extLst>
+          </p:cNvPr>
+          <p:cNvPicPr>
+            <a:picLocks noChangeAspect="1" noChangeArrowheads="1"/>
+          </p:cNvPicPr>
+          <p:nvPr/>
+        </p:nvPicPr>
+        <p:blipFill rotWithShape="1">
+          <a:blip r:embed="rId2">
+            <a:extLst>
+              <a:ext uri="{28A0092B-C50C-407E-A947-70E740481C1C}">
+                <a14:useLocalDpi xmlns:a14="http://schemas.microsoft.com/office/drawing/2010/main" val="0"/>
+              </a:ext>
+            </a:extLst>
+          </a:blip>
+          <a:srcRect l="45263" t="34843" r="38737" b="28955"/>
+          <a:stretch/>
+        </p:blipFill>
+        <p:spPr bwMode="auto">
+          <a:xfrm>
+            <a:off x="14280682" y="12718582"/>
+            <a:ext cx="9981398" cy="11229074"/>
+          </a:xfrm>
+          <a:prstGeom prst="rect">
+            <a:avLst/>
+          </a:prstGeom>
+          <a:noFill/>
+          <a:extLst>
+            <a:ext uri="{909E8E84-426E-40DD-AFC4-6F175D3DCCD1}">
+              <a14:hiddenFill xmlns:a14="http://schemas.microsoft.com/office/drawing/2010/main">
+                <a:solidFill>
+                  <a:srgbClr val="FFFFFF"/>
+                </a:solidFill>
+              </a14:hiddenFill>
+            </a:ext>
+          </a:extLst>
+        </p:spPr>
+      </p:pic>
+    </p:spTree>
+    <p:extLst>
+      <p:ext uri="{BB962C8B-B14F-4D97-AF65-F5344CB8AC3E}">
+        <p14:creationId xmlns:p14="http://schemas.microsoft.com/office/powerpoint/2010/main" val="3298638915"/>
+      </p:ext>
+    </p:extLst>
+  </p:cSld>
+  <p:clrMapOvr>
+    <a:masterClrMapping/>
+  </p:clrMapOvr>
+</p:sld>
+</file>
+
 <file path=ppt/theme/theme1.xml><?xml version="1.0" encoding="utf-8"?>
 <a:theme xmlns:a="http://schemas.openxmlformats.org/drawingml/2006/main" name="Science Poster">
   <a:themeElements>

</xml_diff>

<commit_message>
Poster as ecological functionality improvements
</commit_message>
<xml_diff>
--- a/cactus_survey_poster.pptx
+++ b/cactus_survey_poster.pptx
@@ -218,7 +218,7 @@
           <a:p>
             <a:fld id="{F1C0B079-A316-4C9B-B165-DF9EA8325D2C}" type="datetimeFigureOut">
               <a:rPr lang="en-US" smtClean="0"/>
-              <a:t>3/29/2019</a:t>
+              <a:t>4/2/2019</a:t>
             </a:fld>
             <a:endParaRPr lang="en-US"/>
           </a:p>
@@ -383,7 +383,7 @@
           <a:p>
             <a:fld id="{38F28AB8-57D1-494F-9851-055AD867E790}" type="datetimeFigureOut">
               <a:rPr lang="en-US" smtClean="0"/>
-              <a:t>3/29/2019</a:t>
+              <a:t>4/2/2019</a:t>
             </a:fld>
             <a:endParaRPr lang="en-US"/>
           </a:p>
@@ -3672,7 +3672,7 @@
           <a:p>
             <a:fld id="{ECAA57DF-1C19-4726-AB84-014692BAD8F5}" type="datetimeFigureOut">
               <a:rPr lang="en-US" smtClean="0"/>
-              <a:t>3/29/2019</a:t>
+              <a:t>4/2/2019</a:t>
             </a:fld>
             <a:endParaRPr lang="en-US"/>
           </a:p>
@@ -4011,7 +4011,7 @@
             <a:fld id="{ECAA57DF-1C19-4726-AB84-014692BAD8F5}" type="datetimeFigureOut">
               <a:rPr lang="en-US" smtClean="0"/>
               <a:pPr/>
-              <a:t>3/29/2019</a:t>
+              <a:t>4/2/2019</a:t>
             </a:fld>
             <a:endParaRPr lang="en-US"/>
           </a:p>
@@ -4560,867 +4560,6 @@
           <a:chExt cx="0" cy="0"/>
         </a:xfrm>
       </p:grpSpPr>
-      <p:grpSp>
-        <p:nvGrpSpPr>
-          <p:cNvPr id="58" name="Group 57">
-            <a:extLst>
-              <a:ext uri="{FF2B5EF4-FFF2-40B4-BE49-F238E27FC236}">
-                <a16:creationId xmlns:a16="http://schemas.microsoft.com/office/drawing/2014/main" id="{1E42E7AA-587A-439E-9913-EA6A9C6E6913}"/>
-              </a:ext>
-            </a:extLst>
-          </p:cNvPr>
-          <p:cNvGrpSpPr/>
-          <p:nvPr/>
-        </p:nvGrpSpPr>
-        <p:grpSpPr>
-          <a:xfrm>
-            <a:off x="1204381" y="21347676"/>
-            <a:ext cx="12157254" cy="4871718"/>
-            <a:chOff x="5821394" y="8994270"/>
-            <a:chExt cx="36344149" cy="16639759"/>
-          </a:xfrm>
-        </p:grpSpPr>
-        <p:pic>
-          <p:nvPicPr>
-            <p:cNvPr id="59" name="Picture 4" descr="Image result for cactus silhouette">
-              <a:extLst>
-                <a:ext uri="{FF2B5EF4-FFF2-40B4-BE49-F238E27FC236}">
-                  <a16:creationId xmlns:a16="http://schemas.microsoft.com/office/drawing/2014/main" id="{75A655A4-4F99-4118-AC24-06751CDF9EA0}"/>
-                </a:ext>
-              </a:extLst>
-            </p:cNvPr>
-            <p:cNvPicPr>
-              <a:picLocks noChangeAspect="1" noChangeArrowheads="1"/>
-            </p:cNvPicPr>
-            <p:nvPr/>
-          </p:nvPicPr>
-          <p:blipFill rotWithShape="1">
-            <a:blip r:embed="rId3">
-              <a:extLst>
-                <a:ext uri="{28A0092B-C50C-407E-A947-70E740481C1C}">
-                  <a14:useLocalDpi xmlns:a14="http://schemas.microsoft.com/office/drawing/2010/main" val="0"/>
-                </a:ext>
-              </a:extLst>
-            </a:blip>
-            <a:srcRect l="30084" r="26093"/>
-            <a:stretch/>
-          </p:blipFill>
-          <p:spPr bwMode="auto">
-            <a:xfrm>
-              <a:off x="35241326" y="18038680"/>
-              <a:ext cx="5078423" cy="7038747"/>
-            </a:xfrm>
-            <a:prstGeom prst="rect">
-              <a:avLst/>
-            </a:prstGeom>
-            <a:noFill/>
-            <a:extLst>
-              <a:ext uri="{909E8E84-426E-40DD-AFC4-6F175D3DCCD1}">
-                <a14:hiddenFill xmlns:a14="http://schemas.microsoft.com/office/drawing/2010/main">
-                  <a:solidFill>
-                    <a:srgbClr val="FFFFFF"/>
-                  </a:solidFill>
-                </a14:hiddenFill>
-              </a:ext>
-            </a:extLst>
-          </p:spPr>
-        </p:pic>
-        <p:pic>
-          <p:nvPicPr>
-            <p:cNvPr id="60" name="Picture 4" descr="Image result for cactus silhouette">
-              <a:extLst>
-                <a:ext uri="{FF2B5EF4-FFF2-40B4-BE49-F238E27FC236}">
-                  <a16:creationId xmlns:a16="http://schemas.microsoft.com/office/drawing/2014/main" id="{CAD5A05A-E345-4A98-9BAA-E7C89F48170B}"/>
-                </a:ext>
-              </a:extLst>
-            </p:cNvPr>
-            <p:cNvPicPr>
-              <a:picLocks noChangeAspect="1" noChangeArrowheads="1"/>
-            </p:cNvPicPr>
-            <p:nvPr/>
-          </p:nvPicPr>
-          <p:blipFill rotWithShape="1">
-            <a:blip r:embed="rId3">
-              <a:extLst>
-                <a:ext uri="{28A0092B-C50C-407E-A947-70E740481C1C}">
-                  <a14:useLocalDpi xmlns:a14="http://schemas.microsoft.com/office/drawing/2010/main" val="0"/>
-                </a:ext>
-              </a:extLst>
-            </a:blip>
-            <a:srcRect l="30084" r="26093"/>
-            <a:stretch/>
-          </p:blipFill>
-          <p:spPr bwMode="auto">
-            <a:xfrm flipH="1">
-              <a:off x="8481182" y="17236466"/>
-              <a:ext cx="5280431" cy="8019226"/>
-            </a:xfrm>
-            <a:prstGeom prst="rect">
-              <a:avLst/>
-            </a:prstGeom>
-            <a:noFill/>
-            <a:extLst>
-              <a:ext uri="{909E8E84-426E-40DD-AFC4-6F175D3DCCD1}">
-                <a14:hiddenFill xmlns:a14="http://schemas.microsoft.com/office/drawing/2010/main">
-                  <a:solidFill>
-                    <a:srgbClr val="FFFFFF"/>
-                  </a:solidFill>
-                </a14:hiddenFill>
-              </a:ext>
-            </a:extLst>
-          </p:spPr>
-        </p:pic>
-        <p:pic>
-          <p:nvPicPr>
-            <p:cNvPr id="61" name="Picture 4" descr="Image result for cactus silhouette">
-              <a:extLst>
-                <a:ext uri="{FF2B5EF4-FFF2-40B4-BE49-F238E27FC236}">
-                  <a16:creationId xmlns:a16="http://schemas.microsoft.com/office/drawing/2014/main" id="{BE6CCFB9-BF1D-4CA5-9364-D5C91DCB3990}"/>
-                </a:ext>
-              </a:extLst>
-            </p:cNvPr>
-            <p:cNvPicPr>
-              <a:picLocks noChangeAspect="1" noChangeArrowheads="1"/>
-            </p:cNvPicPr>
-            <p:nvPr/>
-          </p:nvPicPr>
-          <p:blipFill rotWithShape="1">
-            <a:blip r:embed="rId3">
-              <a:extLst>
-                <a:ext uri="{28A0092B-C50C-407E-A947-70E740481C1C}">
-                  <a14:useLocalDpi xmlns:a14="http://schemas.microsoft.com/office/drawing/2010/main" val="0"/>
-                </a:ext>
-              </a:extLst>
-            </a:blip>
-            <a:srcRect l="30084" r="26093"/>
-            <a:stretch/>
-          </p:blipFill>
-          <p:spPr bwMode="auto">
-            <a:xfrm>
-              <a:off x="20992291" y="10791412"/>
-              <a:ext cx="7100109" cy="14842617"/>
-            </a:xfrm>
-            <a:prstGeom prst="rect">
-              <a:avLst/>
-            </a:prstGeom>
-            <a:noFill/>
-            <a:extLst>
-              <a:ext uri="{909E8E84-426E-40DD-AFC4-6F175D3DCCD1}">
-                <a14:hiddenFill xmlns:a14="http://schemas.microsoft.com/office/drawing/2010/main">
-                  <a:solidFill>
-                    <a:srgbClr val="FFFFFF"/>
-                  </a:solidFill>
-                </a14:hiddenFill>
-              </a:ext>
-            </a:extLst>
-          </p:spPr>
-        </p:pic>
-        <p:pic>
-          <p:nvPicPr>
-            <p:cNvPr id="62" name="Picture 12" descr="Image result for flower clipart">
-              <a:extLst>
-                <a:ext uri="{FF2B5EF4-FFF2-40B4-BE49-F238E27FC236}">
-                  <a16:creationId xmlns:a16="http://schemas.microsoft.com/office/drawing/2014/main" id="{6CD2D87F-C90B-42D2-B5D6-21EF7CE4204B}"/>
-                </a:ext>
-              </a:extLst>
-            </p:cNvPr>
-            <p:cNvPicPr>
-              <a:picLocks noChangeAspect="1" noChangeArrowheads="1"/>
-            </p:cNvPicPr>
-            <p:nvPr/>
-          </p:nvPicPr>
-          <p:blipFill>
-            <a:blip r:embed="rId4" cstate="print">
-              <a:extLst>
-                <a:ext uri="{28A0092B-C50C-407E-A947-70E740481C1C}">
-                  <a14:useLocalDpi xmlns:a14="http://schemas.microsoft.com/office/drawing/2010/main" val="0"/>
-                </a:ext>
-              </a:extLst>
-            </a:blip>
-            <a:srcRect/>
-            <a:stretch>
-              <a:fillRect/>
-            </a:stretch>
-          </p:blipFill>
-          <p:spPr bwMode="auto">
-            <a:xfrm rot="1996164">
-              <a:off x="10864393" y="16748024"/>
-              <a:ext cx="2309058" cy="2288240"/>
-            </a:xfrm>
-            <a:prstGeom prst="rect">
-              <a:avLst/>
-            </a:prstGeom>
-            <a:noFill/>
-            <a:extLst>
-              <a:ext uri="{909E8E84-426E-40DD-AFC4-6F175D3DCCD1}">
-                <a14:hiddenFill xmlns:a14="http://schemas.microsoft.com/office/drawing/2010/main">
-                  <a:solidFill>
-                    <a:srgbClr val="FFFFFF"/>
-                  </a:solidFill>
-                </a14:hiddenFill>
-              </a:ext>
-            </a:extLst>
-          </p:spPr>
-        </p:pic>
-        <p:pic>
-          <p:nvPicPr>
-            <p:cNvPr id="63" name="Picture 12" descr="Image result for flower clipart">
-              <a:extLst>
-                <a:ext uri="{FF2B5EF4-FFF2-40B4-BE49-F238E27FC236}">
-                  <a16:creationId xmlns:a16="http://schemas.microsoft.com/office/drawing/2014/main" id="{D59B8A41-4E02-46B9-8997-4B197DBEC0B6}"/>
-                </a:ext>
-              </a:extLst>
-            </p:cNvPr>
-            <p:cNvPicPr>
-              <a:picLocks noChangeAspect="1" noChangeArrowheads="1"/>
-            </p:cNvPicPr>
-            <p:nvPr/>
-          </p:nvPicPr>
-          <p:blipFill>
-            <a:blip r:embed="rId4" cstate="print">
-              <a:extLst>
-                <a:ext uri="{28A0092B-C50C-407E-A947-70E740481C1C}">
-                  <a14:useLocalDpi xmlns:a14="http://schemas.microsoft.com/office/drawing/2010/main" val="0"/>
-                </a:ext>
-              </a:extLst>
-            </a:blip>
-            <a:srcRect/>
-            <a:stretch>
-              <a:fillRect/>
-            </a:stretch>
-          </p:blipFill>
-          <p:spPr bwMode="auto">
-            <a:xfrm rot="2688639">
-              <a:off x="36764403" y="18957840"/>
-              <a:ext cx="2309057" cy="2288239"/>
-            </a:xfrm>
-            <a:prstGeom prst="rect">
-              <a:avLst/>
-            </a:prstGeom>
-            <a:noFill/>
-            <a:extLst>
-              <a:ext uri="{909E8E84-426E-40DD-AFC4-6F175D3DCCD1}">
-                <a14:hiddenFill xmlns:a14="http://schemas.microsoft.com/office/drawing/2010/main">
-                  <a:solidFill>
-                    <a:srgbClr val="FFFFFF"/>
-                  </a:solidFill>
-                </a14:hiddenFill>
-              </a:ext>
-            </a:extLst>
-          </p:spPr>
-        </p:pic>
-        <p:pic>
-          <p:nvPicPr>
-            <p:cNvPr id="64" name="Picture 12" descr="Image result for flower clipart">
-              <a:extLst>
-                <a:ext uri="{FF2B5EF4-FFF2-40B4-BE49-F238E27FC236}">
-                  <a16:creationId xmlns:a16="http://schemas.microsoft.com/office/drawing/2014/main" id="{F8C8F102-BFC9-4284-8D86-A5832EC4D72C}"/>
-                </a:ext>
-              </a:extLst>
-            </p:cNvPr>
-            <p:cNvPicPr>
-              <a:picLocks noChangeAspect="1" noChangeArrowheads="1"/>
-            </p:cNvPicPr>
-            <p:nvPr/>
-          </p:nvPicPr>
-          <p:blipFill>
-            <a:blip r:embed="rId4" cstate="print">
-              <a:extLst>
-                <a:ext uri="{28A0092B-C50C-407E-A947-70E740481C1C}">
-                  <a14:useLocalDpi xmlns:a14="http://schemas.microsoft.com/office/drawing/2010/main" val="0"/>
-                </a:ext>
-              </a:extLst>
-            </a:blip>
-            <a:srcRect/>
-            <a:stretch>
-              <a:fillRect/>
-            </a:stretch>
-          </p:blipFill>
-          <p:spPr bwMode="auto">
-            <a:xfrm rot="1996164">
-              <a:off x="21430701" y="10425562"/>
-              <a:ext cx="2309058" cy="2288240"/>
-            </a:xfrm>
-            <a:prstGeom prst="rect">
-              <a:avLst/>
-            </a:prstGeom>
-            <a:noFill/>
-            <a:extLst>
-              <a:ext uri="{909E8E84-426E-40DD-AFC4-6F175D3DCCD1}">
-                <a14:hiddenFill xmlns:a14="http://schemas.microsoft.com/office/drawing/2010/main">
-                  <a:solidFill>
-                    <a:srgbClr val="FFFFFF"/>
-                  </a:solidFill>
-                </a14:hiddenFill>
-              </a:ext>
-            </a:extLst>
-          </p:spPr>
-        </p:pic>
-        <p:pic>
-          <p:nvPicPr>
-            <p:cNvPr id="65" name="Picture 12" descr="Image result for flower clipart">
-              <a:extLst>
-                <a:ext uri="{FF2B5EF4-FFF2-40B4-BE49-F238E27FC236}">
-                  <a16:creationId xmlns:a16="http://schemas.microsoft.com/office/drawing/2014/main" id="{4F04AB48-2DBC-47E2-80CF-B04C53777B8D}"/>
-                </a:ext>
-              </a:extLst>
-            </p:cNvPr>
-            <p:cNvPicPr>
-              <a:picLocks noChangeAspect="1" noChangeArrowheads="1"/>
-            </p:cNvPicPr>
-            <p:nvPr/>
-          </p:nvPicPr>
-          <p:blipFill>
-            <a:blip r:embed="rId5" cstate="print">
-              <a:extLst>
-                <a:ext uri="{28A0092B-C50C-407E-A947-70E740481C1C}">
-                  <a14:useLocalDpi xmlns:a14="http://schemas.microsoft.com/office/drawing/2010/main" val="0"/>
-                </a:ext>
-              </a:extLst>
-            </a:blip>
-            <a:srcRect/>
-            <a:stretch>
-              <a:fillRect/>
-            </a:stretch>
-          </p:blipFill>
-          <p:spPr bwMode="auto">
-            <a:xfrm rot="16973761">
-              <a:off x="36034342" y="17367892"/>
-              <a:ext cx="2309058" cy="2288240"/>
-            </a:xfrm>
-            <a:prstGeom prst="rect">
-              <a:avLst/>
-            </a:prstGeom>
-            <a:noFill/>
-            <a:extLst>
-              <a:ext uri="{909E8E84-426E-40DD-AFC4-6F175D3DCCD1}">
-                <a14:hiddenFill xmlns:a14="http://schemas.microsoft.com/office/drawing/2010/main">
-                  <a:solidFill>
-                    <a:srgbClr val="FFFFFF"/>
-                  </a:solidFill>
-                </a14:hiddenFill>
-              </a:ext>
-            </a:extLst>
-          </p:spPr>
-        </p:pic>
-        <p:pic>
-          <p:nvPicPr>
-            <p:cNvPr id="66" name="Picture 12" descr="Image result for flower clipart">
-              <a:extLst>
-                <a:ext uri="{FF2B5EF4-FFF2-40B4-BE49-F238E27FC236}">
-                  <a16:creationId xmlns:a16="http://schemas.microsoft.com/office/drawing/2014/main" id="{B1BD477D-7142-4F5C-8FDD-96984877EDFF}"/>
-                </a:ext>
-              </a:extLst>
-            </p:cNvPr>
-            <p:cNvPicPr>
-              <a:picLocks noChangeAspect="1" noChangeArrowheads="1"/>
-            </p:cNvPicPr>
-            <p:nvPr/>
-          </p:nvPicPr>
-          <p:blipFill>
-            <a:blip r:embed="rId4" cstate="print">
-              <a:extLst>
-                <a:ext uri="{28A0092B-C50C-407E-A947-70E740481C1C}">
-                  <a14:useLocalDpi xmlns:a14="http://schemas.microsoft.com/office/drawing/2010/main" val="0"/>
-                </a:ext>
-              </a:extLst>
-            </a:blip>
-            <a:srcRect/>
-            <a:stretch>
-              <a:fillRect/>
-            </a:stretch>
-          </p:blipFill>
-          <p:spPr bwMode="auto">
-            <a:xfrm rot="1320354">
-              <a:off x="34363585" y="19380253"/>
-              <a:ext cx="2309058" cy="2288240"/>
-            </a:xfrm>
-            <a:prstGeom prst="rect">
-              <a:avLst/>
-            </a:prstGeom>
-            <a:noFill/>
-            <a:extLst>
-              <a:ext uri="{909E8E84-426E-40DD-AFC4-6F175D3DCCD1}">
-                <a14:hiddenFill xmlns:a14="http://schemas.microsoft.com/office/drawing/2010/main">
-                  <a:solidFill>
-                    <a:srgbClr val="FFFFFF"/>
-                  </a:solidFill>
-                </a14:hiddenFill>
-              </a:ext>
-            </a:extLst>
-          </p:spPr>
-        </p:pic>
-        <p:pic>
-          <p:nvPicPr>
-            <p:cNvPr id="72" name="Picture 12" descr="Image result for flower clipart">
-              <a:extLst>
-                <a:ext uri="{FF2B5EF4-FFF2-40B4-BE49-F238E27FC236}">
-                  <a16:creationId xmlns:a16="http://schemas.microsoft.com/office/drawing/2014/main" id="{9EA6C931-FA2A-4746-855E-9D594FA963C0}"/>
-                </a:ext>
-              </a:extLst>
-            </p:cNvPr>
-            <p:cNvPicPr>
-              <a:picLocks noChangeAspect="1" noChangeArrowheads="1"/>
-            </p:cNvPicPr>
-            <p:nvPr/>
-          </p:nvPicPr>
-          <p:blipFill>
-            <a:blip r:embed="rId4" cstate="print">
-              <a:extLst>
-                <a:ext uri="{28A0092B-C50C-407E-A947-70E740481C1C}">
-                  <a14:useLocalDpi xmlns:a14="http://schemas.microsoft.com/office/drawing/2010/main" val="0"/>
-                </a:ext>
-              </a:extLst>
-            </a:blip>
-            <a:srcRect/>
-            <a:stretch>
-              <a:fillRect/>
-            </a:stretch>
-          </p:blipFill>
-          <p:spPr bwMode="auto">
-            <a:xfrm rot="388776">
-              <a:off x="34496403" y="17423373"/>
-              <a:ext cx="2309058" cy="2288240"/>
-            </a:xfrm>
-            <a:prstGeom prst="rect">
-              <a:avLst/>
-            </a:prstGeom>
-            <a:noFill/>
-            <a:extLst>
-              <a:ext uri="{909E8E84-426E-40DD-AFC4-6F175D3DCCD1}">
-                <a14:hiddenFill xmlns:a14="http://schemas.microsoft.com/office/drawing/2010/main">
-                  <a:solidFill>
-                    <a:srgbClr val="FFFFFF"/>
-                  </a:solidFill>
-                </a14:hiddenFill>
-              </a:ext>
-            </a:extLst>
-          </p:spPr>
-        </p:pic>
-        <p:pic>
-          <p:nvPicPr>
-            <p:cNvPr id="74" name="Picture 12" descr="Image result for flower clipart">
-              <a:extLst>
-                <a:ext uri="{FF2B5EF4-FFF2-40B4-BE49-F238E27FC236}">
-                  <a16:creationId xmlns:a16="http://schemas.microsoft.com/office/drawing/2014/main" id="{0BC266BE-964B-47E5-8314-3865E988DF93}"/>
-                </a:ext>
-              </a:extLst>
-            </p:cNvPr>
-            <p:cNvPicPr>
-              <a:picLocks noChangeAspect="1" noChangeArrowheads="1"/>
-            </p:cNvPicPr>
-            <p:nvPr/>
-          </p:nvPicPr>
-          <p:blipFill>
-            <a:blip r:embed="rId5" cstate="print">
-              <a:extLst>
-                <a:ext uri="{28A0092B-C50C-407E-A947-70E740481C1C}">
-                  <a14:useLocalDpi xmlns:a14="http://schemas.microsoft.com/office/drawing/2010/main" val="0"/>
-                </a:ext>
-              </a:extLst>
-            </a:blip>
-            <a:srcRect/>
-            <a:stretch>
-              <a:fillRect/>
-            </a:stretch>
-          </p:blipFill>
-          <p:spPr bwMode="auto">
-            <a:xfrm rot="2824274">
-              <a:off x="25344932" y="15478654"/>
-              <a:ext cx="2309058" cy="2288240"/>
-            </a:xfrm>
-            <a:prstGeom prst="rect">
-              <a:avLst/>
-            </a:prstGeom>
-            <a:noFill/>
-            <a:extLst>
-              <a:ext uri="{909E8E84-426E-40DD-AFC4-6F175D3DCCD1}">
-                <a14:hiddenFill xmlns:a14="http://schemas.microsoft.com/office/drawing/2010/main">
-                  <a:solidFill>
-                    <a:srgbClr val="FFFFFF"/>
-                  </a:solidFill>
-                </a14:hiddenFill>
-              </a:ext>
-            </a:extLst>
-          </p:spPr>
-        </p:pic>
-        <p:pic>
-          <p:nvPicPr>
-            <p:cNvPr id="75" name="Picture 12" descr="Image result for flower clipart">
-              <a:extLst>
-                <a:ext uri="{FF2B5EF4-FFF2-40B4-BE49-F238E27FC236}">
-                  <a16:creationId xmlns:a16="http://schemas.microsoft.com/office/drawing/2014/main" id="{BAD288EE-48CE-444E-9F8C-1EA7500843B4}"/>
-                </a:ext>
-              </a:extLst>
-            </p:cNvPr>
-            <p:cNvPicPr>
-              <a:picLocks noChangeAspect="1" noChangeArrowheads="1"/>
-            </p:cNvPicPr>
-            <p:nvPr/>
-          </p:nvPicPr>
-          <p:blipFill>
-            <a:blip r:embed="rId4" cstate="print">
-              <a:extLst>
-                <a:ext uri="{28A0092B-C50C-407E-A947-70E740481C1C}">
-                  <a14:useLocalDpi xmlns:a14="http://schemas.microsoft.com/office/drawing/2010/main" val="0"/>
-                </a:ext>
-              </a:extLst>
-            </a:blip>
-            <a:srcRect/>
-            <a:stretch>
-              <a:fillRect/>
-            </a:stretch>
-          </p:blipFill>
-          <p:spPr bwMode="auto">
-            <a:xfrm rot="21203234">
-              <a:off x="38218947" y="19927917"/>
-              <a:ext cx="2309058" cy="2288240"/>
-            </a:xfrm>
-            <a:prstGeom prst="rect">
-              <a:avLst/>
-            </a:prstGeom>
-            <a:noFill/>
-            <a:extLst>
-              <a:ext uri="{909E8E84-426E-40DD-AFC4-6F175D3DCCD1}">
-                <a14:hiddenFill xmlns:a14="http://schemas.microsoft.com/office/drawing/2010/main">
-                  <a:solidFill>
-                    <a:srgbClr val="FFFFFF"/>
-                  </a:solidFill>
-                </a14:hiddenFill>
-              </a:ext>
-            </a:extLst>
-          </p:spPr>
-        </p:pic>
-        <p:pic>
-          <p:nvPicPr>
-            <p:cNvPr id="77" name="Picture 2" descr="Image result for hummingbird silhouette">
-              <a:extLst>
-                <a:ext uri="{FF2B5EF4-FFF2-40B4-BE49-F238E27FC236}">
-                  <a16:creationId xmlns:a16="http://schemas.microsoft.com/office/drawing/2014/main" id="{5D59A5DF-FDDE-4A27-9EDB-CB6E3011DF38}"/>
-                </a:ext>
-              </a:extLst>
-            </p:cNvPr>
-            <p:cNvPicPr>
-              <a:picLocks noChangeAspect="1" noChangeArrowheads="1"/>
-            </p:cNvPicPr>
-            <p:nvPr/>
-          </p:nvPicPr>
-          <p:blipFill>
-            <a:blip r:embed="rId6" cstate="print">
-              <a:extLst>
-                <a:ext uri="{28A0092B-C50C-407E-A947-70E740481C1C}">
-                  <a14:useLocalDpi xmlns:a14="http://schemas.microsoft.com/office/drawing/2010/main" val="0"/>
-                </a:ext>
-              </a:extLst>
-            </a:blip>
-            <a:srcRect/>
-            <a:stretch>
-              <a:fillRect/>
-            </a:stretch>
-          </p:blipFill>
-          <p:spPr bwMode="auto">
-            <a:xfrm rot="2792186" flipH="1">
-              <a:off x="17656426" y="9903826"/>
-              <a:ext cx="3878302" cy="2245095"/>
-            </a:xfrm>
-            <a:prstGeom prst="rect">
-              <a:avLst/>
-            </a:prstGeom>
-            <a:noFill/>
-            <a:extLst>
-              <a:ext uri="{909E8E84-426E-40DD-AFC4-6F175D3DCCD1}">
-                <a14:hiddenFill xmlns:a14="http://schemas.microsoft.com/office/drawing/2010/main">
-                  <a:solidFill>
-                    <a:srgbClr val="FFFFFF"/>
-                  </a:solidFill>
-                </a14:hiddenFill>
-              </a:ext>
-            </a:extLst>
-          </p:spPr>
-        </p:pic>
-        <p:pic>
-          <p:nvPicPr>
-            <p:cNvPr id="78" name="Picture 2" descr="Image result for hummingbird silhouette">
-              <a:extLst>
-                <a:ext uri="{FF2B5EF4-FFF2-40B4-BE49-F238E27FC236}">
-                  <a16:creationId xmlns:a16="http://schemas.microsoft.com/office/drawing/2014/main" id="{FB0ADC6C-ED86-4344-A35D-0696CCBE6CA5}"/>
-                </a:ext>
-              </a:extLst>
-            </p:cNvPr>
-            <p:cNvPicPr>
-              <a:picLocks noChangeAspect="1" noChangeArrowheads="1"/>
-            </p:cNvPicPr>
-            <p:nvPr/>
-          </p:nvPicPr>
-          <p:blipFill>
-            <a:blip r:embed="rId7" cstate="print">
-              <a:extLst>
-                <a:ext uri="{28A0092B-C50C-407E-A947-70E740481C1C}">
-                  <a14:useLocalDpi xmlns:a14="http://schemas.microsoft.com/office/drawing/2010/main" val="0"/>
-                </a:ext>
-              </a:extLst>
-            </a:blip>
-            <a:srcRect/>
-            <a:stretch>
-              <a:fillRect/>
-            </a:stretch>
-          </p:blipFill>
-          <p:spPr bwMode="auto">
-            <a:xfrm>
-              <a:off x="23126746" y="8994270"/>
-              <a:ext cx="3776007" cy="2245095"/>
-            </a:xfrm>
-            <a:prstGeom prst="rect">
-              <a:avLst/>
-            </a:prstGeom>
-            <a:noFill/>
-            <a:extLst>
-              <a:ext uri="{909E8E84-426E-40DD-AFC4-6F175D3DCCD1}">
-                <a14:hiddenFill xmlns:a14="http://schemas.microsoft.com/office/drawing/2010/main">
-                  <a:solidFill>
-                    <a:srgbClr val="FFFFFF"/>
-                  </a:solidFill>
-                </a14:hiddenFill>
-              </a:ext>
-            </a:extLst>
-          </p:spPr>
-        </p:pic>
-        <p:pic>
-          <p:nvPicPr>
-            <p:cNvPr id="79" name="Picture 2" descr="Image result for hummingbird silhouette">
-              <a:extLst>
-                <a:ext uri="{FF2B5EF4-FFF2-40B4-BE49-F238E27FC236}">
-                  <a16:creationId xmlns:a16="http://schemas.microsoft.com/office/drawing/2014/main" id="{511F6452-572A-4300-A941-EE20ABCF10B8}"/>
-                </a:ext>
-              </a:extLst>
-            </p:cNvPr>
-            <p:cNvPicPr>
-              <a:picLocks noChangeAspect="1" noChangeArrowheads="1"/>
-            </p:cNvPicPr>
-            <p:nvPr/>
-          </p:nvPicPr>
-          <p:blipFill>
-            <a:blip r:embed="rId8" cstate="print">
-              <a:extLst>
-                <a:ext uri="{28A0092B-C50C-407E-A947-70E740481C1C}">
-                  <a14:useLocalDpi xmlns:a14="http://schemas.microsoft.com/office/drawing/2010/main" val="0"/>
-                </a:ext>
-              </a:extLst>
-            </a:blip>
-            <a:srcRect/>
-            <a:stretch>
-              <a:fillRect/>
-            </a:stretch>
-          </p:blipFill>
-          <p:spPr bwMode="auto">
-            <a:xfrm rot="20942693" flipH="1">
-              <a:off x="24912455" y="12753084"/>
-              <a:ext cx="3878302" cy="2245095"/>
-            </a:xfrm>
-            <a:prstGeom prst="rect">
-              <a:avLst/>
-            </a:prstGeom>
-            <a:noFill/>
-            <a:extLst>
-              <a:ext uri="{909E8E84-426E-40DD-AFC4-6F175D3DCCD1}">
-                <a14:hiddenFill xmlns:a14="http://schemas.microsoft.com/office/drawing/2010/main">
-                  <a:solidFill>
-                    <a:srgbClr val="FFFFFF"/>
-                  </a:solidFill>
-                </a14:hiddenFill>
-              </a:ext>
-            </a:extLst>
-          </p:spPr>
-        </p:pic>
-        <p:pic>
-          <p:nvPicPr>
-            <p:cNvPr id="80" name="Picture 2" descr="Image result for hummingbird silhouette">
-              <a:extLst>
-                <a:ext uri="{FF2B5EF4-FFF2-40B4-BE49-F238E27FC236}">
-                  <a16:creationId xmlns:a16="http://schemas.microsoft.com/office/drawing/2014/main" id="{F95424EE-BF9A-47B0-A8B3-9BA376D4A9BB}"/>
-                </a:ext>
-              </a:extLst>
-            </p:cNvPr>
-            <p:cNvPicPr>
-              <a:picLocks noChangeAspect="1" noChangeArrowheads="1"/>
-            </p:cNvPicPr>
-            <p:nvPr/>
-          </p:nvPicPr>
-          <p:blipFill>
-            <a:blip r:embed="rId9" cstate="print">
-              <a:extLst>
-                <a:ext uri="{28A0092B-C50C-407E-A947-70E740481C1C}">
-                  <a14:useLocalDpi xmlns:a14="http://schemas.microsoft.com/office/drawing/2010/main" val="0"/>
-                </a:ext>
-              </a:extLst>
-            </a:blip>
-            <a:srcRect/>
-            <a:stretch>
-              <a:fillRect/>
-            </a:stretch>
-          </p:blipFill>
-          <p:spPr bwMode="auto">
-            <a:xfrm rot="20985050">
-              <a:off x="38107277" y="17387396"/>
-              <a:ext cx="4058266" cy="2245095"/>
-            </a:xfrm>
-            <a:prstGeom prst="rect">
-              <a:avLst/>
-            </a:prstGeom>
-            <a:noFill/>
-            <a:extLst>
-              <a:ext uri="{909E8E84-426E-40DD-AFC4-6F175D3DCCD1}">
-                <a14:hiddenFill xmlns:a14="http://schemas.microsoft.com/office/drawing/2010/main">
-                  <a:solidFill>
-                    <a:srgbClr val="FFFFFF"/>
-                  </a:solidFill>
-                </a14:hiddenFill>
-              </a:ext>
-            </a:extLst>
-          </p:spPr>
-        </p:pic>
-        <p:pic>
-          <p:nvPicPr>
-            <p:cNvPr id="81" name="Picture 2" descr="Image result for hummingbird silhouette">
-              <a:extLst>
-                <a:ext uri="{FF2B5EF4-FFF2-40B4-BE49-F238E27FC236}">
-                  <a16:creationId xmlns:a16="http://schemas.microsoft.com/office/drawing/2014/main" id="{6B898C74-7611-4224-8CA4-08FFAE0863C5}"/>
-                </a:ext>
-              </a:extLst>
-            </p:cNvPr>
-            <p:cNvPicPr>
-              <a:picLocks noChangeAspect="1" noChangeArrowheads="1"/>
-            </p:cNvPicPr>
-            <p:nvPr/>
-          </p:nvPicPr>
-          <p:blipFill>
-            <a:blip r:embed="rId8" cstate="print">
-              <a:extLst>
-                <a:ext uri="{28A0092B-C50C-407E-A947-70E740481C1C}">
-                  <a14:useLocalDpi xmlns:a14="http://schemas.microsoft.com/office/drawing/2010/main" val="0"/>
-                </a:ext>
-              </a:extLst>
-            </a:blip>
-            <a:srcRect/>
-            <a:stretch>
-              <a:fillRect/>
-            </a:stretch>
-          </p:blipFill>
-          <p:spPr bwMode="auto">
-            <a:xfrm rot="873617" flipH="1">
-              <a:off x="32435513" y="18247369"/>
-              <a:ext cx="3878302" cy="2245095"/>
-            </a:xfrm>
-            <a:prstGeom prst="rect">
-              <a:avLst/>
-            </a:prstGeom>
-            <a:noFill/>
-            <a:extLst>
-              <a:ext uri="{909E8E84-426E-40DD-AFC4-6F175D3DCCD1}">
-                <a14:hiddenFill xmlns:a14="http://schemas.microsoft.com/office/drawing/2010/main">
-                  <a:solidFill>
-                    <a:srgbClr val="FFFFFF"/>
-                  </a:solidFill>
-                </a14:hiddenFill>
-              </a:ext>
-            </a:extLst>
-          </p:spPr>
-        </p:pic>
-        <p:pic>
-          <p:nvPicPr>
-            <p:cNvPr id="82" name="Picture 2" descr="Image result for hummingbird silhouette">
-              <a:extLst>
-                <a:ext uri="{FF2B5EF4-FFF2-40B4-BE49-F238E27FC236}">
-                  <a16:creationId xmlns:a16="http://schemas.microsoft.com/office/drawing/2014/main" id="{FF7CA620-5249-4576-9E6C-C5886309B5CB}"/>
-                </a:ext>
-              </a:extLst>
-            </p:cNvPr>
-            <p:cNvPicPr>
-              <a:picLocks noChangeAspect="1" noChangeArrowheads="1"/>
-            </p:cNvPicPr>
-            <p:nvPr/>
-          </p:nvPicPr>
-          <p:blipFill>
-            <a:blip r:embed="rId10" cstate="print">
-              <a:extLst>
-                <a:ext uri="{28A0092B-C50C-407E-A947-70E740481C1C}">
-                  <a14:useLocalDpi xmlns:a14="http://schemas.microsoft.com/office/drawing/2010/main" val="0"/>
-                </a:ext>
-              </a:extLst>
-            </a:blip>
-            <a:srcRect/>
-            <a:stretch>
-              <a:fillRect/>
-            </a:stretch>
-          </p:blipFill>
-          <p:spPr bwMode="auto">
-            <a:xfrm rot="19119069">
-              <a:off x="34905347" y="14574152"/>
-              <a:ext cx="3738524" cy="2245095"/>
-            </a:xfrm>
-            <a:prstGeom prst="rect">
-              <a:avLst/>
-            </a:prstGeom>
-            <a:noFill/>
-            <a:extLst>
-              <a:ext uri="{909E8E84-426E-40DD-AFC4-6F175D3DCCD1}">
-                <a14:hiddenFill xmlns:a14="http://schemas.microsoft.com/office/drawing/2010/main">
-                  <a:solidFill>
-                    <a:srgbClr val="FFFFFF"/>
-                  </a:solidFill>
-                </a14:hiddenFill>
-              </a:ext>
-            </a:extLst>
-          </p:spPr>
-        </p:pic>
-        <p:pic>
-          <p:nvPicPr>
-            <p:cNvPr id="83" name="Picture 2" descr="Image result for hummingbird silhouette">
-              <a:extLst>
-                <a:ext uri="{FF2B5EF4-FFF2-40B4-BE49-F238E27FC236}">
-                  <a16:creationId xmlns:a16="http://schemas.microsoft.com/office/drawing/2014/main" id="{EA7BA93A-BF87-403A-8319-6021BD41FA91}"/>
-                </a:ext>
-              </a:extLst>
-            </p:cNvPr>
-            <p:cNvPicPr>
-              <a:picLocks noChangeAspect="1" noChangeArrowheads="1"/>
-            </p:cNvPicPr>
-            <p:nvPr/>
-          </p:nvPicPr>
-          <p:blipFill>
-            <a:blip r:embed="rId8" cstate="print">
-              <a:extLst>
-                <a:ext uri="{28A0092B-C50C-407E-A947-70E740481C1C}">
-                  <a14:useLocalDpi xmlns:a14="http://schemas.microsoft.com/office/drawing/2010/main" val="0"/>
-                </a:ext>
-              </a:extLst>
-            </a:blip>
-            <a:srcRect/>
-            <a:stretch>
-              <a:fillRect/>
-            </a:stretch>
-          </p:blipFill>
-          <p:spPr bwMode="auto">
-            <a:xfrm rot="1143832" flipH="1">
-              <a:off x="5821394" y="17758037"/>
-              <a:ext cx="3878302" cy="2245095"/>
-            </a:xfrm>
-            <a:prstGeom prst="rect">
-              <a:avLst/>
-            </a:prstGeom>
-            <a:noFill/>
-            <a:extLst>
-              <a:ext uri="{909E8E84-426E-40DD-AFC4-6F175D3DCCD1}">
-                <a14:hiddenFill xmlns:a14="http://schemas.microsoft.com/office/drawing/2010/main">
-                  <a:solidFill>
-                    <a:srgbClr val="FFFFFF"/>
-                  </a:solidFill>
-                </a14:hiddenFill>
-              </a:ext>
-            </a:extLst>
-          </p:spPr>
-        </p:pic>
-      </p:grpSp>
       <p:sp>
         <p:nvSpPr>
           <p:cNvPr id="4" name="Title 3"/>
@@ -5547,7 +4686,7 @@
           <a:p>
             <a:r>
               <a:rPr lang="en-US" b="1" dirty="0"/>
-              <a:t>What measurable characteristics determine ecologically functional differences in three species of cacti?</a:t>
+              <a:t>What physiological characteristics determine ecologically functional differences in three species of cacti?</a:t>
             </a:r>
           </a:p>
         </p:txBody>
@@ -5685,7 +4824,7 @@
         </p:nvSpPr>
         <p:spPr>
           <a:xfrm>
-            <a:off x="1193470" y="29231234"/>
+            <a:off x="1193470" y="22326062"/>
             <a:ext cx="12801600" cy="2497147"/>
           </a:xfrm>
           <a:solidFill>
@@ -5717,7 +4856,15 @@
             </a:pPr>
             <a:r>
               <a:rPr lang="en-US" i="1" dirty="0"/>
-              <a:t>Different cactuses will have different sizes and health which impacts interactor visitation.</a:t>
+              <a:t>Different cactuses will have different sizes and health which will impact interactor visitation at different phenological </a:t>
+            </a:r>
+            <a:r>
+              <a:rPr lang="en-US" i="1" dirty="0" err="1"/>
+              <a:t>lifestages</a:t>
+            </a:r>
+            <a:r>
+              <a:rPr lang="en-US" i="1" dirty="0"/>
+              <a:t>.</a:t>
             </a:r>
           </a:p>
         </p:txBody>
@@ -5734,7 +4881,7 @@
         </p:nvSpPr>
         <p:spPr>
           <a:xfrm>
-            <a:off x="1193470" y="27805462"/>
+            <a:off x="1193470" y="20900290"/>
             <a:ext cx="12801600" cy="1219200"/>
           </a:xfrm>
         </p:spPr>
@@ -5892,7 +5039,7 @@
           <a:p>
             <a:r>
               <a:rPr lang="en-US" dirty="0"/>
-              <a:t>Conclusions/Future Research</a:t>
+              <a:t>Conclusions &amp; Future Research</a:t>
             </a:r>
           </a:p>
         </p:txBody>
@@ -6019,7 +5166,7 @@
             </a:r>
             <a:r>
               <a:rPr lang="en-US" sz="2200" dirty="0">
-                <a:hlinkClick r:id="rId11"/>
+                <a:hlinkClick r:id="rId3"/>
               </a:rPr>
               <a:t>10.1111/plb.12297</a:t>
             </a:r>
@@ -6071,7 +5218,7 @@
             </a:r>
             <a:r>
               <a:rPr lang="en-US" sz="2200" dirty="0">
-                <a:hlinkClick r:id="rId12"/>
+                <a:hlinkClick r:id="rId4"/>
               </a:rPr>
               <a:t>10.1080/0028825X.2004.9512892</a:t>
             </a:r>
@@ -6123,7 +5270,7 @@
             </a:r>
             <a:r>
               <a:rPr lang="en-US" sz="2200" dirty="0">
-                <a:hlinkClick r:id="rId13"/>
+                <a:hlinkClick r:id="rId5"/>
               </a:rPr>
               <a:t>10.1371/journal.pone.0044657</a:t>
             </a:r>
@@ -6233,7 +5380,7 @@
           <p:nvPr/>
         </p:nvPicPr>
         <p:blipFill>
-          <a:blip r:embed="rId14"/>
+          <a:blip r:embed="rId6"/>
           <a:stretch>
             <a:fillRect/>
           </a:stretch>
@@ -6263,7 +5410,7 @@
           <p:nvPr/>
         </p:nvPicPr>
         <p:blipFill>
-          <a:blip r:embed="rId14"/>
+          <a:blip r:embed="rId6"/>
           <a:stretch>
             <a:fillRect/>
           </a:stretch>
@@ -6293,7 +5440,7 @@
           <p:nvPr/>
         </p:nvPicPr>
         <p:blipFill>
-          <a:blip r:embed="rId14"/>
+          <a:blip r:embed="rId6"/>
           <a:stretch>
             <a:fillRect/>
           </a:stretch>
@@ -6323,7 +5470,7 @@
           <p:nvPr/>
         </p:nvPicPr>
         <p:blipFill>
-          <a:blip r:embed="rId14"/>
+          <a:blip r:embed="rId6"/>
           <a:stretch>
             <a:fillRect/>
           </a:stretch>
@@ -6353,7 +5500,7 @@
           <p:nvPr/>
         </p:nvPicPr>
         <p:blipFill>
-          <a:blip r:embed="rId14"/>
+          <a:blip r:embed="rId6"/>
           <a:stretch>
             <a:fillRect/>
           </a:stretch>
@@ -6383,7 +5530,7 @@
           <p:nvPr/>
         </p:nvPicPr>
         <p:blipFill>
-          <a:blip r:embed="rId14"/>
+          <a:blip r:embed="rId6"/>
           <a:stretch>
             <a:fillRect/>
           </a:stretch>
@@ -7263,7 +6410,7 @@
           </p:nvPr>
         </p:nvPicPr>
         <p:blipFill>
-          <a:blip r:embed="rId15" cstate="print">
+          <a:blip r:embed="rId7" cstate="print">
             <a:extLst>
               <a:ext uri="{28A0092B-C50C-407E-A947-70E740481C1C}">
                 <a14:useLocalDpi xmlns:a14="http://schemas.microsoft.com/office/drawing/2010/main" val="0"/>
@@ -7296,7 +6443,7 @@
         </p:nvSpPr>
         <p:spPr>
           <a:xfrm>
-            <a:off x="1309109" y="20179598"/>
+            <a:off x="1309109" y="19620798"/>
             <a:ext cx="14073738" cy="1200329"/>
           </a:xfrm>
           <a:prstGeom prst="rect">
@@ -7331,7 +6478,7 @@
         </p:nvGrpSpPr>
         <p:grpSpPr>
           <a:xfrm>
-            <a:off x="914983" y="15942433"/>
+            <a:off x="914983" y="15586833"/>
             <a:ext cx="13029617" cy="3954774"/>
             <a:chOff x="636797" y="13997983"/>
             <a:chExt cx="40777096" cy="12376742"/>
@@ -7352,7 +6499,7 @@
             <p:nvPr/>
           </p:nvPicPr>
           <p:blipFill rotWithShape="1">
-            <a:blip r:embed="rId3">
+            <a:blip r:embed="rId8">
               <a:extLst>
                 <a:ext uri="{28A0092B-C50C-407E-A947-70E740481C1C}">
                   <a14:useLocalDpi xmlns:a14="http://schemas.microsoft.com/office/drawing/2010/main" val="0"/>
@@ -7397,7 +6544,7 @@
             <p:nvPr/>
           </p:nvPicPr>
           <p:blipFill rotWithShape="1">
-            <a:blip r:embed="rId3">
+            <a:blip r:embed="rId8">
               <a:extLst>
                 <a:ext uri="{28A0092B-C50C-407E-A947-70E740481C1C}">
                   <a14:useLocalDpi xmlns:a14="http://schemas.microsoft.com/office/drawing/2010/main" val="0"/>
@@ -7442,7 +6589,7 @@
             <p:nvPr/>
           </p:nvPicPr>
           <p:blipFill rotWithShape="1">
-            <a:blip r:embed="rId3">
+            <a:blip r:embed="rId8">
               <a:extLst>
                 <a:ext uri="{28A0092B-C50C-407E-A947-70E740481C1C}">
                   <a14:useLocalDpi xmlns:a14="http://schemas.microsoft.com/office/drawing/2010/main" val="0"/>
@@ -7544,7 +6691,7 @@
             <p:nvPr/>
           </p:nvPicPr>
           <p:blipFill>
-            <a:blip r:embed="rId16" cstate="print">
+            <a:blip r:embed="rId9" cstate="print">
               <a:extLst>
                 <a:ext uri="{28A0092B-C50C-407E-A947-70E740481C1C}">
                   <a14:useLocalDpi xmlns:a14="http://schemas.microsoft.com/office/drawing/2010/main" val="0"/>
@@ -7591,7 +6738,7 @@
             <p:nvPr/>
           </p:nvPicPr>
           <p:blipFill>
-            <a:blip r:embed="rId17" cstate="print">
+            <a:blip r:embed="rId10" cstate="print">
               <a:extLst>
                 <a:ext uri="{28A0092B-C50C-407E-A947-70E740481C1C}">
                   <a14:useLocalDpi xmlns:a14="http://schemas.microsoft.com/office/drawing/2010/main" val="0"/>
@@ -7638,7 +6785,7 @@
             <p:nvPr/>
           </p:nvPicPr>
           <p:blipFill rotWithShape="1">
-            <a:blip r:embed="rId18" cstate="print">
+            <a:blip r:embed="rId11" cstate="print">
               <a:extLst>
                 <a:ext uri="{28A0092B-C50C-407E-A947-70E740481C1C}">
                   <a14:useLocalDpi xmlns:a14="http://schemas.microsoft.com/office/drawing/2010/main" val="0"/>
@@ -7683,7 +6830,7 @@
             <p:nvPr/>
           </p:nvPicPr>
           <p:blipFill>
-            <a:blip r:embed="rId19" cstate="print">
+            <a:blip r:embed="rId12" cstate="print">
               <a:extLst>
                 <a:ext uri="{28A0092B-C50C-407E-A947-70E740481C1C}">
                   <a14:useLocalDpi xmlns:a14="http://schemas.microsoft.com/office/drawing/2010/main" val="0"/>
@@ -7846,7 +6993,7 @@
             <p:nvPr/>
           </p:nvPicPr>
           <p:blipFill>
-            <a:blip r:embed="rId20" cstate="print">
+            <a:blip r:embed="rId13" cstate="print">
               <a:extLst>
                 <a:ext uri="{28A0092B-C50C-407E-A947-70E740481C1C}">
                   <a14:useLocalDpi xmlns:a14="http://schemas.microsoft.com/office/drawing/2010/main" val="0"/>
@@ -8121,7 +7268,7 @@
             <p:nvPr/>
           </p:nvPicPr>
           <p:blipFill>
-            <a:blip r:embed="rId21" cstate="print">
+            <a:blip r:embed="rId14" cstate="print">
               <a:extLst>
                 <a:ext uri="{28A0092B-C50C-407E-A947-70E740481C1C}">
                   <a14:useLocalDpi xmlns:a14="http://schemas.microsoft.com/office/drawing/2010/main" val="0"/>
@@ -8336,27 +7483,38 @@
         </p:nvSpPr>
         <p:spPr>
           <a:xfrm>
-            <a:off x="1102781" y="26723852"/>
-            <a:ext cx="12898083" cy="646331"/>
+            <a:off x="1097457" y="30742639"/>
+            <a:ext cx="13609145" cy="1200329"/>
           </a:xfrm>
           <a:prstGeom prst="rect">
             <a:avLst/>
           </a:prstGeom>
         </p:spPr>
         <p:txBody>
-          <a:bodyPr wrap="none">
+          <a:bodyPr wrap="square">
             <a:spAutoFit/>
           </a:bodyPr>
           <a:lstStyle/>
           <a:p>
             <a:r>
               <a:rPr lang="en-US" sz="3600" dirty="0"/>
-              <a:t>Figure 2: Nectarivores visit higher and showier floral displays.</a:t>
+              <a:t>Figure 2: Avian interactors visit higher and showier reproductive</a:t>
+            </a:r>
+          </a:p>
+          <a:p>
+            <a:r>
+              <a:rPr lang="en-US" sz="3600" dirty="0"/>
+              <a:t>displays.</a:t>
             </a:r>
             <a:r>
               <a:rPr lang="en-US" sz="3600" baseline="30000" dirty="0"/>
-              <a:t>7</a:t>
-            </a:r>
+              <a:t>7 </a:t>
+            </a:r>
+            <a:r>
+              <a:rPr lang="en-US" sz="3600" dirty="0"/>
+              <a:t>Do these characteristics differ between cactus species?</a:t>
+            </a:r>
+            <a:endParaRPr lang="en-US" sz="3600" baseline="30000" dirty="0"/>
           </a:p>
         </p:txBody>
       </p:sp>
@@ -8510,7 +7668,7 @@
               <p:nvPr/>
             </p:nvPicPr>
             <p:blipFill>
-              <a:blip r:embed="rId22"/>
+              <a:blip r:embed="rId15"/>
               <a:stretch>
                 <a:fillRect/>
               </a:stretch>
@@ -9381,7 +8539,7 @@
           <p:nvPr/>
         </p:nvPicPr>
         <p:blipFill>
-          <a:blip r:embed="rId23">
+          <a:blip r:embed="rId16">
             <a:extLst>
               <a:ext uri="{28A0092B-C50C-407E-A947-70E740481C1C}">
                 <a14:useLocalDpi xmlns:a14="http://schemas.microsoft.com/office/drawing/2010/main" val="0"/>
@@ -9428,7 +8586,7 @@
           <p:nvPr/>
         </p:nvPicPr>
         <p:blipFill>
-          <a:blip r:embed="rId24"/>
+          <a:blip r:embed="rId17"/>
           <a:stretch>
             <a:fillRect/>
           </a:stretch>
@@ -9499,7 +8657,7 @@
           <p:nvPr/>
         </p:nvPicPr>
         <p:blipFill rotWithShape="1">
-          <a:blip r:embed="rId25"/>
+          <a:blip r:embed="rId18"/>
           <a:srcRect l="1121" t="20620"/>
           <a:stretch/>
         </p:blipFill>
@@ -9601,7 +8759,7 @@
           <p:nvPr/>
         </p:nvPicPr>
         <p:blipFill>
-          <a:blip r:embed="rId26" cstate="print">
+          <a:blip r:embed="rId19" cstate="print">
             <a:extLst>
               <a:ext uri="{28A0092B-C50C-407E-A947-70E740481C1C}">
                 <a14:useLocalDpi xmlns:a14="http://schemas.microsoft.com/office/drawing/2010/main" val="0"/>
@@ -9622,6 +8780,1354 @@
           </a:prstGeom>
         </p:spPr>
       </p:pic>
+      <p:sp>
+        <p:nvSpPr>
+          <p:cNvPr id="3" name="TextBox 2">
+            <a:extLst>
+              <a:ext uri="{FF2B5EF4-FFF2-40B4-BE49-F238E27FC236}">
+                <a16:creationId xmlns:a16="http://schemas.microsoft.com/office/drawing/2014/main" id="{507C98D6-4E6E-4402-8BB9-51E6FA89B2FE}"/>
+              </a:ext>
+            </a:extLst>
+          </p:cNvPr>
+          <p:cNvSpPr txBox="1"/>
+          <p:nvPr/>
+        </p:nvSpPr>
+        <p:spPr>
+          <a:xfrm>
+            <a:off x="39573448" y="6936232"/>
+            <a:ext cx="3987552" cy="584775"/>
+          </a:xfrm>
+          <a:prstGeom prst="rect">
+            <a:avLst/>
+          </a:prstGeom>
+          <a:noFill/>
+        </p:spPr>
+        <p:txBody>
+          <a:bodyPr wrap="square" rtlCol="0">
+            <a:spAutoFit/>
+          </a:bodyPr>
+          <a:lstStyle/>
+          <a:p>
+            <a:r>
+              <a:rPr lang="en-US" sz="3200" dirty="0"/>
+              <a:t>www.ecoblender.org</a:t>
+            </a:r>
+          </a:p>
+        </p:txBody>
+      </p:sp>
+      <p:grpSp>
+        <p:nvGrpSpPr>
+          <p:cNvPr id="88" name="Group 87">
+            <a:extLst>
+              <a:ext uri="{FF2B5EF4-FFF2-40B4-BE49-F238E27FC236}">
+                <a16:creationId xmlns:a16="http://schemas.microsoft.com/office/drawing/2014/main" id="{7511E25C-C71C-42A8-B826-356B071A3C70}"/>
+              </a:ext>
+            </a:extLst>
+          </p:cNvPr>
+          <p:cNvGrpSpPr/>
+          <p:nvPr/>
+        </p:nvGrpSpPr>
+        <p:grpSpPr>
+          <a:xfrm>
+            <a:off x="1857896" y="24938033"/>
+            <a:ext cx="11254537" cy="5618923"/>
+            <a:chOff x="5822739" y="8345114"/>
+            <a:chExt cx="34920189" cy="17381258"/>
+          </a:xfrm>
+        </p:grpSpPr>
+        <p:grpSp>
+          <p:nvGrpSpPr>
+            <p:cNvPr id="89" name="Group 88">
+              <a:extLst>
+                <a:ext uri="{FF2B5EF4-FFF2-40B4-BE49-F238E27FC236}">
+                  <a16:creationId xmlns:a16="http://schemas.microsoft.com/office/drawing/2014/main" id="{247B5CA3-C4C4-4C44-9DFB-C540B077C4DE}"/>
+                </a:ext>
+              </a:extLst>
+            </p:cNvPr>
+            <p:cNvGrpSpPr/>
+            <p:nvPr/>
+          </p:nvGrpSpPr>
+          <p:grpSpPr>
+            <a:xfrm>
+              <a:off x="8598014" y="8345114"/>
+              <a:ext cx="32046824" cy="17136516"/>
+              <a:chOff x="8481181" y="8497514"/>
+              <a:chExt cx="32046824" cy="17136516"/>
+            </a:xfrm>
+          </p:grpSpPr>
+          <p:pic>
+            <p:nvPicPr>
+              <p:cNvPr id="99" name="Picture 4" descr="Image result for cactus silhouette">
+                <a:extLst>
+                  <a:ext uri="{FF2B5EF4-FFF2-40B4-BE49-F238E27FC236}">
+                    <a16:creationId xmlns:a16="http://schemas.microsoft.com/office/drawing/2014/main" id="{A0A204CE-5917-4D24-A4BB-2514DDA16A83}"/>
+                  </a:ext>
+                </a:extLst>
+              </p:cNvPr>
+              <p:cNvPicPr>
+                <a:picLocks noChangeAspect="1" noChangeArrowheads="1"/>
+              </p:cNvPicPr>
+              <p:nvPr/>
+            </p:nvPicPr>
+            <p:blipFill rotWithShape="1">
+              <a:blip r:embed="rId8">
+                <a:extLst>
+                  <a:ext uri="{28A0092B-C50C-407E-A947-70E740481C1C}">
+                    <a14:useLocalDpi xmlns:a14="http://schemas.microsoft.com/office/drawing/2010/main" val="0"/>
+                  </a:ext>
+                </a:extLst>
+              </a:blip>
+              <a:srcRect l="30084" r="26093"/>
+              <a:stretch/>
+            </p:blipFill>
+            <p:spPr bwMode="auto">
+              <a:xfrm flipH="1">
+                <a:off x="8481181" y="14472981"/>
+                <a:ext cx="7100107" cy="10782711"/>
+              </a:xfrm>
+              <a:prstGeom prst="rect">
+                <a:avLst/>
+              </a:prstGeom>
+              <a:noFill/>
+              <a:extLst>
+                <a:ext uri="{909E8E84-426E-40DD-AFC4-6F175D3DCCD1}">
+                  <a14:hiddenFill xmlns:a14="http://schemas.microsoft.com/office/drawing/2010/main">
+                    <a:solidFill>
+                      <a:srgbClr val="FFFFFF"/>
+                    </a:solidFill>
+                  </a14:hiddenFill>
+                </a:ext>
+              </a:extLst>
+            </p:spPr>
+          </p:pic>
+          <p:pic>
+            <p:nvPicPr>
+              <p:cNvPr id="100" name="Picture 4" descr="Image result for cactus silhouette">
+                <a:extLst>
+                  <a:ext uri="{FF2B5EF4-FFF2-40B4-BE49-F238E27FC236}">
+                    <a16:creationId xmlns:a16="http://schemas.microsoft.com/office/drawing/2014/main" id="{8F9A9DED-706E-4D8F-8ED6-928226E8EC17}"/>
+                  </a:ext>
+                </a:extLst>
+              </p:cNvPr>
+              <p:cNvPicPr>
+                <a:picLocks noChangeAspect="1" noChangeArrowheads="1"/>
+              </p:cNvPicPr>
+              <p:nvPr/>
+            </p:nvPicPr>
+            <p:blipFill rotWithShape="1">
+              <a:blip r:embed="rId8">
+                <a:extLst>
+                  <a:ext uri="{28A0092B-C50C-407E-A947-70E740481C1C}">
+                    <a14:useLocalDpi xmlns:a14="http://schemas.microsoft.com/office/drawing/2010/main" val="0"/>
+                  </a:ext>
+                </a:extLst>
+              </a:blip>
+              <a:srcRect l="30084" r="26093"/>
+              <a:stretch/>
+            </p:blipFill>
+            <p:spPr bwMode="auto">
+              <a:xfrm>
+                <a:off x="35241327" y="18476602"/>
+                <a:ext cx="4603688" cy="6600825"/>
+              </a:xfrm>
+              <a:prstGeom prst="rect">
+                <a:avLst/>
+              </a:prstGeom>
+              <a:noFill/>
+              <a:extLst>
+                <a:ext uri="{909E8E84-426E-40DD-AFC4-6F175D3DCCD1}">
+                  <a14:hiddenFill xmlns:a14="http://schemas.microsoft.com/office/drawing/2010/main">
+                    <a:solidFill>
+                      <a:srgbClr val="FFFFFF"/>
+                    </a:solidFill>
+                  </a14:hiddenFill>
+                </a:ext>
+              </a:extLst>
+            </p:spPr>
+          </p:pic>
+          <p:pic>
+            <p:nvPicPr>
+              <p:cNvPr id="101" name="Picture 4" descr="Image result for cactus silhouette">
+                <a:extLst>
+                  <a:ext uri="{FF2B5EF4-FFF2-40B4-BE49-F238E27FC236}">
+                    <a16:creationId xmlns:a16="http://schemas.microsoft.com/office/drawing/2014/main" id="{CB7DC79F-580F-45E0-87D3-7F29EBA6E434}"/>
+                  </a:ext>
+                </a:extLst>
+              </p:cNvPr>
+              <p:cNvPicPr>
+                <a:picLocks noChangeAspect="1" noChangeArrowheads="1"/>
+              </p:cNvPicPr>
+              <p:nvPr/>
+            </p:nvPicPr>
+            <p:blipFill rotWithShape="1">
+              <a:blip r:embed="rId8">
+                <a:extLst>
+                  <a:ext uri="{28A0092B-C50C-407E-A947-70E740481C1C}">
+                    <a14:useLocalDpi xmlns:a14="http://schemas.microsoft.com/office/drawing/2010/main" val="0"/>
+                  </a:ext>
+                </a:extLst>
+              </a:blip>
+              <a:srcRect l="30084" r="26093"/>
+              <a:stretch/>
+            </p:blipFill>
+            <p:spPr bwMode="auto">
+              <a:xfrm>
+                <a:off x="20992292" y="8846722"/>
+                <a:ext cx="8925729" cy="16787308"/>
+              </a:xfrm>
+              <a:prstGeom prst="rect">
+                <a:avLst/>
+              </a:prstGeom>
+              <a:noFill/>
+              <a:extLst>
+                <a:ext uri="{909E8E84-426E-40DD-AFC4-6F175D3DCCD1}">
+                  <a14:hiddenFill xmlns:a14="http://schemas.microsoft.com/office/drawing/2010/main">
+                    <a:solidFill>
+                      <a:srgbClr val="FFFFFF"/>
+                    </a:solidFill>
+                  </a14:hiddenFill>
+                </a:ext>
+              </a:extLst>
+            </p:spPr>
+          </p:pic>
+          <p:pic>
+            <p:nvPicPr>
+              <p:cNvPr id="102" name="Picture 12" descr="Image result for flower clipart">
+                <a:extLst>
+                  <a:ext uri="{FF2B5EF4-FFF2-40B4-BE49-F238E27FC236}">
+                    <a16:creationId xmlns:a16="http://schemas.microsoft.com/office/drawing/2014/main" id="{9290041F-D125-48B9-8BF0-9EC7B9594CC8}"/>
+                  </a:ext>
+                </a:extLst>
+              </p:cNvPr>
+              <p:cNvPicPr>
+                <a:picLocks noChangeAspect="1" noChangeArrowheads="1"/>
+              </p:cNvPicPr>
+              <p:nvPr/>
+            </p:nvPicPr>
+            <p:blipFill>
+              <a:blip r:embed="rId20" cstate="print">
+                <a:extLst>
+                  <a:ext uri="{28A0092B-C50C-407E-A947-70E740481C1C}">
+                    <a14:useLocalDpi xmlns:a14="http://schemas.microsoft.com/office/drawing/2010/main" val="0"/>
+                  </a:ext>
+                </a:extLst>
+              </a:blip>
+              <a:srcRect/>
+              <a:stretch>
+                <a:fillRect/>
+              </a:stretch>
+            </p:blipFill>
+            <p:spPr bwMode="auto">
+              <a:xfrm rot="1996164">
+                <a:off x="11786305" y="13769512"/>
+                <a:ext cx="2309058" cy="2288240"/>
+              </a:xfrm>
+              <a:prstGeom prst="rect">
+                <a:avLst/>
+              </a:prstGeom>
+              <a:noFill/>
+              <a:extLst>
+                <a:ext uri="{909E8E84-426E-40DD-AFC4-6F175D3DCCD1}">
+                  <a14:hiddenFill xmlns:a14="http://schemas.microsoft.com/office/drawing/2010/main">
+                    <a:solidFill>
+                      <a:srgbClr val="FFFFFF"/>
+                    </a:solidFill>
+                  </a14:hiddenFill>
+                </a:ext>
+              </a:extLst>
+            </p:spPr>
+          </p:pic>
+          <p:pic>
+            <p:nvPicPr>
+              <p:cNvPr id="103" name="Picture 12" descr="Image result for flower clipart">
+                <a:extLst>
+                  <a:ext uri="{FF2B5EF4-FFF2-40B4-BE49-F238E27FC236}">
+                    <a16:creationId xmlns:a16="http://schemas.microsoft.com/office/drawing/2014/main" id="{12349301-FA1C-4297-86D5-F59BBE4890F2}"/>
+                  </a:ext>
+                </a:extLst>
+              </p:cNvPr>
+              <p:cNvPicPr>
+                <a:picLocks noChangeAspect="1" noChangeArrowheads="1"/>
+              </p:cNvPicPr>
+              <p:nvPr/>
+            </p:nvPicPr>
+            <p:blipFill>
+              <a:blip r:embed="rId20" cstate="print">
+                <a:extLst>
+                  <a:ext uri="{28A0092B-C50C-407E-A947-70E740481C1C}">
+                    <a14:useLocalDpi xmlns:a14="http://schemas.microsoft.com/office/drawing/2010/main" val="0"/>
+                  </a:ext>
+                </a:extLst>
+              </a:blip>
+              <a:srcRect/>
+              <a:stretch>
+                <a:fillRect/>
+              </a:stretch>
+            </p:blipFill>
+            <p:spPr bwMode="auto">
+              <a:xfrm rot="2688639">
+                <a:off x="36764403" y="18957840"/>
+                <a:ext cx="2309057" cy="2288239"/>
+              </a:xfrm>
+              <a:prstGeom prst="rect">
+                <a:avLst/>
+              </a:prstGeom>
+              <a:noFill/>
+              <a:extLst>
+                <a:ext uri="{909E8E84-426E-40DD-AFC4-6F175D3DCCD1}">
+                  <a14:hiddenFill xmlns:a14="http://schemas.microsoft.com/office/drawing/2010/main">
+                    <a:solidFill>
+                      <a:srgbClr val="FFFFFF"/>
+                    </a:solidFill>
+                  </a14:hiddenFill>
+                </a:ext>
+              </a:extLst>
+            </p:spPr>
+          </p:pic>
+          <p:pic>
+            <p:nvPicPr>
+              <p:cNvPr id="104" name="Picture 12" descr="Image result for flower clipart">
+                <a:extLst>
+                  <a:ext uri="{FF2B5EF4-FFF2-40B4-BE49-F238E27FC236}">
+                    <a16:creationId xmlns:a16="http://schemas.microsoft.com/office/drawing/2014/main" id="{451E6C47-591E-4023-BB23-82B98D0FB081}"/>
+                  </a:ext>
+                </a:extLst>
+              </p:cNvPr>
+              <p:cNvPicPr>
+                <a:picLocks noChangeAspect="1" noChangeArrowheads="1"/>
+              </p:cNvPicPr>
+              <p:nvPr/>
+            </p:nvPicPr>
+            <p:blipFill>
+              <a:blip r:embed="rId20" cstate="print">
+                <a:extLst>
+                  <a:ext uri="{28A0092B-C50C-407E-A947-70E740481C1C}">
+                    <a14:useLocalDpi xmlns:a14="http://schemas.microsoft.com/office/drawing/2010/main" val="0"/>
+                  </a:ext>
+                </a:extLst>
+              </a:blip>
+              <a:srcRect/>
+              <a:stretch>
+                <a:fillRect/>
+              </a:stretch>
+            </p:blipFill>
+            <p:spPr bwMode="auto">
+              <a:xfrm rot="1996164">
+                <a:off x="22106129" y="9292546"/>
+                <a:ext cx="2309058" cy="2288240"/>
+              </a:xfrm>
+              <a:prstGeom prst="rect">
+                <a:avLst/>
+              </a:prstGeom>
+              <a:noFill/>
+              <a:extLst>
+                <a:ext uri="{909E8E84-426E-40DD-AFC4-6F175D3DCCD1}">
+                  <a14:hiddenFill xmlns:a14="http://schemas.microsoft.com/office/drawing/2010/main">
+                    <a:solidFill>
+                      <a:srgbClr val="FFFFFF"/>
+                    </a:solidFill>
+                  </a14:hiddenFill>
+                </a:ext>
+              </a:extLst>
+            </p:spPr>
+          </p:pic>
+          <p:pic>
+            <p:nvPicPr>
+              <p:cNvPr id="105" name="Picture 12" descr="Image result for flower clipart">
+                <a:extLst>
+                  <a:ext uri="{FF2B5EF4-FFF2-40B4-BE49-F238E27FC236}">
+                    <a16:creationId xmlns:a16="http://schemas.microsoft.com/office/drawing/2014/main" id="{6D6A958D-ABEE-45A7-A7A8-83D95C16F093}"/>
+                  </a:ext>
+                </a:extLst>
+              </p:cNvPr>
+              <p:cNvPicPr>
+                <a:picLocks noChangeAspect="1" noChangeArrowheads="1"/>
+              </p:cNvPicPr>
+              <p:nvPr/>
+            </p:nvPicPr>
+            <p:blipFill>
+              <a:blip r:embed="rId21" cstate="print">
+                <a:extLst>
+                  <a:ext uri="{28A0092B-C50C-407E-A947-70E740481C1C}">
+                    <a14:useLocalDpi xmlns:a14="http://schemas.microsoft.com/office/drawing/2010/main" val="0"/>
+                  </a:ext>
+                </a:extLst>
+              </a:blip>
+              <a:srcRect/>
+              <a:stretch>
+                <a:fillRect/>
+              </a:stretch>
+            </p:blipFill>
+            <p:spPr bwMode="auto">
+              <a:xfrm rot="16973761">
+                <a:off x="36034342" y="17367892"/>
+                <a:ext cx="2309058" cy="2288240"/>
+              </a:xfrm>
+              <a:prstGeom prst="rect">
+                <a:avLst/>
+              </a:prstGeom>
+              <a:noFill/>
+              <a:extLst>
+                <a:ext uri="{909E8E84-426E-40DD-AFC4-6F175D3DCCD1}">
+                  <a14:hiddenFill xmlns:a14="http://schemas.microsoft.com/office/drawing/2010/main">
+                    <a:solidFill>
+                      <a:srgbClr val="FFFFFF"/>
+                    </a:solidFill>
+                  </a14:hiddenFill>
+                </a:ext>
+              </a:extLst>
+            </p:spPr>
+          </p:pic>
+          <p:pic>
+            <p:nvPicPr>
+              <p:cNvPr id="106" name="Picture 12" descr="Image result for flower clipart">
+                <a:extLst>
+                  <a:ext uri="{FF2B5EF4-FFF2-40B4-BE49-F238E27FC236}">
+                    <a16:creationId xmlns:a16="http://schemas.microsoft.com/office/drawing/2014/main" id="{A7726C34-6F17-48B5-AD1E-90AA32CD9FFA}"/>
+                  </a:ext>
+                </a:extLst>
+              </p:cNvPr>
+              <p:cNvPicPr>
+                <a:picLocks noChangeAspect="1" noChangeArrowheads="1"/>
+              </p:cNvPicPr>
+              <p:nvPr/>
+            </p:nvPicPr>
+            <p:blipFill>
+              <a:blip r:embed="rId20" cstate="print">
+                <a:extLst>
+                  <a:ext uri="{28A0092B-C50C-407E-A947-70E740481C1C}">
+                    <a14:useLocalDpi xmlns:a14="http://schemas.microsoft.com/office/drawing/2010/main" val="0"/>
+                  </a:ext>
+                </a:extLst>
+              </a:blip>
+              <a:srcRect/>
+              <a:stretch>
+                <a:fillRect/>
+              </a:stretch>
+            </p:blipFill>
+            <p:spPr bwMode="auto">
+              <a:xfrm rot="1320354">
+                <a:off x="34363585" y="19380253"/>
+                <a:ext cx="2309058" cy="2288240"/>
+              </a:xfrm>
+              <a:prstGeom prst="rect">
+                <a:avLst/>
+              </a:prstGeom>
+              <a:noFill/>
+              <a:extLst>
+                <a:ext uri="{909E8E84-426E-40DD-AFC4-6F175D3DCCD1}">
+                  <a14:hiddenFill xmlns:a14="http://schemas.microsoft.com/office/drawing/2010/main">
+                    <a:solidFill>
+                      <a:srgbClr val="FFFFFF"/>
+                    </a:solidFill>
+                  </a14:hiddenFill>
+                </a:ext>
+              </a:extLst>
+            </p:spPr>
+          </p:pic>
+          <p:pic>
+            <p:nvPicPr>
+              <p:cNvPr id="107" name="Picture 12" descr="Image result for flower clipart">
+                <a:extLst>
+                  <a:ext uri="{FF2B5EF4-FFF2-40B4-BE49-F238E27FC236}">
+                    <a16:creationId xmlns:a16="http://schemas.microsoft.com/office/drawing/2014/main" id="{0ACB90BA-887C-45E2-8939-B21DE8E06799}"/>
+                  </a:ext>
+                </a:extLst>
+              </p:cNvPr>
+              <p:cNvPicPr>
+                <a:picLocks noChangeAspect="1" noChangeArrowheads="1"/>
+              </p:cNvPicPr>
+              <p:nvPr/>
+            </p:nvPicPr>
+            <p:blipFill>
+              <a:blip r:embed="rId20" cstate="print">
+                <a:extLst>
+                  <a:ext uri="{28A0092B-C50C-407E-A947-70E740481C1C}">
+                    <a14:useLocalDpi xmlns:a14="http://schemas.microsoft.com/office/drawing/2010/main" val="0"/>
+                  </a:ext>
+                </a:extLst>
+              </a:blip>
+              <a:srcRect/>
+              <a:stretch>
+                <a:fillRect/>
+              </a:stretch>
+            </p:blipFill>
+            <p:spPr bwMode="auto">
+              <a:xfrm rot="388776">
+                <a:off x="34496403" y="17423373"/>
+                <a:ext cx="2309058" cy="2288240"/>
+              </a:xfrm>
+              <a:prstGeom prst="rect">
+                <a:avLst/>
+              </a:prstGeom>
+              <a:noFill/>
+              <a:extLst>
+                <a:ext uri="{909E8E84-426E-40DD-AFC4-6F175D3DCCD1}">
+                  <a14:hiddenFill xmlns:a14="http://schemas.microsoft.com/office/drawing/2010/main">
+                    <a:solidFill>
+                      <a:srgbClr val="FFFFFF"/>
+                    </a:solidFill>
+                  </a14:hiddenFill>
+                </a:ext>
+              </a:extLst>
+            </p:spPr>
+          </p:pic>
+          <p:pic>
+            <p:nvPicPr>
+              <p:cNvPr id="108" name="Picture 12" descr="Image result for flower clipart">
+                <a:extLst>
+                  <a:ext uri="{FF2B5EF4-FFF2-40B4-BE49-F238E27FC236}">
+                    <a16:creationId xmlns:a16="http://schemas.microsoft.com/office/drawing/2014/main" id="{CD667C9E-32B6-4FEC-BDAF-C445D50FB4EA}"/>
+                  </a:ext>
+                </a:extLst>
+              </p:cNvPr>
+              <p:cNvPicPr>
+                <a:picLocks noChangeAspect="1" noChangeArrowheads="1"/>
+              </p:cNvPicPr>
+              <p:nvPr/>
+            </p:nvPicPr>
+            <p:blipFill>
+              <a:blip r:embed="rId20" cstate="print">
+                <a:extLst>
+                  <a:ext uri="{28A0092B-C50C-407E-A947-70E740481C1C}">
+                    <a14:useLocalDpi xmlns:a14="http://schemas.microsoft.com/office/drawing/2010/main" val="0"/>
+                  </a:ext>
+                </a:extLst>
+              </a:blip>
+              <a:srcRect/>
+              <a:stretch>
+                <a:fillRect/>
+              </a:stretch>
+            </p:blipFill>
+            <p:spPr bwMode="auto">
+              <a:xfrm rot="21203234">
+                <a:off x="38218947" y="19927917"/>
+                <a:ext cx="2309058" cy="2288240"/>
+              </a:xfrm>
+              <a:prstGeom prst="rect">
+                <a:avLst/>
+              </a:prstGeom>
+              <a:noFill/>
+              <a:extLst>
+                <a:ext uri="{909E8E84-426E-40DD-AFC4-6F175D3DCCD1}">
+                  <a14:hiddenFill xmlns:a14="http://schemas.microsoft.com/office/drawing/2010/main">
+                    <a:solidFill>
+                      <a:srgbClr val="FFFFFF"/>
+                    </a:solidFill>
+                  </a14:hiddenFill>
+                </a:ext>
+              </a:extLst>
+            </p:spPr>
+          </p:pic>
+          <p:pic>
+            <p:nvPicPr>
+              <p:cNvPr id="109" name="Picture 2" descr="Image result for hummingbird silhouette">
+                <a:extLst>
+                  <a:ext uri="{FF2B5EF4-FFF2-40B4-BE49-F238E27FC236}">
+                    <a16:creationId xmlns:a16="http://schemas.microsoft.com/office/drawing/2014/main" id="{01D7DFDF-3135-4A1C-AD49-C71748472034}"/>
+                  </a:ext>
+                </a:extLst>
+              </p:cNvPr>
+              <p:cNvPicPr>
+                <a:picLocks noChangeAspect="1" noChangeArrowheads="1"/>
+              </p:cNvPicPr>
+              <p:nvPr/>
+            </p:nvPicPr>
+            <p:blipFill>
+              <a:blip r:embed="rId22" cstate="print">
+                <a:extLst>
+                  <a:ext uri="{28A0092B-C50C-407E-A947-70E740481C1C}">
+                    <a14:useLocalDpi xmlns:a14="http://schemas.microsoft.com/office/drawing/2010/main" val="0"/>
+                  </a:ext>
+                </a:extLst>
+              </a:blip>
+              <a:srcRect/>
+              <a:stretch>
+                <a:fillRect/>
+              </a:stretch>
+            </p:blipFill>
+            <p:spPr bwMode="auto">
+              <a:xfrm rot="2792186" flipH="1">
+                <a:off x="17857762" y="9314117"/>
+                <a:ext cx="3878302" cy="2245095"/>
+              </a:xfrm>
+              <a:prstGeom prst="rect">
+                <a:avLst/>
+              </a:prstGeom>
+              <a:noFill/>
+              <a:extLst>
+                <a:ext uri="{909E8E84-426E-40DD-AFC4-6F175D3DCCD1}">
+                  <a14:hiddenFill xmlns:a14="http://schemas.microsoft.com/office/drawing/2010/main">
+                    <a:solidFill>
+                      <a:srgbClr val="FFFFFF"/>
+                    </a:solidFill>
+                  </a14:hiddenFill>
+                </a:ext>
+              </a:extLst>
+            </p:spPr>
+          </p:pic>
+          <p:pic>
+            <p:nvPicPr>
+              <p:cNvPr id="110" name="Picture 2" descr="Image result for hummingbird silhouette">
+                <a:extLst>
+                  <a:ext uri="{FF2B5EF4-FFF2-40B4-BE49-F238E27FC236}">
+                    <a16:creationId xmlns:a16="http://schemas.microsoft.com/office/drawing/2014/main" id="{FF818322-B9B0-4D9B-95DC-C989F40BE7B7}"/>
+                  </a:ext>
+                </a:extLst>
+              </p:cNvPr>
+              <p:cNvPicPr>
+                <a:picLocks noChangeAspect="1" noChangeArrowheads="1"/>
+              </p:cNvPicPr>
+              <p:nvPr/>
+            </p:nvPicPr>
+            <p:blipFill>
+              <a:blip r:embed="rId22" cstate="print">
+                <a:extLst>
+                  <a:ext uri="{28A0092B-C50C-407E-A947-70E740481C1C}">
+                    <a14:useLocalDpi xmlns:a14="http://schemas.microsoft.com/office/drawing/2010/main" val="0"/>
+                  </a:ext>
+                </a:extLst>
+              </a:blip>
+              <a:srcRect/>
+              <a:stretch>
+                <a:fillRect/>
+              </a:stretch>
+            </p:blipFill>
+            <p:spPr bwMode="auto">
+              <a:xfrm rot="873617" flipH="1">
+                <a:off x="32435513" y="18247369"/>
+                <a:ext cx="3878302" cy="2245095"/>
+              </a:xfrm>
+              <a:prstGeom prst="rect">
+                <a:avLst/>
+              </a:prstGeom>
+              <a:noFill/>
+              <a:extLst>
+                <a:ext uri="{909E8E84-426E-40DD-AFC4-6F175D3DCCD1}">
+                  <a14:hiddenFill xmlns:a14="http://schemas.microsoft.com/office/drawing/2010/main">
+                    <a:solidFill>
+                      <a:srgbClr val="FFFFFF"/>
+                    </a:solidFill>
+                  </a14:hiddenFill>
+                </a:ext>
+              </a:extLst>
+            </p:spPr>
+          </p:pic>
+          <p:pic>
+            <p:nvPicPr>
+              <p:cNvPr id="111" name="Picture 2" descr="Image result for hummingbird silhouette">
+                <a:extLst>
+                  <a:ext uri="{FF2B5EF4-FFF2-40B4-BE49-F238E27FC236}">
+                    <a16:creationId xmlns:a16="http://schemas.microsoft.com/office/drawing/2014/main" id="{98E9CE3C-F50D-49C9-909B-8C92B0EEAD07}"/>
+                  </a:ext>
+                </a:extLst>
+              </p:cNvPr>
+              <p:cNvPicPr>
+                <a:picLocks noChangeAspect="1" noChangeArrowheads="1"/>
+              </p:cNvPicPr>
+              <p:nvPr/>
+            </p:nvPicPr>
+            <p:blipFill>
+              <a:blip r:embed="rId22" cstate="print">
+                <a:extLst>
+                  <a:ext uri="{28A0092B-C50C-407E-A947-70E740481C1C}">
+                    <a14:useLocalDpi xmlns:a14="http://schemas.microsoft.com/office/drawing/2010/main" val="0"/>
+                  </a:ext>
+                </a:extLst>
+              </a:blip>
+              <a:srcRect/>
+              <a:stretch>
+                <a:fillRect/>
+              </a:stretch>
+            </p:blipFill>
+            <p:spPr bwMode="auto">
+              <a:xfrm rot="1143832" flipH="1">
+                <a:off x="9081570" y="14624156"/>
+                <a:ext cx="3878302" cy="2245095"/>
+              </a:xfrm>
+              <a:prstGeom prst="rect">
+                <a:avLst/>
+              </a:prstGeom>
+              <a:noFill/>
+              <a:extLst>
+                <a:ext uri="{909E8E84-426E-40DD-AFC4-6F175D3DCCD1}">
+                  <a14:hiddenFill xmlns:a14="http://schemas.microsoft.com/office/drawing/2010/main">
+                    <a:solidFill>
+                      <a:srgbClr val="FFFFFF"/>
+                    </a:solidFill>
+                  </a14:hiddenFill>
+                </a:ext>
+              </a:extLst>
+            </p:spPr>
+          </p:pic>
+        </p:grpSp>
+        <p:pic>
+          <p:nvPicPr>
+            <p:cNvPr id="91" name="Picture 12" descr="Image result for flower clipart">
+              <a:extLst>
+                <a:ext uri="{FF2B5EF4-FFF2-40B4-BE49-F238E27FC236}">
+                  <a16:creationId xmlns:a16="http://schemas.microsoft.com/office/drawing/2014/main" id="{0745D2A9-CC09-42BF-9E7D-DF3589F278E8}"/>
+                </a:ext>
+              </a:extLst>
+            </p:cNvPr>
+            <p:cNvPicPr>
+              <a:picLocks noChangeAspect="1" noChangeArrowheads="1"/>
+            </p:cNvPicPr>
+            <p:nvPr/>
+          </p:nvPicPr>
+          <p:blipFill>
+            <a:blip r:embed="rId20" cstate="print">
+              <a:extLst>
+                <a:ext uri="{28A0092B-C50C-407E-A947-70E740481C1C}">
+                  <a14:useLocalDpi xmlns:a14="http://schemas.microsoft.com/office/drawing/2010/main" val="0"/>
+                </a:ext>
+              </a:extLst>
+            </a:blip>
+            <a:srcRect/>
+            <a:stretch>
+              <a:fillRect/>
+            </a:stretch>
+          </p:blipFill>
+          <p:spPr bwMode="auto">
+            <a:xfrm rot="1996164">
+              <a:off x="14281466" y="15207059"/>
+              <a:ext cx="2309058" cy="2288240"/>
+            </a:xfrm>
+            <a:prstGeom prst="rect">
+              <a:avLst/>
+            </a:prstGeom>
+            <a:noFill/>
+            <a:extLst>
+              <a:ext uri="{909E8E84-426E-40DD-AFC4-6F175D3DCCD1}">
+                <a14:hiddenFill xmlns:a14="http://schemas.microsoft.com/office/drawing/2010/main">
+                  <a:solidFill>
+                    <a:srgbClr val="FFFFFF"/>
+                  </a:solidFill>
+                </a14:hiddenFill>
+              </a:ext>
+            </a:extLst>
+          </p:spPr>
+        </p:pic>
+        <p:pic>
+          <p:nvPicPr>
+            <p:cNvPr id="92" name="Picture 12" descr="Image result for flower clipart">
+              <a:extLst>
+                <a:ext uri="{FF2B5EF4-FFF2-40B4-BE49-F238E27FC236}">
+                  <a16:creationId xmlns:a16="http://schemas.microsoft.com/office/drawing/2014/main" id="{F72761F0-4832-469C-BD14-31EE9F16CA1D}"/>
+                </a:ext>
+              </a:extLst>
+            </p:cNvPr>
+            <p:cNvPicPr>
+              <a:picLocks noChangeAspect="1" noChangeArrowheads="1"/>
+            </p:cNvPicPr>
+            <p:nvPr/>
+          </p:nvPicPr>
+          <p:blipFill>
+            <a:blip r:embed="rId20" cstate="print">
+              <a:extLst>
+                <a:ext uri="{28A0092B-C50C-407E-A947-70E740481C1C}">
+                  <a14:useLocalDpi xmlns:a14="http://schemas.microsoft.com/office/drawing/2010/main" val="0"/>
+                </a:ext>
+              </a:extLst>
+            </a:blip>
+            <a:srcRect/>
+            <a:stretch>
+              <a:fillRect/>
+            </a:stretch>
+          </p:blipFill>
+          <p:spPr bwMode="auto">
+            <a:xfrm rot="1996164">
+              <a:off x="10790576" y="15833426"/>
+              <a:ext cx="2309058" cy="2288240"/>
+            </a:xfrm>
+            <a:prstGeom prst="rect">
+              <a:avLst/>
+            </a:prstGeom>
+            <a:noFill/>
+            <a:extLst>
+              <a:ext uri="{909E8E84-426E-40DD-AFC4-6F175D3DCCD1}">
+                <a14:hiddenFill xmlns:a14="http://schemas.microsoft.com/office/drawing/2010/main">
+                  <a:solidFill>
+                    <a:srgbClr val="FFFFFF"/>
+                  </a:solidFill>
+                </a14:hiddenFill>
+              </a:ext>
+            </a:extLst>
+          </p:spPr>
+        </p:pic>
+        <p:pic>
+          <p:nvPicPr>
+            <p:cNvPr id="93" name="Picture 12" descr="Image result for flower clipart">
+              <a:extLst>
+                <a:ext uri="{FF2B5EF4-FFF2-40B4-BE49-F238E27FC236}">
+                  <a16:creationId xmlns:a16="http://schemas.microsoft.com/office/drawing/2014/main" id="{FCFBC954-1C60-4207-A844-31879D7BE7DC}"/>
+                </a:ext>
+              </a:extLst>
+            </p:cNvPr>
+            <p:cNvPicPr>
+              <a:picLocks noChangeAspect="1" noChangeArrowheads="1"/>
+            </p:cNvPicPr>
+            <p:nvPr/>
+          </p:nvPicPr>
+          <p:blipFill>
+            <a:blip r:embed="rId20" cstate="print">
+              <a:extLst>
+                <a:ext uri="{28A0092B-C50C-407E-A947-70E740481C1C}">
+                  <a14:useLocalDpi xmlns:a14="http://schemas.microsoft.com/office/drawing/2010/main" val="0"/>
+                </a:ext>
+              </a:extLst>
+            </a:blip>
+            <a:srcRect/>
+            <a:stretch>
+              <a:fillRect/>
+            </a:stretch>
+          </p:blipFill>
+          <p:spPr bwMode="auto">
+            <a:xfrm rot="369037">
+              <a:off x="33733102" y="21202404"/>
+              <a:ext cx="2309060" cy="2288239"/>
+            </a:xfrm>
+            <a:prstGeom prst="rect">
+              <a:avLst/>
+            </a:prstGeom>
+            <a:noFill/>
+            <a:extLst>
+              <a:ext uri="{909E8E84-426E-40DD-AFC4-6F175D3DCCD1}">
+                <a14:hiddenFill xmlns:a14="http://schemas.microsoft.com/office/drawing/2010/main">
+                  <a:solidFill>
+                    <a:srgbClr val="FFFFFF"/>
+                  </a:solidFill>
+                </a14:hiddenFill>
+              </a:ext>
+            </a:extLst>
+          </p:spPr>
+        </p:pic>
+        <p:pic>
+          <p:nvPicPr>
+            <p:cNvPr id="94" name="Picture 12" descr="Image result for flower clipart">
+              <a:extLst>
+                <a:ext uri="{FF2B5EF4-FFF2-40B4-BE49-F238E27FC236}">
+                  <a16:creationId xmlns:a16="http://schemas.microsoft.com/office/drawing/2014/main" id="{670CEBD9-C603-44E2-9E52-AC3740A34EE5}"/>
+                </a:ext>
+              </a:extLst>
+            </p:cNvPr>
+            <p:cNvPicPr>
+              <a:picLocks noChangeAspect="1" noChangeArrowheads="1"/>
+            </p:cNvPicPr>
+            <p:nvPr/>
+          </p:nvPicPr>
+          <p:blipFill>
+            <a:blip r:embed="rId20" cstate="print">
+              <a:extLst>
+                <a:ext uri="{28A0092B-C50C-407E-A947-70E740481C1C}">
+                  <a14:useLocalDpi xmlns:a14="http://schemas.microsoft.com/office/drawing/2010/main" val="0"/>
+                </a:ext>
+              </a:extLst>
+            </a:blip>
+            <a:srcRect/>
+            <a:stretch>
+              <a:fillRect/>
+            </a:stretch>
+          </p:blipFill>
+          <p:spPr bwMode="auto">
+            <a:xfrm rot="3849515">
+              <a:off x="38444300" y="21926436"/>
+              <a:ext cx="2302048" cy="2295209"/>
+            </a:xfrm>
+            <a:prstGeom prst="rect">
+              <a:avLst/>
+            </a:prstGeom>
+            <a:noFill/>
+            <a:extLst>
+              <a:ext uri="{909E8E84-426E-40DD-AFC4-6F175D3DCCD1}">
+                <a14:hiddenFill xmlns:a14="http://schemas.microsoft.com/office/drawing/2010/main">
+                  <a:solidFill>
+                    <a:srgbClr val="FFFFFF"/>
+                  </a:solidFill>
+                </a14:hiddenFill>
+              </a:ext>
+            </a:extLst>
+          </p:spPr>
+        </p:pic>
+        <p:pic>
+          <p:nvPicPr>
+            <p:cNvPr id="95" name="Picture 12" descr="Image result for flower clipart">
+              <a:extLst>
+                <a:ext uri="{FF2B5EF4-FFF2-40B4-BE49-F238E27FC236}">
+                  <a16:creationId xmlns:a16="http://schemas.microsoft.com/office/drawing/2014/main" id="{DA16D2A7-E3F4-469B-9711-9A9F9ACCEBB0}"/>
+                </a:ext>
+              </a:extLst>
+            </p:cNvPr>
+            <p:cNvPicPr>
+              <a:picLocks noChangeAspect="1" noChangeArrowheads="1"/>
+            </p:cNvPicPr>
+            <p:nvPr/>
+          </p:nvPicPr>
+          <p:blipFill>
+            <a:blip r:embed="rId20" cstate="print">
+              <a:extLst>
+                <a:ext uri="{28A0092B-C50C-407E-A947-70E740481C1C}">
+                  <a14:useLocalDpi xmlns:a14="http://schemas.microsoft.com/office/drawing/2010/main" val="0"/>
+                </a:ext>
+              </a:extLst>
+            </a:blip>
+            <a:srcRect/>
+            <a:stretch>
+              <a:fillRect/>
+            </a:stretch>
+          </p:blipFill>
+          <p:spPr bwMode="auto">
+            <a:xfrm rot="1996164">
+              <a:off x="8476999" y="17734481"/>
+              <a:ext cx="2309058" cy="2288240"/>
+            </a:xfrm>
+            <a:prstGeom prst="rect">
+              <a:avLst/>
+            </a:prstGeom>
+            <a:noFill/>
+            <a:extLst>
+              <a:ext uri="{909E8E84-426E-40DD-AFC4-6F175D3DCCD1}">
+                <a14:hiddenFill xmlns:a14="http://schemas.microsoft.com/office/drawing/2010/main">
+                  <a:solidFill>
+                    <a:srgbClr val="FFFFFF"/>
+                  </a:solidFill>
+                </a14:hiddenFill>
+              </a:ext>
+            </a:extLst>
+          </p:spPr>
+        </p:pic>
+        <p:pic>
+          <p:nvPicPr>
+            <p:cNvPr id="96" name="Picture 2" descr="Image result for hummingbird silhouette">
+              <a:extLst>
+                <a:ext uri="{FF2B5EF4-FFF2-40B4-BE49-F238E27FC236}">
+                  <a16:creationId xmlns:a16="http://schemas.microsoft.com/office/drawing/2014/main" id="{DA02A9ED-9296-454A-B20F-3A0E2CBDD7F1}"/>
+                </a:ext>
+              </a:extLst>
+            </p:cNvPr>
+            <p:cNvPicPr>
+              <a:picLocks noChangeAspect="1" noChangeArrowheads="1"/>
+            </p:cNvPicPr>
+            <p:nvPr/>
+          </p:nvPicPr>
+          <p:blipFill>
+            <a:blip r:embed="rId22" cstate="print">
+              <a:extLst>
+                <a:ext uri="{28A0092B-C50C-407E-A947-70E740481C1C}">
+                  <a14:useLocalDpi xmlns:a14="http://schemas.microsoft.com/office/drawing/2010/main" val="0"/>
+                </a:ext>
+              </a:extLst>
+            </a:blip>
+            <a:srcRect/>
+            <a:stretch>
+              <a:fillRect/>
+            </a:stretch>
+          </p:blipFill>
+          <p:spPr bwMode="auto">
+            <a:xfrm rot="21445809" flipH="1">
+              <a:off x="5908550" y="18483479"/>
+              <a:ext cx="3878302" cy="2245095"/>
+            </a:xfrm>
+            <a:prstGeom prst="rect">
+              <a:avLst/>
+            </a:prstGeom>
+            <a:noFill/>
+            <a:extLst>
+              <a:ext uri="{909E8E84-426E-40DD-AFC4-6F175D3DCCD1}">
+                <a14:hiddenFill xmlns:a14="http://schemas.microsoft.com/office/drawing/2010/main">
+                  <a:solidFill>
+                    <a:srgbClr val="FFFFFF"/>
+                  </a:solidFill>
+                </a14:hiddenFill>
+              </a:ext>
+            </a:extLst>
+          </p:spPr>
+        </p:pic>
+        <p:pic>
+          <p:nvPicPr>
+            <p:cNvPr id="97" name="Picture 2" descr="Image result for hummingbird silhouette">
+              <a:extLst>
+                <a:ext uri="{FF2B5EF4-FFF2-40B4-BE49-F238E27FC236}">
+                  <a16:creationId xmlns:a16="http://schemas.microsoft.com/office/drawing/2014/main" id="{73426551-7263-44B4-9324-9D5DAD207ADB}"/>
+                </a:ext>
+              </a:extLst>
+            </p:cNvPr>
+            <p:cNvPicPr>
+              <a:picLocks noChangeAspect="1" noChangeArrowheads="1"/>
+            </p:cNvPicPr>
+            <p:nvPr/>
+          </p:nvPicPr>
+          <p:blipFill>
+            <a:blip r:embed="rId22" cstate="print">
+              <a:extLst>
+                <a:ext uri="{28A0092B-C50C-407E-A947-70E740481C1C}">
+                  <a14:useLocalDpi xmlns:a14="http://schemas.microsoft.com/office/drawing/2010/main" val="0"/>
+                </a:ext>
+              </a:extLst>
+            </a:blip>
+            <a:srcRect/>
+            <a:stretch>
+              <a:fillRect/>
+            </a:stretch>
+          </p:blipFill>
+          <p:spPr bwMode="auto">
+            <a:xfrm rot="21445809">
+              <a:off x="15176250" y="15437213"/>
+              <a:ext cx="3795404" cy="2245095"/>
+            </a:xfrm>
+            <a:prstGeom prst="rect">
+              <a:avLst/>
+            </a:prstGeom>
+            <a:noFill/>
+            <a:extLst>
+              <a:ext uri="{909E8E84-426E-40DD-AFC4-6F175D3DCCD1}">
+                <a14:hiddenFill xmlns:a14="http://schemas.microsoft.com/office/drawing/2010/main">
+                  <a:solidFill>
+                    <a:srgbClr val="FFFFFF"/>
+                  </a:solidFill>
+                </a14:hiddenFill>
+              </a:ext>
+            </a:extLst>
+          </p:spPr>
+        </p:pic>
+        <p:sp>
+          <p:nvSpPr>
+            <p:cNvPr id="98" name="Oval 97">
+              <a:extLst>
+                <a:ext uri="{FF2B5EF4-FFF2-40B4-BE49-F238E27FC236}">
+                  <a16:creationId xmlns:a16="http://schemas.microsoft.com/office/drawing/2014/main" id="{CFF0A928-5FD6-4D39-B8A4-9D9AA0FA568E}"/>
+                </a:ext>
+              </a:extLst>
+            </p:cNvPr>
+            <p:cNvSpPr/>
+            <p:nvPr/>
+          </p:nvSpPr>
+          <p:spPr>
+            <a:xfrm>
+              <a:off x="5822739" y="12708659"/>
+              <a:ext cx="13614352" cy="13017713"/>
+            </a:xfrm>
+            <a:prstGeom prst="ellipse">
+              <a:avLst/>
+            </a:prstGeom>
+            <a:noFill/>
+            <a:ln/>
+          </p:spPr>
+          <p:style>
+            <a:lnRef idx="2">
+              <a:schemeClr val="accent4"/>
+            </a:lnRef>
+            <a:fillRef idx="1">
+              <a:schemeClr val="lt1"/>
+            </a:fillRef>
+            <a:effectRef idx="0">
+              <a:schemeClr val="accent4"/>
+            </a:effectRef>
+            <a:fontRef idx="minor">
+              <a:schemeClr val="dk1"/>
+            </a:fontRef>
+          </p:style>
+          <p:txBody>
+            <a:bodyPr rtlCol="0" anchor="ctr"/>
+            <a:lstStyle/>
+            <a:p>
+              <a:pPr algn="ctr"/>
+              <a:endParaRPr lang="en-US" sz="6000" dirty="0" err="1"/>
+            </a:p>
+          </p:txBody>
+        </p:sp>
+      </p:grpSp>
+      <p:sp>
+        <p:nvSpPr>
+          <p:cNvPr id="31" name="TextBox 30">
+            <a:extLst>
+              <a:ext uri="{FF2B5EF4-FFF2-40B4-BE49-F238E27FC236}">
+                <a16:creationId xmlns:a16="http://schemas.microsoft.com/office/drawing/2014/main" id="{ADAB2EDA-68E8-4203-B7CD-7730A5BFFE51}"/>
+              </a:ext>
+            </a:extLst>
+          </p:cNvPr>
+          <p:cNvSpPr txBox="1"/>
+          <p:nvPr/>
+        </p:nvSpPr>
+        <p:spPr>
+          <a:xfrm>
+            <a:off x="3317083" y="28856612"/>
+            <a:ext cx="1361450" cy="830997"/>
+          </a:xfrm>
+          <a:prstGeom prst="rect">
+            <a:avLst/>
+          </a:prstGeom>
+          <a:noFill/>
+        </p:spPr>
+        <p:txBody>
+          <a:bodyPr wrap="square" rtlCol="0">
+            <a:spAutoFit/>
+          </a:bodyPr>
+          <a:lstStyle/>
+          <a:p>
+            <a:pPr algn="ctr"/>
+            <a:r>
+              <a:rPr lang="en-US" sz="2400" dirty="0">
+                <a:solidFill>
+                  <a:schemeClr val="accent4">
+                    <a:lumMod val="60000"/>
+                    <a:lumOff val="40000"/>
+                  </a:schemeClr>
+                </a:solidFill>
+              </a:rPr>
+              <a:t>Species 1</a:t>
+            </a:r>
+          </a:p>
+        </p:txBody>
+      </p:sp>
+      <p:sp>
+        <p:nvSpPr>
+          <p:cNvPr id="112" name="TextBox 111">
+            <a:extLst>
+              <a:ext uri="{FF2B5EF4-FFF2-40B4-BE49-F238E27FC236}">
+                <a16:creationId xmlns:a16="http://schemas.microsoft.com/office/drawing/2014/main" id="{346739B4-4E87-4373-BDAD-48B2B60B8187}"/>
+              </a:ext>
+            </a:extLst>
+          </p:cNvPr>
+          <p:cNvSpPr txBox="1"/>
+          <p:nvPr/>
+        </p:nvSpPr>
+        <p:spPr>
+          <a:xfrm>
+            <a:off x="7378412" y="28473130"/>
+            <a:ext cx="1361450" cy="830997"/>
+          </a:xfrm>
+          <a:prstGeom prst="rect">
+            <a:avLst/>
+          </a:prstGeom>
+          <a:noFill/>
+        </p:spPr>
+        <p:txBody>
+          <a:bodyPr wrap="square" rtlCol="0">
+            <a:spAutoFit/>
+          </a:bodyPr>
+          <a:lstStyle/>
+          <a:p>
+            <a:pPr algn="ctr"/>
+            <a:r>
+              <a:rPr lang="en-US" sz="2400" dirty="0">
+                <a:solidFill>
+                  <a:schemeClr val="accent4">
+                    <a:lumMod val="60000"/>
+                    <a:lumOff val="40000"/>
+                  </a:schemeClr>
+                </a:solidFill>
+              </a:rPr>
+              <a:t>Species 2</a:t>
+            </a:r>
+          </a:p>
+        </p:txBody>
+      </p:sp>
+      <p:sp>
+        <p:nvSpPr>
+          <p:cNvPr id="113" name="TextBox 112">
+            <a:extLst>
+              <a:ext uri="{FF2B5EF4-FFF2-40B4-BE49-F238E27FC236}">
+                <a16:creationId xmlns:a16="http://schemas.microsoft.com/office/drawing/2014/main" id="{D7F99761-CE4B-4536-8113-366D90E9B731}"/>
+              </a:ext>
+            </a:extLst>
+          </p:cNvPr>
+          <p:cNvSpPr txBox="1"/>
+          <p:nvPr/>
+        </p:nvSpPr>
+        <p:spPr>
+          <a:xfrm>
+            <a:off x="11355735" y="29159743"/>
+            <a:ext cx="1361450" cy="830997"/>
+          </a:xfrm>
+          <a:prstGeom prst="rect">
+            <a:avLst/>
+          </a:prstGeom>
+          <a:noFill/>
+        </p:spPr>
+        <p:txBody>
+          <a:bodyPr wrap="square" rtlCol="0">
+            <a:spAutoFit/>
+          </a:bodyPr>
+          <a:lstStyle/>
+          <a:p>
+            <a:pPr algn="ctr"/>
+            <a:r>
+              <a:rPr lang="en-US" sz="2400" dirty="0">
+                <a:solidFill>
+                  <a:schemeClr val="accent4">
+                    <a:lumMod val="60000"/>
+                    <a:lumOff val="40000"/>
+                  </a:schemeClr>
+                </a:solidFill>
+              </a:rPr>
+              <a:t>Species 3</a:t>
+            </a:r>
+          </a:p>
+        </p:txBody>
+      </p:sp>
+      <p:sp>
+        <p:nvSpPr>
+          <p:cNvPr id="86" name="Rectangle 85">
+            <a:extLst>
+              <a:ext uri="{FF2B5EF4-FFF2-40B4-BE49-F238E27FC236}">
+                <a16:creationId xmlns:a16="http://schemas.microsoft.com/office/drawing/2014/main" id="{157C490A-59E8-4034-8972-8B52AE9F986C}"/>
+              </a:ext>
+            </a:extLst>
+          </p:cNvPr>
+          <p:cNvSpPr/>
+          <p:nvPr/>
+        </p:nvSpPr>
+        <p:spPr>
+          <a:xfrm>
+            <a:off x="18566857" y="21577695"/>
+            <a:ext cx="2644383" cy="5042389"/>
+          </a:xfrm>
+          <a:prstGeom prst="rect">
+            <a:avLst/>
+          </a:prstGeom>
+          <a:noFill/>
+          <a:ln w="63500">
+            <a:solidFill>
+              <a:schemeClr val="bg1">
+                <a:lumMod val="85000"/>
+              </a:schemeClr>
+            </a:solidFill>
+          </a:ln>
+        </p:spPr>
+        <p:style>
+          <a:lnRef idx="2">
+            <a:schemeClr val="accent1">
+              <a:shade val="50000"/>
+            </a:schemeClr>
+          </a:lnRef>
+          <a:fillRef idx="1">
+            <a:schemeClr val="accent1"/>
+          </a:fillRef>
+          <a:effectRef idx="0">
+            <a:schemeClr val="accent1"/>
+          </a:effectRef>
+          <a:fontRef idx="minor">
+            <a:schemeClr val="lt1"/>
+          </a:fontRef>
+        </p:style>
+        <p:txBody>
+          <a:bodyPr rtlCol="0" anchor="ctr"/>
+          <a:lstStyle/>
+          <a:p>
+            <a:pPr algn="ctr"/>
+            <a:endParaRPr lang="en-US" sz="6000" dirty="0" err="1"/>
+          </a:p>
+        </p:txBody>
+      </p:sp>
+      <p:sp>
+        <p:nvSpPr>
+          <p:cNvPr id="116" name="Rectangle 115">
+            <a:extLst>
+              <a:ext uri="{FF2B5EF4-FFF2-40B4-BE49-F238E27FC236}">
+                <a16:creationId xmlns:a16="http://schemas.microsoft.com/office/drawing/2014/main" id="{51ECA5BE-7135-41BC-874E-38AF99023D3B}"/>
+              </a:ext>
+            </a:extLst>
+          </p:cNvPr>
+          <p:cNvSpPr/>
+          <p:nvPr/>
+        </p:nvSpPr>
+        <p:spPr>
+          <a:xfrm>
+            <a:off x="21448908" y="21558830"/>
+            <a:ext cx="2644383" cy="5042389"/>
+          </a:xfrm>
+          <a:prstGeom prst="rect">
+            <a:avLst/>
+          </a:prstGeom>
+          <a:noFill/>
+          <a:ln w="63500">
+            <a:solidFill>
+              <a:schemeClr val="bg1">
+                <a:lumMod val="85000"/>
+              </a:schemeClr>
+            </a:solidFill>
+          </a:ln>
+        </p:spPr>
+        <p:style>
+          <a:lnRef idx="2">
+            <a:schemeClr val="accent1">
+              <a:shade val="50000"/>
+            </a:schemeClr>
+          </a:lnRef>
+          <a:fillRef idx="1">
+            <a:schemeClr val="accent1"/>
+          </a:fillRef>
+          <a:effectRef idx="0">
+            <a:schemeClr val="accent1"/>
+          </a:effectRef>
+          <a:fontRef idx="minor">
+            <a:schemeClr val="lt1"/>
+          </a:fontRef>
+        </p:style>
+        <p:txBody>
+          <a:bodyPr rtlCol="0" anchor="ctr"/>
+          <a:lstStyle/>
+          <a:p>
+            <a:pPr algn="ctr"/>
+            <a:endParaRPr lang="en-US" sz="6000" dirty="0" err="1"/>
+          </a:p>
+        </p:txBody>
+      </p:sp>
+      <p:sp>
+        <p:nvSpPr>
+          <p:cNvPr id="117" name="Rectangle 116">
+            <a:extLst>
+              <a:ext uri="{FF2B5EF4-FFF2-40B4-BE49-F238E27FC236}">
+                <a16:creationId xmlns:a16="http://schemas.microsoft.com/office/drawing/2014/main" id="{C1EB728B-EAD4-4AC8-A4FF-9D35FC2CF5EF}"/>
+              </a:ext>
+            </a:extLst>
+          </p:cNvPr>
+          <p:cNvSpPr/>
+          <p:nvPr/>
+        </p:nvSpPr>
+        <p:spPr>
+          <a:xfrm>
+            <a:off x="24319957" y="21577695"/>
+            <a:ext cx="2644383" cy="5042389"/>
+          </a:xfrm>
+          <a:prstGeom prst="rect">
+            <a:avLst/>
+          </a:prstGeom>
+          <a:noFill/>
+          <a:ln w="63500">
+            <a:solidFill>
+              <a:schemeClr val="bg1">
+                <a:lumMod val="85000"/>
+              </a:schemeClr>
+            </a:solidFill>
+          </a:ln>
+        </p:spPr>
+        <p:style>
+          <a:lnRef idx="2">
+            <a:schemeClr val="accent1">
+              <a:shade val="50000"/>
+            </a:schemeClr>
+          </a:lnRef>
+          <a:fillRef idx="1">
+            <a:schemeClr val="accent1"/>
+          </a:fillRef>
+          <a:effectRef idx="0">
+            <a:schemeClr val="accent1"/>
+          </a:effectRef>
+          <a:fontRef idx="minor">
+            <a:schemeClr val="lt1"/>
+          </a:fontRef>
+        </p:style>
+        <p:txBody>
+          <a:bodyPr rtlCol="0" anchor="ctr"/>
+          <a:lstStyle/>
+          <a:p>
+            <a:pPr algn="ctr"/>
+            <a:endParaRPr lang="en-US" sz="6000" dirty="0" err="1"/>
+          </a:p>
+        </p:txBody>
+      </p:sp>
     </p:spTree>
     <p:extLst>
       <p:ext uri="{BB962C8B-B14F-4D97-AF65-F5344CB8AC3E}">
@@ -10668,10 +11174,10 @@
       </p:grpSpPr>
       <p:grpSp>
         <p:nvGrpSpPr>
-          <p:cNvPr id="44" name="Group 43">
+          <p:cNvPr id="3" name="Group 2">
             <a:extLst>
               <a:ext uri="{FF2B5EF4-FFF2-40B4-BE49-F238E27FC236}">
-                <a16:creationId xmlns:a16="http://schemas.microsoft.com/office/drawing/2014/main" id="{E92EE597-ABD2-4489-A0C0-0BB7A5C0A91B}"/>
+                <a16:creationId xmlns:a16="http://schemas.microsoft.com/office/drawing/2014/main" id="{34B38BF3-752F-486E-8C09-C5E8F0973F13}"/>
               </a:ext>
             </a:extLst>
           </p:cNvPr>
@@ -10680,153 +11186,644 @@
         </p:nvGrpSpPr>
         <p:grpSpPr>
           <a:xfrm>
-            <a:off x="5821394" y="8994270"/>
-            <a:ext cx="36344149" cy="16639759"/>
-            <a:chOff x="5821394" y="8994270"/>
-            <a:chExt cx="36344149" cy="16639759"/>
+            <a:off x="5822739" y="8345114"/>
+            <a:ext cx="34822099" cy="17381258"/>
+            <a:chOff x="5822739" y="8345114"/>
+            <a:chExt cx="34822099" cy="17381258"/>
           </a:xfrm>
         </p:grpSpPr>
-        <p:pic>
-          <p:nvPicPr>
-            <p:cNvPr id="35" name="Picture 4" descr="Image result for cactus silhouette">
+        <p:grpSp>
+          <p:nvGrpSpPr>
+            <p:cNvPr id="44" name="Group 43">
               <a:extLst>
                 <a:ext uri="{FF2B5EF4-FFF2-40B4-BE49-F238E27FC236}">
-                  <a16:creationId xmlns:a16="http://schemas.microsoft.com/office/drawing/2014/main" id="{A4411D78-0D8F-4C09-A2E3-73EA8DAB05B5}"/>
+                  <a16:creationId xmlns:a16="http://schemas.microsoft.com/office/drawing/2014/main" id="{E92EE597-ABD2-4489-A0C0-0BB7A5C0A91B}"/>
                 </a:ext>
               </a:extLst>
             </p:cNvPr>
-            <p:cNvPicPr>
-              <a:picLocks noChangeAspect="1" noChangeArrowheads="1"/>
-            </p:cNvPicPr>
+            <p:cNvGrpSpPr/>
             <p:nvPr/>
-          </p:nvPicPr>
-          <p:blipFill rotWithShape="1">
-            <a:blip r:embed="rId2">
+          </p:nvGrpSpPr>
+          <p:grpSpPr>
+            <a:xfrm>
+              <a:off x="8598014" y="8345114"/>
+              <a:ext cx="32046824" cy="17136516"/>
+              <a:chOff x="8481181" y="8497514"/>
+              <a:chExt cx="32046824" cy="17136516"/>
+            </a:xfrm>
+          </p:grpSpPr>
+          <p:pic>
+            <p:nvPicPr>
+              <p:cNvPr id="26" name="Picture 4" descr="Image result for cactus silhouette">
+                <a:extLst>
+                  <a:ext uri="{FF2B5EF4-FFF2-40B4-BE49-F238E27FC236}">
+                    <a16:creationId xmlns:a16="http://schemas.microsoft.com/office/drawing/2014/main" id="{5D60CDA4-6C86-498C-9932-B8E8CA20796E}"/>
+                  </a:ext>
+                </a:extLst>
+              </p:cNvPr>
+              <p:cNvPicPr>
+                <a:picLocks noChangeAspect="1" noChangeArrowheads="1"/>
+              </p:cNvPicPr>
+              <p:nvPr/>
+            </p:nvPicPr>
+            <p:blipFill rotWithShape="1">
+              <a:blip r:embed="rId2">
+                <a:extLst>
+                  <a:ext uri="{28A0092B-C50C-407E-A947-70E740481C1C}">
+                    <a14:useLocalDpi xmlns:a14="http://schemas.microsoft.com/office/drawing/2010/main" val="0"/>
+                  </a:ext>
+                </a:extLst>
+              </a:blip>
+              <a:srcRect l="30084" r="26093"/>
+              <a:stretch/>
+            </p:blipFill>
+            <p:spPr bwMode="auto">
+              <a:xfrm flipH="1">
+                <a:off x="8481181" y="14472981"/>
+                <a:ext cx="7100107" cy="10782711"/>
+              </a:xfrm>
+              <a:prstGeom prst="rect">
+                <a:avLst/>
+              </a:prstGeom>
+              <a:noFill/>
               <a:extLst>
-                <a:ext uri="{28A0092B-C50C-407E-A947-70E740481C1C}">
-                  <a14:useLocalDpi xmlns:a14="http://schemas.microsoft.com/office/drawing/2010/main" val="0"/>
+                <a:ext uri="{909E8E84-426E-40DD-AFC4-6F175D3DCCD1}">
+                  <a14:hiddenFill xmlns:a14="http://schemas.microsoft.com/office/drawing/2010/main">
+                    <a:solidFill>
+                      <a:srgbClr val="FFFFFF"/>
+                    </a:solidFill>
+                  </a14:hiddenFill>
                 </a:ext>
               </a:extLst>
-            </a:blip>
-            <a:srcRect l="30084" r="26093"/>
-            <a:stretch/>
-          </p:blipFill>
-          <p:spPr bwMode="auto">
-            <a:xfrm>
-              <a:off x="35241326" y="18038680"/>
-              <a:ext cx="5078423" cy="7038747"/>
-            </a:xfrm>
-            <a:prstGeom prst="rect">
-              <a:avLst/>
-            </a:prstGeom>
-            <a:noFill/>
-            <a:extLst>
-              <a:ext uri="{909E8E84-426E-40DD-AFC4-6F175D3DCCD1}">
-                <a14:hiddenFill xmlns:a14="http://schemas.microsoft.com/office/drawing/2010/main">
-                  <a:solidFill>
-                    <a:srgbClr val="FFFFFF"/>
-                  </a:solidFill>
-                </a14:hiddenFill>
-              </a:ext>
-            </a:extLst>
-          </p:spPr>
-        </p:pic>
+            </p:spPr>
+          </p:pic>
+          <p:pic>
+            <p:nvPicPr>
+              <p:cNvPr id="35" name="Picture 4" descr="Image result for cactus silhouette">
+                <a:extLst>
+                  <a:ext uri="{FF2B5EF4-FFF2-40B4-BE49-F238E27FC236}">
+                    <a16:creationId xmlns:a16="http://schemas.microsoft.com/office/drawing/2014/main" id="{A4411D78-0D8F-4C09-A2E3-73EA8DAB05B5}"/>
+                  </a:ext>
+                </a:extLst>
+              </p:cNvPr>
+              <p:cNvPicPr>
+                <a:picLocks noChangeAspect="1" noChangeArrowheads="1"/>
+              </p:cNvPicPr>
+              <p:nvPr/>
+            </p:nvPicPr>
+            <p:blipFill rotWithShape="1">
+              <a:blip r:embed="rId2">
+                <a:extLst>
+                  <a:ext uri="{28A0092B-C50C-407E-A947-70E740481C1C}">
+                    <a14:useLocalDpi xmlns:a14="http://schemas.microsoft.com/office/drawing/2010/main" val="0"/>
+                  </a:ext>
+                </a:extLst>
+              </a:blip>
+              <a:srcRect l="30084" r="26093"/>
+              <a:stretch/>
+            </p:blipFill>
+            <p:spPr bwMode="auto">
+              <a:xfrm>
+                <a:off x="35241327" y="18476602"/>
+                <a:ext cx="4603688" cy="6600825"/>
+              </a:xfrm>
+              <a:prstGeom prst="rect">
+                <a:avLst/>
+              </a:prstGeom>
+              <a:noFill/>
+              <a:extLst>
+                <a:ext uri="{909E8E84-426E-40DD-AFC4-6F175D3DCCD1}">
+                  <a14:hiddenFill xmlns:a14="http://schemas.microsoft.com/office/drawing/2010/main">
+                    <a:solidFill>
+                      <a:srgbClr val="FFFFFF"/>
+                    </a:solidFill>
+                  </a14:hiddenFill>
+                </a:ext>
+              </a:extLst>
+            </p:spPr>
+          </p:pic>
+          <p:pic>
+            <p:nvPicPr>
+              <p:cNvPr id="27" name="Picture 4" descr="Image result for cactus silhouette">
+                <a:extLst>
+                  <a:ext uri="{FF2B5EF4-FFF2-40B4-BE49-F238E27FC236}">
+                    <a16:creationId xmlns:a16="http://schemas.microsoft.com/office/drawing/2014/main" id="{0A3EC5BF-FD4D-4D04-BFBD-9AEB5C8A6927}"/>
+                  </a:ext>
+                </a:extLst>
+              </p:cNvPr>
+              <p:cNvPicPr>
+                <a:picLocks noChangeAspect="1" noChangeArrowheads="1"/>
+              </p:cNvPicPr>
+              <p:nvPr/>
+            </p:nvPicPr>
+            <p:blipFill rotWithShape="1">
+              <a:blip r:embed="rId2">
+                <a:extLst>
+                  <a:ext uri="{28A0092B-C50C-407E-A947-70E740481C1C}">
+                    <a14:useLocalDpi xmlns:a14="http://schemas.microsoft.com/office/drawing/2010/main" val="0"/>
+                  </a:ext>
+                </a:extLst>
+              </a:blip>
+              <a:srcRect l="30084" r="26093"/>
+              <a:stretch/>
+            </p:blipFill>
+            <p:spPr bwMode="auto">
+              <a:xfrm>
+                <a:off x="20992291" y="8846722"/>
+                <a:ext cx="8030371" cy="16787308"/>
+              </a:xfrm>
+              <a:prstGeom prst="rect">
+                <a:avLst/>
+              </a:prstGeom>
+              <a:noFill/>
+              <a:extLst>
+                <a:ext uri="{909E8E84-426E-40DD-AFC4-6F175D3DCCD1}">
+                  <a14:hiddenFill xmlns:a14="http://schemas.microsoft.com/office/drawing/2010/main">
+                    <a:solidFill>
+                      <a:srgbClr val="FFFFFF"/>
+                    </a:solidFill>
+                  </a14:hiddenFill>
+                </a:ext>
+              </a:extLst>
+            </p:spPr>
+          </p:pic>
+          <p:pic>
+            <p:nvPicPr>
+              <p:cNvPr id="28" name="Picture 12" descr="Image result for flower clipart">
+                <a:extLst>
+                  <a:ext uri="{FF2B5EF4-FFF2-40B4-BE49-F238E27FC236}">
+                    <a16:creationId xmlns:a16="http://schemas.microsoft.com/office/drawing/2014/main" id="{DA0BDF84-FA6D-41C4-9259-2A87F4DB8330}"/>
+                  </a:ext>
+                </a:extLst>
+              </p:cNvPr>
+              <p:cNvPicPr>
+                <a:picLocks noChangeAspect="1" noChangeArrowheads="1"/>
+              </p:cNvPicPr>
+              <p:nvPr/>
+            </p:nvPicPr>
+            <p:blipFill>
+              <a:blip r:embed="rId3" cstate="print">
+                <a:extLst>
+                  <a:ext uri="{28A0092B-C50C-407E-A947-70E740481C1C}">
+                    <a14:useLocalDpi xmlns:a14="http://schemas.microsoft.com/office/drawing/2010/main" val="0"/>
+                  </a:ext>
+                </a:extLst>
+              </a:blip>
+              <a:srcRect/>
+              <a:stretch>
+                <a:fillRect/>
+              </a:stretch>
+            </p:blipFill>
+            <p:spPr bwMode="auto">
+              <a:xfrm rot="1996164">
+                <a:off x="11786305" y="13769512"/>
+                <a:ext cx="2309058" cy="2288240"/>
+              </a:xfrm>
+              <a:prstGeom prst="rect">
+                <a:avLst/>
+              </a:prstGeom>
+              <a:noFill/>
+              <a:extLst>
+                <a:ext uri="{909E8E84-426E-40DD-AFC4-6F175D3DCCD1}">
+                  <a14:hiddenFill xmlns:a14="http://schemas.microsoft.com/office/drawing/2010/main">
+                    <a:solidFill>
+                      <a:srgbClr val="FFFFFF"/>
+                    </a:solidFill>
+                  </a14:hiddenFill>
+                </a:ext>
+              </a:extLst>
+            </p:spPr>
+          </p:pic>
+          <p:pic>
+            <p:nvPicPr>
+              <p:cNvPr id="29" name="Picture 12" descr="Image result for flower clipart">
+                <a:extLst>
+                  <a:ext uri="{FF2B5EF4-FFF2-40B4-BE49-F238E27FC236}">
+                    <a16:creationId xmlns:a16="http://schemas.microsoft.com/office/drawing/2014/main" id="{1D781930-F120-4689-9F9E-CDD8CF70F6B4}"/>
+                  </a:ext>
+                </a:extLst>
+              </p:cNvPr>
+              <p:cNvPicPr>
+                <a:picLocks noChangeAspect="1" noChangeArrowheads="1"/>
+              </p:cNvPicPr>
+              <p:nvPr/>
+            </p:nvPicPr>
+            <p:blipFill>
+              <a:blip r:embed="rId3" cstate="print">
+                <a:extLst>
+                  <a:ext uri="{28A0092B-C50C-407E-A947-70E740481C1C}">
+                    <a14:useLocalDpi xmlns:a14="http://schemas.microsoft.com/office/drawing/2010/main" val="0"/>
+                  </a:ext>
+                </a:extLst>
+              </a:blip>
+              <a:srcRect/>
+              <a:stretch>
+                <a:fillRect/>
+              </a:stretch>
+            </p:blipFill>
+            <p:spPr bwMode="auto">
+              <a:xfrm rot="2688639">
+                <a:off x="36764403" y="18957840"/>
+                <a:ext cx="2309057" cy="2288239"/>
+              </a:xfrm>
+              <a:prstGeom prst="rect">
+                <a:avLst/>
+              </a:prstGeom>
+              <a:noFill/>
+              <a:extLst>
+                <a:ext uri="{909E8E84-426E-40DD-AFC4-6F175D3DCCD1}">
+                  <a14:hiddenFill xmlns:a14="http://schemas.microsoft.com/office/drawing/2010/main">
+                    <a:solidFill>
+                      <a:srgbClr val="FFFFFF"/>
+                    </a:solidFill>
+                  </a14:hiddenFill>
+                </a:ext>
+              </a:extLst>
+            </p:spPr>
+          </p:pic>
+          <p:pic>
+            <p:nvPicPr>
+              <p:cNvPr id="30" name="Picture 12" descr="Image result for flower clipart">
+                <a:extLst>
+                  <a:ext uri="{FF2B5EF4-FFF2-40B4-BE49-F238E27FC236}">
+                    <a16:creationId xmlns:a16="http://schemas.microsoft.com/office/drawing/2014/main" id="{5DD73330-1302-43B8-AE8B-2221A86BDD37}"/>
+                  </a:ext>
+                </a:extLst>
+              </p:cNvPr>
+              <p:cNvPicPr>
+                <a:picLocks noChangeAspect="1" noChangeArrowheads="1"/>
+              </p:cNvPicPr>
+              <p:nvPr/>
+            </p:nvPicPr>
+            <p:blipFill>
+              <a:blip r:embed="rId3" cstate="print">
+                <a:extLst>
+                  <a:ext uri="{28A0092B-C50C-407E-A947-70E740481C1C}">
+                    <a14:useLocalDpi xmlns:a14="http://schemas.microsoft.com/office/drawing/2010/main" val="0"/>
+                  </a:ext>
+                </a:extLst>
+              </a:blip>
+              <a:srcRect/>
+              <a:stretch>
+                <a:fillRect/>
+              </a:stretch>
+            </p:blipFill>
+            <p:spPr bwMode="auto">
+              <a:xfrm rot="1996164">
+                <a:off x="22106129" y="9292546"/>
+                <a:ext cx="2309058" cy="2288240"/>
+              </a:xfrm>
+              <a:prstGeom prst="rect">
+                <a:avLst/>
+              </a:prstGeom>
+              <a:noFill/>
+              <a:extLst>
+                <a:ext uri="{909E8E84-426E-40DD-AFC4-6F175D3DCCD1}">
+                  <a14:hiddenFill xmlns:a14="http://schemas.microsoft.com/office/drawing/2010/main">
+                    <a:solidFill>
+                      <a:srgbClr val="FFFFFF"/>
+                    </a:solidFill>
+                  </a14:hiddenFill>
+                </a:ext>
+              </a:extLst>
+            </p:spPr>
+          </p:pic>
+          <p:pic>
+            <p:nvPicPr>
+              <p:cNvPr id="31" name="Picture 12" descr="Image result for flower clipart">
+                <a:extLst>
+                  <a:ext uri="{FF2B5EF4-FFF2-40B4-BE49-F238E27FC236}">
+                    <a16:creationId xmlns:a16="http://schemas.microsoft.com/office/drawing/2014/main" id="{D239C208-C725-454C-8794-EE61FC413A2B}"/>
+                  </a:ext>
+                </a:extLst>
+              </p:cNvPr>
+              <p:cNvPicPr>
+                <a:picLocks noChangeAspect="1" noChangeArrowheads="1"/>
+              </p:cNvPicPr>
+              <p:nvPr/>
+            </p:nvPicPr>
+            <p:blipFill>
+              <a:blip r:embed="rId3" cstate="print">
+                <a:extLst>
+                  <a:ext uri="{28A0092B-C50C-407E-A947-70E740481C1C}">
+                    <a14:useLocalDpi xmlns:a14="http://schemas.microsoft.com/office/drawing/2010/main" val="0"/>
+                  </a:ext>
+                </a:extLst>
+              </a:blip>
+              <a:srcRect/>
+              <a:stretch>
+                <a:fillRect/>
+              </a:stretch>
+            </p:blipFill>
+            <p:spPr bwMode="auto">
+              <a:xfrm rot="16973761">
+                <a:off x="36034342" y="17367892"/>
+                <a:ext cx="2309058" cy="2288240"/>
+              </a:xfrm>
+              <a:prstGeom prst="rect">
+                <a:avLst/>
+              </a:prstGeom>
+              <a:noFill/>
+              <a:extLst>
+                <a:ext uri="{909E8E84-426E-40DD-AFC4-6F175D3DCCD1}">
+                  <a14:hiddenFill xmlns:a14="http://schemas.microsoft.com/office/drawing/2010/main">
+                    <a:solidFill>
+                      <a:srgbClr val="FFFFFF"/>
+                    </a:solidFill>
+                  </a14:hiddenFill>
+                </a:ext>
+              </a:extLst>
+            </p:spPr>
+          </p:pic>
+          <p:pic>
+            <p:nvPicPr>
+              <p:cNvPr id="32" name="Picture 12" descr="Image result for flower clipart">
+                <a:extLst>
+                  <a:ext uri="{FF2B5EF4-FFF2-40B4-BE49-F238E27FC236}">
+                    <a16:creationId xmlns:a16="http://schemas.microsoft.com/office/drawing/2014/main" id="{3C47C6DC-65D8-4C1E-80C0-7384D140317A}"/>
+                  </a:ext>
+                </a:extLst>
+              </p:cNvPr>
+              <p:cNvPicPr>
+                <a:picLocks noChangeAspect="1" noChangeArrowheads="1"/>
+              </p:cNvPicPr>
+              <p:nvPr/>
+            </p:nvPicPr>
+            <p:blipFill>
+              <a:blip r:embed="rId3" cstate="print">
+                <a:extLst>
+                  <a:ext uri="{28A0092B-C50C-407E-A947-70E740481C1C}">
+                    <a14:useLocalDpi xmlns:a14="http://schemas.microsoft.com/office/drawing/2010/main" val="0"/>
+                  </a:ext>
+                </a:extLst>
+              </a:blip>
+              <a:srcRect/>
+              <a:stretch>
+                <a:fillRect/>
+              </a:stretch>
+            </p:blipFill>
+            <p:spPr bwMode="auto">
+              <a:xfrm rot="1320354">
+                <a:off x="34363585" y="19380253"/>
+                <a:ext cx="2309058" cy="2288240"/>
+              </a:xfrm>
+              <a:prstGeom prst="rect">
+                <a:avLst/>
+              </a:prstGeom>
+              <a:noFill/>
+              <a:extLst>
+                <a:ext uri="{909E8E84-426E-40DD-AFC4-6F175D3DCCD1}">
+                  <a14:hiddenFill xmlns:a14="http://schemas.microsoft.com/office/drawing/2010/main">
+                    <a:solidFill>
+                      <a:srgbClr val="FFFFFF"/>
+                    </a:solidFill>
+                  </a14:hiddenFill>
+                </a:ext>
+              </a:extLst>
+            </p:spPr>
+          </p:pic>
+          <p:pic>
+            <p:nvPicPr>
+              <p:cNvPr id="33" name="Picture 12" descr="Image result for flower clipart">
+                <a:extLst>
+                  <a:ext uri="{FF2B5EF4-FFF2-40B4-BE49-F238E27FC236}">
+                    <a16:creationId xmlns:a16="http://schemas.microsoft.com/office/drawing/2014/main" id="{F5D8C8E0-FAF3-43D6-B1C6-24CF7C84C811}"/>
+                  </a:ext>
+                </a:extLst>
+              </p:cNvPr>
+              <p:cNvPicPr>
+                <a:picLocks noChangeAspect="1" noChangeArrowheads="1"/>
+              </p:cNvPicPr>
+              <p:nvPr/>
+            </p:nvPicPr>
+            <p:blipFill>
+              <a:blip r:embed="rId3" cstate="print">
+                <a:extLst>
+                  <a:ext uri="{28A0092B-C50C-407E-A947-70E740481C1C}">
+                    <a14:useLocalDpi xmlns:a14="http://schemas.microsoft.com/office/drawing/2010/main" val="0"/>
+                  </a:ext>
+                </a:extLst>
+              </a:blip>
+              <a:srcRect/>
+              <a:stretch>
+                <a:fillRect/>
+              </a:stretch>
+            </p:blipFill>
+            <p:spPr bwMode="auto">
+              <a:xfrm rot="388776">
+                <a:off x="34496403" y="17423373"/>
+                <a:ext cx="2309058" cy="2288240"/>
+              </a:xfrm>
+              <a:prstGeom prst="rect">
+                <a:avLst/>
+              </a:prstGeom>
+              <a:noFill/>
+              <a:extLst>
+                <a:ext uri="{909E8E84-426E-40DD-AFC4-6F175D3DCCD1}">
+                  <a14:hiddenFill xmlns:a14="http://schemas.microsoft.com/office/drawing/2010/main">
+                    <a:solidFill>
+                      <a:srgbClr val="FFFFFF"/>
+                    </a:solidFill>
+                  </a14:hiddenFill>
+                </a:ext>
+              </a:extLst>
+            </p:spPr>
+          </p:pic>
+          <p:pic>
+            <p:nvPicPr>
+              <p:cNvPr id="36" name="Picture 12" descr="Image result for flower clipart">
+                <a:extLst>
+                  <a:ext uri="{FF2B5EF4-FFF2-40B4-BE49-F238E27FC236}">
+                    <a16:creationId xmlns:a16="http://schemas.microsoft.com/office/drawing/2014/main" id="{1D29CCFF-6E85-41D5-8669-37895803D014}"/>
+                  </a:ext>
+                </a:extLst>
+              </p:cNvPr>
+              <p:cNvPicPr>
+                <a:picLocks noChangeAspect="1" noChangeArrowheads="1"/>
+              </p:cNvPicPr>
+              <p:nvPr/>
+            </p:nvPicPr>
+            <p:blipFill>
+              <a:blip r:embed="rId3" cstate="print">
+                <a:extLst>
+                  <a:ext uri="{28A0092B-C50C-407E-A947-70E740481C1C}">
+                    <a14:useLocalDpi xmlns:a14="http://schemas.microsoft.com/office/drawing/2010/main" val="0"/>
+                  </a:ext>
+                </a:extLst>
+              </a:blip>
+              <a:srcRect/>
+              <a:stretch>
+                <a:fillRect/>
+              </a:stretch>
+            </p:blipFill>
+            <p:spPr bwMode="auto">
+              <a:xfrm rot="21203234">
+                <a:off x="38218947" y="19927917"/>
+                <a:ext cx="2309058" cy="2288240"/>
+              </a:xfrm>
+              <a:prstGeom prst="rect">
+                <a:avLst/>
+              </a:prstGeom>
+              <a:noFill/>
+              <a:extLst>
+                <a:ext uri="{909E8E84-426E-40DD-AFC4-6F175D3DCCD1}">
+                  <a14:hiddenFill xmlns:a14="http://schemas.microsoft.com/office/drawing/2010/main">
+                    <a:solidFill>
+                      <a:srgbClr val="FFFFFF"/>
+                    </a:solidFill>
+                  </a14:hiddenFill>
+                </a:ext>
+              </a:extLst>
+            </p:spPr>
+          </p:pic>
+          <p:pic>
+            <p:nvPicPr>
+              <p:cNvPr id="37" name="Picture 2" descr="Image result for hummingbird silhouette">
+                <a:extLst>
+                  <a:ext uri="{FF2B5EF4-FFF2-40B4-BE49-F238E27FC236}">
+                    <a16:creationId xmlns:a16="http://schemas.microsoft.com/office/drawing/2014/main" id="{96830D91-B6DD-4AF9-9C8E-D421ECF08F92}"/>
+                  </a:ext>
+                </a:extLst>
+              </p:cNvPr>
+              <p:cNvPicPr>
+                <a:picLocks noChangeAspect="1" noChangeArrowheads="1"/>
+              </p:cNvPicPr>
+              <p:nvPr/>
+            </p:nvPicPr>
+            <p:blipFill>
+              <a:blip r:embed="rId4" cstate="print">
+                <a:extLst>
+                  <a:ext uri="{28A0092B-C50C-407E-A947-70E740481C1C}">
+                    <a14:useLocalDpi xmlns:a14="http://schemas.microsoft.com/office/drawing/2010/main" val="0"/>
+                  </a:ext>
+                </a:extLst>
+              </a:blip>
+              <a:srcRect/>
+              <a:stretch>
+                <a:fillRect/>
+              </a:stretch>
+            </p:blipFill>
+            <p:spPr bwMode="auto">
+              <a:xfrm rot="2792186" flipH="1">
+                <a:off x="17857762" y="9314117"/>
+                <a:ext cx="3878302" cy="2245095"/>
+              </a:xfrm>
+              <a:prstGeom prst="rect">
+                <a:avLst/>
+              </a:prstGeom>
+              <a:noFill/>
+              <a:extLst>
+                <a:ext uri="{909E8E84-426E-40DD-AFC4-6F175D3DCCD1}">
+                  <a14:hiddenFill xmlns:a14="http://schemas.microsoft.com/office/drawing/2010/main">
+                    <a:solidFill>
+                      <a:srgbClr val="FFFFFF"/>
+                    </a:solidFill>
+                  </a14:hiddenFill>
+                </a:ext>
+              </a:extLst>
+            </p:spPr>
+          </p:pic>
+          <p:pic>
+            <p:nvPicPr>
+              <p:cNvPr id="41" name="Picture 2" descr="Image result for hummingbird silhouette">
+                <a:extLst>
+                  <a:ext uri="{FF2B5EF4-FFF2-40B4-BE49-F238E27FC236}">
+                    <a16:creationId xmlns:a16="http://schemas.microsoft.com/office/drawing/2014/main" id="{60ACF3CA-295F-445B-BE52-BE89EF835B63}"/>
+                  </a:ext>
+                </a:extLst>
+              </p:cNvPr>
+              <p:cNvPicPr>
+                <a:picLocks noChangeAspect="1" noChangeArrowheads="1"/>
+              </p:cNvPicPr>
+              <p:nvPr/>
+            </p:nvPicPr>
+            <p:blipFill>
+              <a:blip r:embed="rId4" cstate="print">
+                <a:extLst>
+                  <a:ext uri="{28A0092B-C50C-407E-A947-70E740481C1C}">
+                    <a14:useLocalDpi xmlns:a14="http://schemas.microsoft.com/office/drawing/2010/main" val="0"/>
+                  </a:ext>
+                </a:extLst>
+              </a:blip>
+              <a:srcRect/>
+              <a:stretch>
+                <a:fillRect/>
+              </a:stretch>
+            </p:blipFill>
+            <p:spPr bwMode="auto">
+              <a:xfrm rot="873617" flipH="1">
+                <a:off x="32435513" y="18247369"/>
+                <a:ext cx="3878302" cy="2245095"/>
+              </a:xfrm>
+              <a:prstGeom prst="rect">
+                <a:avLst/>
+              </a:prstGeom>
+              <a:noFill/>
+              <a:extLst>
+                <a:ext uri="{909E8E84-426E-40DD-AFC4-6F175D3DCCD1}">
+                  <a14:hiddenFill xmlns:a14="http://schemas.microsoft.com/office/drawing/2010/main">
+                    <a:solidFill>
+                      <a:srgbClr val="FFFFFF"/>
+                    </a:solidFill>
+                  </a14:hiddenFill>
+                </a:ext>
+              </a:extLst>
+            </p:spPr>
+          </p:pic>
+          <p:pic>
+            <p:nvPicPr>
+              <p:cNvPr id="43" name="Picture 2" descr="Image result for hummingbird silhouette">
+                <a:extLst>
+                  <a:ext uri="{FF2B5EF4-FFF2-40B4-BE49-F238E27FC236}">
+                    <a16:creationId xmlns:a16="http://schemas.microsoft.com/office/drawing/2014/main" id="{90B9C344-A89D-4B16-96C2-91F1236B1B8D}"/>
+                  </a:ext>
+                </a:extLst>
+              </p:cNvPr>
+              <p:cNvPicPr>
+                <a:picLocks noChangeAspect="1" noChangeArrowheads="1"/>
+              </p:cNvPicPr>
+              <p:nvPr/>
+            </p:nvPicPr>
+            <p:blipFill>
+              <a:blip r:embed="rId4" cstate="print">
+                <a:extLst>
+                  <a:ext uri="{28A0092B-C50C-407E-A947-70E740481C1C}">
+                    <a14:useLocalDpi xmlns:a14="http://schemas.microsoft.com/office/drawing/2010/main" val="0"/>
+                  </a:ext>
+                </a:extLst>
+              </a:blip>
+              <a:srcRect/>
+              <a:stretch>
+                <a:fillRect/>
+              </a:stretch>
+            </p:blipFill>
+            <p:spPr bwMode="auto">
+              <a:xfrm rot="1143832" flipH="1">
+                <a:off x="9081570" y="14624156"/>
+                <a:ext cx="3878302" cy="2245095"/>
+              </a:xfrm>
+              <a:prstGeom prst="rect">
+                <a:avLst/>
+              </a:prstGeom>
+              <a:noFill/>
+              <a:extLst>
+                <a:ext uri="{909E8E84-426E-40DD-AFC4-6F175D3DCCD1}">
+                  <a14:hiddenFill xmlns:a14="http://schemas.microsoft.com/office/drawing/2010/main">
+                    <a:solidFill>
+                      <a:srgbClr val="FFFFFF"/>
+                    </a:solidFill>
+                  </a14:hiddenFill>
+                </a:ext>
+              </a:extLst>
+            </p:spPr>
+          </p:pic>
+        </p:grpSp>
         <p:pic>
           <p:nvPicPr>
-            <p:cNvPr id="26" name="Picture 4" descr="Image result for cactus silhouette">
+            <p:cNvPr id="21" name="Picture 12" descr="Image result for flower clipart">
               <a:extLst>
                 <a:ext uri="{FF2B5EF4-FFF2-40B4-BE49-F238E27FC236}">
-                  <a16:creationId xmlns:a16="http://schemas.microsoft.com/office/drawing/2014/main" id="{5D60CDA4-6C86-498C-9932-B8E8CA20796E}"/>
-                </a:ext>
-              </a:extLst>
-            </p:cNvPr>
-            <p:cNvPicPr>
-              <a:picLocks noChangeAspect="1" noChangeArrowheads="1"/>
-            </p:cNvPicPr>
-            <p:nvPr/>
-          </p:nvPicPr>
-          <p:blipFill rotWithShape="1">
-            <a:blip r:embed="rId2">
-              <a:extLst>
-                <a:ext uri="{28A0092B-C50C-407E-A947-70E740481C1C}">
-                  <a14:useLocalDpi xmlns:a14="http://schemas.microsoft.com/office/drawing/2010/main" val="0"/>
-                </a:ext>
-              </a:extLst>
-            </a:blip>
-            <a:srcRect l="30084" r="26093"/>
-            <a:stretch/>
-          </p:blipFill>
-          <p:spPr bwMode="auto">
-            <a:xfrm flipH="1">
-              <a:off x="8481182" y="17236466"/>
-              <a:ext cx="5280431" cy="8019226"/>
-            </a:xfrm>
-            <a:prstGeom prst="rect">
-              <a:avLst/>
-            </a:prstGeom>
-            <a:noFill/>
-            <a:extLst>
-              <a:ext uri="{909E8E84-426E-40DD-AFC4-6F175D3DCCD1}">
-                <a14:hiddenFill xmlns:a14="http://schemas.microsoft.com/office/drawing/2010/main">
-                  <a:solidFill>
-                    <a:srgbClr val="FFFFFF"/>
-                  </a:solidFill>
-                </a14:hiddenFill>
-              </a:ext>
-            </a:extLst>
-          </p:spPr>
-        </p:pic>
-        <p:pic>
-          <p:nvPicPr>
-            <p:cNvPr id="27" name="Picture 4" descr="Image result for cactus silhouette">
-              <a:extLst>
-                <a:ext uri="{FF2B5EF4-FFF2-40B4-BE49-F238E27FC236}">
-                  <a16:creationId xmlns:a16="http://schemas.microsoft.com/office/drawing/2014/main" id="{0A3EC5BF-FD4D-4D04-BFBD-9AEB5C8A6927}"/>
-                </a:ext>
-              </a:extLst>
-            </p:cNvPr>
-            <p:cNvPicPr>
-              <a:picLocks noChangeAspect="1" noChangeArrowheads="1"/>
-            </p:cNvPicPr>
-            <p:nvPr/>
-          </p:nvPicPr>
-          <p:blipFill rotWithShape="1">
-            <a:blip r:embed="rId2">
-              <a:extLst>
-                <a:ext uri="{28A0092B-C50C-407E-A947-70E740481C1C}">
-                  <a14:useLocalDpi xmlns:a14="http://schemas.microsoft.com/office/drawing/2010/main" val="0"/>
-                </a:ext>
-              </a:extLst>
-            </a:blip>
-            <a:srcRect l="30084" r="26093"/>
-            <a:stretch/>
-          </p:blipFill>
-          <p:spPr bwMode="auto">
-            <a:xfrm>
-              <a:off x="20992291" y="10791412"/>
-              <a:ext cx="7100109" cy="14842617"/>
-            </a:xfrm>
-            <a:prstGeom prst="rect">
-              <a:avLst/>
-            </a:prstGeom>
-            <a:noFill/>
-            <a:extLst>
-              <a:ext uri="{909E8E84-426E-40DD-AFC4-6F175D3DCCD1}">
-                <a14:hiddenFill xmlns:a14="http://schemas.microsoft.com/office/drawing/2010/main">
-                  <a:solidFill>
-                    <a:srgbClr val="FFFFFF"/>
-                  </a:solidFill>
-                </a14:hiddenFill>
-              </a:ext>
-            </a:extLst>
-          </p:spPr>
-        </p:pic>
-        <p:pic>
-          <p:nvPicPr>
-            <p:cNvPr id="28" name="Picture 12" descr="Image result for flower clipart">
-              <a:extLst>
-                <a:ext uri="{FF2B5EF4-FFF2-40B4-BE49-F238E27FC236}">
-                  <a16:creationId xmlns:a16="http://schemas.microsoft.com/office/drawing/2014/main" id="{DA0BDF84-FA6D-41C4-9259-2A87F4DB8330}"/>
+                  <a16:creationId xmlns:a16="http://schemas.microsoft.com/office/drawing/2014/main" id="{D0BB951A-0D55-427E-8080-3FA624E75316}"/>
                 </a:ext>
               </a:extLst>
             </p:cNvPr>
@@ -10850,7 +11847,7 @@
           </p:blipFill>
           <p:spPr bwMode="auto">
             <a:xfrm rot="1996164">
-              <a:off x="10864393" y="16748024"/>
+              <a:off x="14281466" y="15207059"/>
               <a:ext cx="2309058" cy="2288240"/>
             </a:xfrm>
             <a:prstGeom prst="rect">
@@ -10870,57 +11867,10 @@
         </p:pic>
         <p:pic>
           <p:nvPicPr>
-            <p:cNvPr id="29" name="Picture 12" descr="Image result for flower clipart">
+            <p:cNvPr id="22" name="Picture 12" descr="Image result for flower clipart">
               <a:extLst>
                 <a:ext uri="{FF2B5EF4-FFF2-40B4-BE49-F238E27FC236}">
-                  <a16:creationId xmlns:a16="http://schemas.microsoft.com/office/drawing/2014/main" id="{1D781930-F120-4689-9F9E-CDD8CF70F6B4}"/>
-                </a:ext>
-              </a:extLst>
-            </p:cNvPr>
-            <p:cNvPicPr>
-              <a:picLocks noChangeAspect="1" noChangeArrowheads="1"/>
-            </p:cNvPicPr>
-            <p:nvPr/>
-          </p:nvPicPr>
-          <p:blipFill>
-            <a:blip r:embed="rId3" cstate="print">
-              <a:extLst>
-                <a:ext uri="{28A0092B-C50C-407E-A947-70E740481C1C}">
-                  <a14:useLocalDpi xmlns:a14="http://schemas.microsoft.com/office/drawing/2010/main" val="0"/>
-                </a:ext>
-              </a:extLst>
-            </a:blip>
-            <a:srcRect/>
-            <a:stretch>
-              <a:fillRect/>
-            </a:stretch>
-          </p:blipFill>
-          <p:spPr bwMode="auto">
-            <a:xfrm rot="2688639">
-              <a:off x="36764403" y="18957840"/>
-              <a:ext cx="2309057" cy="2288239"/>
-            </a:xfrm>
-            <a:prstGeom prst="rect">
-              <a:avLst/>
-            </a:prstGeom>
-            <a:noFill/>
-            <a:extLst>
-              <a:ext uri="{909E8E84-426E-40DD-AFC4-6F175D3DCCD1}">
-                <a14:hiddenFill xmlns:a14="http://schemas.microsoft.com/office/drawing/2010/main">
-                  <a:solidFill>
-                    <a:srgbClr val="FFFFFF"/>
-                  </a:solidFill>
-                </a14:hiddenFill>
-              </a:ext>
-            </a:extLst>
-          </p:spPr>
-        </p:pic>
-        <p:pic>
-          <p:nvPicPr>
-            <p:cNvPr id="30" name="Picture 12" descr="Image result for flower clipart">
-              <a:extLst>
-                <a:ext uri="{FF2B5EF4-FFF2-40B4-BE49-F238E27FC236}">
-                  <a16:creationId xmlns:a16="http://schemas.microsoft.com/office/drawing/2014/main" id="{5DD73330-1302-43B8-AE8B-2221A86BDD37}"/>
+                  <a16:creationId xmlns:a16="http://schemas.microsoft.com/office/drawing/2014/main" id="{595C93B9-F0BD-43C7-8627-8D80B76E0B25}"/>
                 </a:ext>
               </a:extLst>
             </p:cNvPr>
@@ -10944,7 +11894,7 @@
           </p:blipFill>
           <p:spPr bwMode="auto">
             <a:xfrm rot="1996164">
-              <a:off x="21430701" y="10425562"/>
+              <a:off x="10790576" y="15833426"/>
               <a:ext cx="2309058" cy="2288240"/>
             </a:xfrm>
             <a:prstGeom prst="rect">
@@ -10964,10 +11914,10 @@
         </p:pic>
         <p:pic>
           <p:nvPicPr>
-            <p:cNvPr id="31" name="Picture 12" descr="Image result for flower clipart">
+            <p:cNvPr id="24" name="Picture 12" descr="Image result for flower clipart">
               <a:extLst>
                 <a:ext uri="{FF2B5EF4-FFF2-40B4-BE49-F238E27FC236}">
-                  <a16:creationId xmlns:a16="http://schemas.microsoft.com/office/drawing/2014/main" id="{D239C208-C725-454C-8794-EE61FC413A2B}"/>
+                  <a16:creationId xmlns:a16="http://schemas.microsoft.com/office/drawing/2014/main" id="{1E38F79D-06CE-41A5-81FA-DAD1348703DF}"/>
                 </a:ext>
               </a:extLst>
             </p:cNvPr>
@@ -10990,8 +11940,8 @@
             </a:stretch>
           </p:blipFill>
           <p:spPr bwMode="auto">
-            <a:xfrm rot="16973761">
-              <a:off x="36034342" y="17367892"/>
+            <a:xfrm rot="1996164">
+              <a:off x="34363584" y="21202405"/>
               <a:ext cx="2309058" cy="2288240"/>
             </a:xfrm>
             <a:prstGeom prst="rect">
@@ -11011,10 +11961,10 @@
         </p:pic>
         <p:pic>
           <p:nvPicPr>
-            <p:cNvPr id="32" name="Picture 12" descr="Image result for flower clipart">
+            <p:cNvPr id="25" name="Picture 12" descr="Image result for flower clipart">
               <a:extLst>
                 <a:ext uri="{FF2B5EF4-FFF2-40B4-BE49-F238E27FC236}">
-                  <a16:creationId xmlns:a16="http://schemas.microsoft.com/office/drawing/2014/main" id="{3C47C6DC-65D8-4C1E-80C0-7384D140317A}"/>
+                  <a16:creationId xmlns:a16="http://schemas.microsoft.com/office/drawing/2014/main" id="{BFBF6984-1CCC-4478-A75F-DD1CDBDBDD98}"/>
                 </a:ext>
               </a:extLst>
             </p:cNvPr>
@@ -11037,8 +11987,8 @@
             </a:stretch>
           </p:blipFill>
           <p:spPr bwMode="auto">
-            <a:xfrm rot="1320354">
-              <a:off x="34363585" y="19380253"/>
+            <a:xfrm rot="1996164">
+              <a:off x="37573881" y="21733493"/>
               <a:ext cx="2309058" cy="2288240"/>
             </a:xfrm>
             <a:prstGeom prst="rect">
@@ -11058,10 +12008,10 @@
         </p:pic>
         <p:pic>
           <p:nvPicPr>
-            <p:cNvPr id="33" name="Picture 12" descr="Image result for flower clipart">
+            <p:cNvPr id="45" name="Picture 12" descr="Image result for flower clipart">
               <a:extLst>
                 <a:ext uri="{FF2B5EF4-FFF2-40B4-BE49-F238E27FC236}">
-                  <a16:creationId xmlns:a16="http://schemas.microsoft.com/office/drawing/2014/main" id="{F5D8C8E0-FAF3-43D6-B1C6-24CF7C84C811}"/>
+                  <a16:creationId xmlns:a16="http://schemas.microsoft.com/office/drawing/2014/main" id="{A2A6367A-6E0F-40EC-96BD-0A440612915A}"/>
                 </a:ext>
               </a:extLst>
             </p:cNvPr>
@@ -11084,8 +12034,8 @@
             </a:stretch>
           </p:blipFill>
           <p:spPr bwMode="auto">
-            <a:xfrm rot="388776">
-              <a:off x="34496403" y="17423373"/>
+            <a:xfrm rot="1996164">
+              <a:off x="8476999" y="17734481"/>
               <a:ext cx="2309058" cy="2288240"/>
             </a:xfrm>
             <a:prstGeom prst="rect">
@@ -11105,104 +12055,10 @@
         </p:pic>
         <p:pic>
           <p:nvPicPr>
-            <p:cNvPr id="34" name="Picture 12" descr="Image result for flower clipart">
+            <p:cNvPr id="46" name="Picture 2" descr="Image result for hummingbird silhouette">
               <a:extLst>
                 <a:ext uri="{FF2B5EF4-FFF2-40B4-BE49-F238E27FC236}">
-                  <a16:creationId xmlns:a16="http://schemas.microsoft.com/office/drawing/2014/main" id="{53F93AFA-63FC-42B4-A338-8D7CBC183B57}"/>
-                </a:ext>
-              </a:extLst>
-            </p:cNvPr>
-            <p:cNvPicPr>
-              <a:picLocks noChangeAspect="1" noChangeArrowheads="1"/>
-            </p:cNvPicPr>
-            <p:nvPr/>
-          </p:nvPicPr>
-          <p:blipFill>
-            <a:blip r:embed="rId3" cstate="print">
-              <a:extLst>
-                <a:ext uri="{28A0092B-C50C-407E-A947-70E740481C1C}">
-                  <a14:useLocalDpi xmlns:a14="http://schemas.microsoft.com/office/drawing/2010/main" val="0"/>
-                </a:ext>
-              </a:extLst>
-            </a:blip>
-            <a:srcRect/>
-            <a:stretch>
-              <a:fillRect/>
-            </a:stretch>
-          </p:blipFill>
-          <p:spPr bwMode="auto">
-            <a:xfrm rot="2824274">
-              <a:off x="25344932" y="15478654"/>
-              <a:ext cx="2309058" cy="2288240"/>
-            </a:xfrm>
-            <a:prstGeom prst="rect">
-              <a:avLst/>
-            </a:prstGeom>
-            <a:noFill/>
-            <a:extLst>
-              <a:ext uri="{909E8E84-426E-40DD-AFC4-6F175D3DCCD1}">
-                <a14:hiddenFill xmlns:a14="http://schemas.microsoft.com/office/drawing/2010/main">
-                  <a:solidFill>
-                    <a:srgbClr val="FFFFFF"/>
-                  </a:solidFill>
-                </a14:hiddenFill>
-              </a:ext>
-            </a:extLst>
-          </p:spPr>
-        </p:pic>
-        <p:pic>
-          <p:nvPicPr>
-            <p:cNvPr id="36" name="Picture 12" descr="Image result for flower clipart">
-              <a:extLst>
-                <a:ext uri="{FF2B5EF4-FFF2-40B4-BE49-F238E27FC236}">
-                  <a16:creationId xmlns:a16="http://schemas.microsoft.com/office/drawing/2014/main" id="{1D29CCFF-6E85-41D5-8669-37895803D014}"/>
-                </a:ext>
-              </a:extLst>
-            </p:cNvPr>
-            <p:cNvPicPr>
-              <a:picLocks noChangeAspect="1" noChangeArrowheads="1"/>
-            </p:cNvPicPr>
-            <p:nvPr/>
-          </p:nvPicPr>
-          <p:blipFill>
-            <a:blip r:embed="rId3" cstate="print">
-              <a:extLst>
-                <a:ext uri="{28A0092B-C50C-407E-A947-70E740481C1C}">
-                  <a14:useLocalDpi xmlns:a14="http://schemas.microsoft.com/office/drawing/2010/main" val="0"/>
-                </a:ext>
-              </a:extLst>
-            </a:blip>
-            <a:srcRect/>
-            <a:stretch>
-              <a:fillRect/>
-            </a:stretch>
-          </p:blipFill>
-          <p:spPr bwMode="auto">
-            <a:xfrm rot="21203234">
-              <a:off x="38218947" y="19927917"/>
-              <a:ext cx="2309058" cy="2288240"/>
-            </a:xfrm>
-            <a:prstGeom prst="rect">
-              <a:avLst/>
-            </a:prstGeom>
-            <a:noFill/>
-            <a:extLst>
-              <a:ext uri="{909E8E84-426E-40DD-AFC4-6F175D3DCCD1}">
-                <a14:hiddenFill xmlns:a14="http://schemas.microsoft.com/office/drawing/2010/main">
-                  <a:solidFill>
-                    <a:srgbClr val="FFFFFF"/>
-                  </a:solidFill>
-                </a14:hiddenFill>
-              </a:ext>
-            </a:extLst>
-          </p:spPr>
-        </p:pic>
-        <p:pic>
-          <p:nvPicPr>
-            <p:cNvPr id="37" name="Picture 2" descr="Image result for hummingbird silhouette">
-              <a:extLst>
-                <a:ext uri="{FF2B5EF4-FFF2-40B4-BE49-F238E27FC236}">
-                  <a16:creationId xmlns:a16="http://schemas.microsoft.com/office/drawing/2014/main" id="{96830D91-B6DD-4AF9-9C8E-D421ECF08F92}"/>
+                  <a16:creationId xmlns:a16="http://schemas.microsoft.com/office/drawing/2014/main" id="{5A1860AD-0DA8-4AE1-B6AE-17A7D81D1278}"/>
                 </a:ext>
               </a:extLst>
             </p:cNvPr>
@@ -11225,8 +12081,8 @@
             </a:stretch>
           </p:blipFill>
           <p:spPr bwMode="auto">
-            <a:xfrm rot="2792186" flipH="1">
-              <a:off x="17656426" y="9903826"/>
+            <a:xfrm rot="21445809" flipH="1">
+              <a:off x="5908550" y="18483479"/>
               <a:ext cx="3878302" cy="2245095"/>
             </a:xfrm>
             <a:prstGeom prst="rect">
@@ -11246,57 +12102,10 @@
         </p:pic>
         <p:pic>
           <p:nvPicPr>
-            <p:cNvPr id="38" name="Picture 2" descr="Image result for hummingbird silhouette">
+            <p:cNvPr id="47" name="Picture 2" descr="Image result for hummingbird silhouette">
               <a:extLst>
                 <a:ext uri="{FF2B5EF4-FFF2-40B4-BE49-F238E27FC236}">
-                  <a16:creationId xmlns:a16="http://schemas.microsoft.com/office/drawing/2014/main" id="{3B548C25-412A-4214-B76E-C70958DB94D5}"/>
-                </a:ext>
-              </a:extLst>
-            </p:cNvPr>
-            <p:cNvPicPr>
-              <a:picLocks noChangeAspect="1" noChangeArrowheads="1"/>
-            </p:cNvPicPr>
-            <p:nvPr/>
-          </p:nvPicPr>
-          <p:blipFill>
-            <a:blip r:embed="rId5" cstate="print">
-              <a:extLst>
-                <a:ext uri="{28A0092B-C50C-407E-A947-70E740481C1C}">
-                  <a14:useLocalDpi xmlns:a14="http://schemas.microsoft.com/office/drawing/2010/main" val="0"/>
-                </a:ext>
-              </a:extLst>
-            </a:blip>
-            <a:srcRect/>
-            <a:stretch>
-              <a:fillRect/>
-            </a:stretch>
-          </p:blipFill>
-          <p:spPr bwMode="auto">
-            <a:xfrm>
-              <a:off x="23126746" y="8994270"/>
-              <a:ext cx="3776007" cy="2245095"/>
-            </a:xfrm>
-            <a:prstGeom prst="rect">
-              <a:avLst/>
-            </a:prstGeom>
-            <a:noFill/>
-            <a:extLst>
-              <a:ext uri="{909E8E84-426E-40DD-AFC4-6F175D3DCCD1}">
-                <a14:hiddenFill xmlns:a14="http://schemas.microsoft.com/office/drawing/2010/main">
-                  <a:solidFill>
-                    <a:srgbClr val="FFFFFF"/>
-                  </a:solidFill>
-                </a14:hiddenFill>
-              </a:ext>
-            </a:extLst>
-          </p:spPr>
-        </p:pic>
-        <p:pic>
-          <p:nvPicPr>
-            <p:cNvPr id="39" name="Picture 2" descr="Image result for hummingbird silhouette">
-              <a:extLst>
-                <a:ext uri="{FF2B5EF4-FFF2-40B4-BE49-F238E27FC236}">
-                  <a16:creationId xmlns:a16="http://schemas.microsoft.com/office/drawing/2014/main" id="{2AD58D56-E00A-4B46-9CA4-2B3E29A61646}"/>
+                  <a16:creationId xmlns:a16="http://schemas.microsoft.com/office/drawing/2014/main" id="{FDB76547-BFEC-4904-BB55-4330AF5FDFF3}"/>
                 </a:ext>
               </a:extLst>
             </p:cNvPr>
@@ -11319,9 +12128,9 @@
             </a:stretch>
           </p:blipFill>
           <p:spPr bwMode="auto">
-            <a:xfrm rot="20942693" flipH="1">
-              <a:off x="24912455" y="12753084"/>
-              <a:ext cx="3878302" cy="2245095"/>
+            <a:xfrm rot="21445809">
+              <a:off x="15176250" y="15437213"/>
+              <a:ext cx="3795404" cy="2245095"/>
             </a:xfrm>
             <a:prstGeom prst="rect">
               <a:avLst/>
@@ -11338,194 +12147,52 @@
             </a:extLst>
           </p:spPr>
         </p:pic>
-        <p:pic>
-          <p:nvPicPr>
-            <p:cNvPr id="40" name="Picture 2" descr="Image result for hummingbird silhouette">
+        <p:sp>
+          <p:nvSpPr>
+            <p:cNvPr id="2" name="Oval 1">
               <a:extLst>
                 <a:ext uri="{FF2B5EF4-FFF2-40B4-BE49-F238E27FC236}">
-                  <a16:creationId xmlns:a16="http://schemas.microsoft.com/office/drawing/2014/main" id="{6F0559C3-1082-44F5-B147-480D8C070843}"/>
+                  <a16:creationId xmlns:a16="http://schemas.microsoft.com/office/drawing/2014/main" id="{977B66B1-5963-4714-938C-4AB989B9BAF0}"/>
                 </a:ext>
               </a:extLst>
             </p:cNvPr>
-            <p:cNvPicPr>
-              <a:picLocks noChangeAspect="1" noChangeArrowheads="1"/>
-            </p:cNvPicPr>
+            <p:cNvSpPr/>
             <p:nvPr/>
-          </p:nvPicPr>
-          <p:blipFill>
-            <a:blip r:embed="rId4" cstate="print">
-              <a:extLst>
-                <a:ext uri="{28A0092B-C50C-407E-A947-70E740481C1C}">
-                  <a14:useLocalDpi xmlns:a14="http://schemas.microsoft.com/office/drawing/2010/main" val="0"/>
-                </a:ext>
-              </a:extLst>
-            </a:blip>
-            <a:srcRect/>
-            <a:stretch>
-              <a:fillRect/>
-            </a:stretch>
-          </p:blipFill>
-          <p:spPr bwMode="auto">
-            <a:xfrm rot="20985050">
-              <a:off x="38107277" y="17387396"/>
-              <a:ext cx="4058266" cy="2245095"/>
+          </p:nvSpPr>
+          <p:spPr>
+            <a:xfrm>
+              <a:off x="5822739" y="12708659"/>
+              <a:ext cx="13614352" cy="13017713"/>
             </a:xfrm>
-            <a:prstGeom prst="rect">
+            <a:prstGeom prst="ellipse">
               <a:avLst/>
             </a:prstGeom>
             <a:noFill/>
-            <a:extLst>
-              <a:ext uri="{909E8E84-426E-40DD-AFC4-6F175D3DCCD1}">
-                <a14:hiddenFill xmlns:a14="http://schemas.microsoft.com/office/drawing/2010/main">
-                  <a:solidFill>
-                    <a:srgbClr val="FFFFFF"/>
-                  </a:solidFill>
-                </a14:hiddenFill>
-              </a:ext>
-            </a:extLst>
+            <a:ln/>
           </p:spPr>
-        </p:pic>
-        <p:pic>
-          <p:nvPicPr>
-            <p:cNvPr id="41" name="Picture 2" descr="Image result for hummingbird silhouette">
-              <a:extLst>
-                <a:ext uri="{FF2B5EF4-FFF2-40B4-BE49-F238E27FC236}">
-                  <a16:creationId xmlns:a16="http://schemas.microsoft.com/office/drawing/2014/main" id="{60ACF3CA-295F-445B-BE52-BE89EF835B63}"/>
-                </a:ext>
-              </a:extLst>
-            </p:cNvPr>
-            <p:cNvPicPr>
-              <a:picLocks noChangeAspect="1" noChangeArrowheads="1"/>
-            </p:cNvPicPr>
-            <p:nvPr/>
-          </p:nvPicPr>
-          <p:blipFill>
-            <a:blip r:embed="rId4" cstate="print">
-              <a:extLst>
-                <a:ext uri="{28A0092B-C50C-407E-A947-70E740481C1C}">
-                  <a14:useLocalDpi xmlns:a14="http://schemas.microsoft.com/office/drawing/2010/main" val="0"/>
-                </a:ext>
-              </a:extLst>
-            </a:blip>
-            <a:srcRect/>
-            <a:stretch>
-              <a:fillRect/>
-            </a:stretch>
-          </p:blipFill>
-          <p:spPr bwMode="auto">
-            <a:xfrm rot="873617" flipH="1">
-              <a:off x="32435513" y="18247369"/>
-              <a:ext cx="3878302" cy="2245095"/>
-            </a:xfrm>
-            <a:prstGeom prst="rect">
-              <a:avLst/>
-            </a:prstGeom>
-            <a:noFill/>
-            <a:extLst>
-              <a:ext uri="{909E8E84-426E-40DD-AFC4-6F175D3DCCD1}">
-                <a14:hiddenFill xmlns:a14="http://schemas.microsoft.com/office/drawing/2010/main">
-                  <a:solidFill>
-                    <a:srgbClr val="FFFFFF"/>
-                  </a:solidFill>
-                </a14:hiddenFill>
-              </a:ext>
-            </a:extLst>
-          </p:spPr>
-        </p:pic>
-        <p:pic>
-          <p:nvPicPr>
-            <p:cNvPr id="42" name="Picture 2" descr="Image result for hummingbird silhouette">
-              <a:extLst>
-                <a:ext uri="{FF2B5EF4-FFF2-40B4-BE49-F238E27FC236}">
-                  <a16:creationId xmlns:a16="http://schemas.microsoft.com/office/drawing/2014/main" id="{A2D4DEA6-5B06-4506-B02E-6D9A8DB0AFE5}"/>
-                </a:ext>
-              </a:extLst>
-            </p:cNvPr>
-            <p:cNvPicPr>
-              <a:picLocks noChangeAspect="1" noChangeArrowheads="1"/>
-            </p:cNvPicPr>
-            <p:nvPr/>
-          </p:nvPicPr>
-          <p:blipFill>
-            <a:blip r:embed="rId6" cstate="print">
-              <a:extLst>
-                <a:ext uri="{28A0092B-C50C-407E-A947-70E740481C1C}">
-                  <a14:useLocalDpi xmlns:a14="http://schemas.microsoft.com/office/drawing/2010/main" val="0"/>
-                </a:ext>
-              </a:extLst>
-            </a:blip>
-            <a:srcRect/>
-            <a:stretch>
-              <a:fillRect/>
-            </a:stretch>
-          </p:blipFill>
-          <p:spPr bwMode="auto">
-            <a:xfrm rot="19119069">
-              <a:off x="34905347" y="14574152"/>
-              <a:ext cx="3738524" cy="2245095"/>
-            </a:xfrm>
-            <a:prstGeom prst="rect">
-              <a:avLst/>
-            </a:prstGeom>
-            <a:noFill/>
-            <a:extLst>
-              <a:ext uri="{909E8E84-426E-40DD-AFC4-6F175D3DCCD1}">
-                <a14:hiddenFill xmlns:a14="http://schemas.microsoft.com/office/drawing/2010/main">
-                  <a:solidFill>
-                    <a:srgbClr val="FFFFFF"/>
-                  </a:solidFill>
-                </a14:hiddenFill>
-              </a:ext>
-            </a:extLst>
-          </p:spPr>
-        </p:pic>
-        <p:pic>
-          <p:nvPicPr>
-            <p:cNvPr id="43" name="Picture 2" descr="Image result for hummingbird silhouette">
-              <a:extLst>
-                <a:ext uri="{FF2B5EF4-FFF2-40B4-BE49-F238E27FC236}">
-                  <a16:creationId xmlns:a16="http://schemas.microsoft.com/office/drawing/2014/main" id="{90B9C344-A89D-4B16-96C2-91F1236B1B8D}"/>
-                </a:ext>
-              </a:extLst>
-            </p:cNvPr>
-            <p:cNvPicPr>
-              <a:picLocks noChangeAspect="1" noChangeArrowheads="1"/>
-            </p:cNvPicPr>
-            <p:nvPr/>
-          </p:nvPicPr>
-          <p:blipFill>
-            <a:blip r:embed="rId4" cstate="print">
-              <a:extLst>
-                <a:ext uri="{28A0092B-C50C-407E-A947-70E740481C1C}">
-                  <a14:useLocalDpi xmlns:a14="http://schemas.microsoft.com/office/drawing/2010/main" val="0"/>
-                </a:ext>
-              </a:extLst>
-            </a:blip>
-            <a:srcRect/>
-            <a:stretch>
-              <a:fillRect/>
-            </a:stretch>
-          </p:blipFill>
-          <p:spPr bwMode="auto">
-            <a:xfrm rot="1143832" flipH="1">
-              <a:off x="5821394" y="17758037"/>
-              <a:ext cx="3878302" cy="2245095"/>
-            </a:xfrm>
-            <a:prstGeom prst="rect">
-              <a:avLst/>
-            </a:prstGeom>
-            <a:noFill/>
-            <a:extLst>
-              <a:ext uri="{909E8E84-426E-40DD-AFC4-6F175D3DCCD1}">
-                <a14:hiddenFill xmlns:a14="http://schemas.microsoft.com/office/drawing/2010/main">
-                  <a:solidFill>
-                    <a:srgbClr val="FFFFFF"/>
-                  </a:solidFill>
-                </a14:hiddenFill>
-              </a:ext>
-            </a:extLst>
-          </p:spPr>
-        </p:pic>
+          <p:style>
+            <a:lnRef idx="2">
+              <a:schemeClr val="accent4"/>
+            </a:lnRef>
+            <a:fillRef idx="1">
+              <a:schemeClr val="lt1"/>
+            </a:fillRef>
+            <a:effectRef idx="0">
+              <a:schemeClr val="accent4"/>
+            </a:effectRef>
+            <a:fontRef idx="minor">
+              <a:schemeClr val="dk1"/>
+            </a:fontRef>
+          </p:style>
+          <p:txBody>
+            <a:bodyPr rtlCol="0" anchor="ctr"/>
+            <a:lstStyle/>
+            <a:p>
+              <a:pPr algn="ctr"/>
+              <a:endParaRPr lang="en-US" sz="6000" dirty="0" err="1"/>
+            </a:p>
+          </p:txBody>
+        </p:sp>
       </p:grpSp>
     </p:spTree>
     <p:extLst>

</xml_diff>